<commit_message>
moved files and started work on ii-3
</commit_message>
<xml_diff>
--- a/5_seminar/Contents_Part_01/slides_I.pptx
+++ b/5_seminar/Contents_Part_01/slides_I.pptx
@@ -5,7 +5,7 @@
     <p:sldMasterId id="2147483648" r:id="rId1"/>
   </p:sldMasterIdLst>
   <p:notesMasterIdLst>
-    <p:notesMasterId r:id="rId39"/>
+    <p:notesMasterId r:id="rId40"/>
   </p:notesMasterIdLst>
   <p:sldIdLst>
     <p:sldId id="303" r:id="rId2"/>
@@ -34,17 +34,18 @@
     <p:sldId id="328" r:id="rId25"/>
     <p:sldId id="329" r:id="rId26"/>
     <p:sldId id="330" r:id="rId27"/>
-    <p:sldId id="341" r:id="rId28"/>
-    <p:sldId id="331" r:id="rId29"/>
-    <p:sldId id="332" r:id="rId30"/>
-    <p:sldId id="333" r:id="rId31"/>
-    <p:sldId id="334" r:id="rId32"/>
-    <p:sldId id="335" r:id="rId33"/>
-    <p:sldId id="336" r:id="rId34"/>
-    <p:sldId id="337" r:id="rId35"/>
-    <p:sldId id="338" r:id="rId36"/>
-    <p:sldId id="339" r:id="rId37"/>
-    <p:sldId id="342" r:id="rId38"/>
+    <p:sldId id="343" r:id="rId28"/>
+    <p:sldId id="341" r:id="rId29"/>
+    <p:sldId id="331" r:id="rId30"/>
+    <p:sldId id="332" r:id="rId31"/>
+    <p:sldId id="333" r:id="rId32"/>
+    <p:sldId id="334" r:id="rId33"/>
+    <p:sldId id="335" r:id="rId34"/>
+    <p:sldId id="336" r:id="rId35"/>
+    <p:sldId id="337" r:id="rId36"/>
+    <p:sldId id="338" r:id="rId37"/>
+    <p:sldId id="339" r:id="rId38"/>
+    <p:sldId id="342" r:id="rId39"/>
   </p:sldIdLst>
   <p:sldSz cx="12192000" cy="6858000"/>
   <p:notesSz cx="6858000" cy="9144000"/>
@@ -151,7 +152,7 @@
             <a:srgbClr val="A4A3A4"/>
           </p15:clr>
         </p15:guide>
-        <p15:guide id="2" pos="3840" userDrawn="1">
+        <p15:guide id="2" pos="1912" userDrawn="1">
           <p15:clr>
             <a:srgbClr val="A4A3A4"/>
           </p15:clr>
@@ -244,7 +245,7 @@
           <a:p>
             <a:fld id="{7A5B87F2-13FD-4A24-9F19-39B31C60B536}" type="datetimeFigureOut">
               <a:rPr lang="en-US" smtClean="0"/>
-              <a:t>4/26/2021</a:t>
+              <a:t>4/27/2021</a:t>
             </a:fld>
             <a:endParaRPr lang="en-US"/>
           </a:p>
@@ -2116,7 +2117,7 @@
           <a:p>
             <a:fld id="{20A41429-B750-4047-B563-2878417A70E7}" type="slidenum">
               <a:rPr lang="en-US" smtClean="0"/>
-              <a:t>28</a:t>
+              <a:t>27</a:t>
             </a:fld>
             <a:endParaRPr lang="en-US"/>
           </a:p>
@@ -2125,7 +2126,7 @@
     </p:spTree>
     <p:extLst>
       <p:ext uri="{BB962C8B-B14F-4D97-AF65-F5344CB8AC3E}">
-        <p14:creationId xmlns:p14="http://schemas.microsoft.com/office/powerpoint/2010/main" val="4219963425"/>
+        <p14:creationId xmlns:p14="http://schemas.microsoft.com/office/powerpoint/2010/main" val="3126241391"/>
       </p:ext>
     </p:extLst>
   </p:cSld>
@@ -2226,7 +2227,7 @@
     </p:spTree>
     <p:extLst>
       <p:ext uri="{BB962C8B-B14F-4D97-AF65-F5344CB8AC3E}">
-        <p14:creationId xmlns:p14="http://schemas.microsoft.com/office/powerpoint/2010/main" val="1636782447"/>
+        <p14:creationId xmlns:p14="http://schemas.microsoft.com/office/powerpoint/2010/main" val="4219963425"/>
       </p:ext>
     </p:extLst>
   </p:cSld>
@@ -2327,7 +2328,7 @@
     </p:spTree>
     <p:extLst>
       <p:ext uri="{BB962C8B-B14F-4D97-AF65-F5344CB8AC3E}">
-        <p14:creationId xmlns:p14="http://schemas.microsoft.com/office/powerpoint/2010/main" val="2522481197"/>
+        <p14:creationId xmlns:p14="http://schemas.microsoft.com/office/powerpoint/2010/main" val="1636782447"/>
       </p:ext>
     </p:extLst>
   </p:cSld>
@@ -2428,7 +2429,7 @@
     </p:spTree>
     <p:extLst>
       <p:ext uri="{BB962C8B-B14F-4D97-AF65-F5344CB8AC3E}">
-        <p14:creationId xmlns:p14="http://schemas.microsoft.com/office/powerpoint/2010/main" val="1763285274"/>
+        <p14:creationId xmlns:p14="http://schemas.microsoft.com/office/powerpoint/2010/main" val="2522481197"/>
       </p:ext>
     </p:extLst>
   </p:cSld>
@@ -2529,7 +2530,7 @@
     </p:spTree>
     <p:extLst>
       <p:ext uri="{BB962C8B-B14F-4D97-AF65-F5344CB8AC3E}">
-        <p14:creationId xmlns:p14="http://schemas.microsoft.com/office/powerpoint/2010/main" val="2359503047"/>
+        <p14:creationId xmlns:p14="http://schemas.microsoft.com/office/powerpoint/2010/main" val="1763285274"/>
       </p:ext>
     </p:extLst>
   </p:cSld>
@@ -2630,7 +2631,7 @@
     </p:spTree>
     <p:extLst>
       <p:ext uri="{BB962C8B-B14F-4D97-AF65-F5344CB8AC3E}">
-        <p14:creationId xmlns:p14="http://schemas.microsoft.com/office/powerpoint/2010/main" val="504955277"/>
+        <p14:creationId xmlns:p14="http://schemas.microsoft.com/office/powerpoint/2010/main" val="2359503047"/>
       </p:ext>
     </p:extLst>
   </p:cSld>
@@ -2731,7 +2732,7 @@
     </p:spTree>
     <p:extLst>
       <p:ext uri="{BB962C8B-B14F-4D97-AF65-F5344CB8AC3E}">
-        <p14:creationId xmlns:p14="http://schemas.microsoft.com/office/powerpoint/2010/main" val="4092073876"/>
+        <p14:creationId xmlns:p14="http://schemas.microsoft.com/office/powerpoint/2010/main" val="504955277"/>
       </p:ext>
     </p:extLst>
   </p:cSld>
@@ -2929,6 +2930,107 @@
             <a:fld id="{20A41429-B750-4047-B563-2878417A70E7}" type="slidenum">
               <a:rPr lang="en-US" smtClean="0"/>
               <a:t>35</a:t>
+            </a:fld>
+            <a:endParaRPr lang="en-US"/>
+          </a:p>
+        </p:txBody>
+      </p:sp>
+    </p:spTree>
+    <p:extLst>
+      <p:ext uri="{BB962C8B-B14F-4D97-AF65-F5344CB8AC3E}">
+        <p14:creationId xmlns:p14="http://schemas.microsoft.com/office/powerpoint/2010/main" val="4092073876"/>
+      </p:ext>
+    </p:extLst>
+  </p:cSld>
+  <p:clrMapOvr>
+    <a:masterClrMapping/>
+  </p:clrMapOvr>
+</p:notes>
+</file>
+
+<file path=ppt/notesSlides/notesSlide31.xml><?xml version="1.0" encoding="utf-8"?>
+<p:notes xmlns:a="http://schemas.openxmlformats.org/drawingml/2006/main" xmlns:r="http://schemas.openxmlformats.org/officeDocument/2006/relationships" xmlns:p="http://schemas.openxmlformats.org/presentationml/2006/main">
+  <p:cSld>
+    <p:spTree>
+      <p:nvGrpSpPr>
+        <p:cNvPr id="1" name=""/>
+        <p:cNvGrpSpPr/>
+        <p:nvPr/>
+      </p:nvGrpSpPr>
+      <p:grpSpPr>
+        <a:xfrm>
+          <a:off x="0" y="0"/>
+          <a:ext cx="0" cy="0"/>
+          <a:chOff x="0" y="0"/>
+          <a:chExt cx="0" cy="0"/>
+        </a:xfrm>
+      </p:grpSpPr>
+      <p:sp>
+        <p:nvSpPr>
+          <p:cNvPr id="2" name="Folienbildplatzhalter 1"/>
+          <p:cNvSpPr>
+            <a:spLocks noGrp="1" noRot="1" noChangeAspect="1"/>
+          </p:cNvSpPr>
+          <p:nvPr>
+            <p:ph type="sldImg"/>
+          </p:nvPr>
+        </p:nvSpPr>
+        <p:spPr/>
+      </p:sp>
+      <p:sp>
+        <p:nvSpPr>
+          <p:cNvPr id="3" name="Notizenplatzhalter 2"/>
+          <p:cNvSpPr>
+            <a:spLocks noGrp="1"/>
+          </p:cNvSpPr>
+          <p:nvPr>
+            <p:ph type="body" idx="1"/>
+          </p:nvPr>
+        </p:nvSpPr>
+        <p:spPr/>
+        <p:txBody>
+          <a:bodyPr/>
+          <a:lstStyle/>
+          <a:p>
+            <a:pPr marL="0" marR="0" lvl="0" indent="0" algn="l" defTabSz="914400" rtl="0" eaLnBrk="1" fontAlgn="auto" latinLnBrk="0" hangingPunct="1">
+              <a:lnSpc>
+                <a:spcPct val="100000"/>
+              </a:lnSpc>
+              <a:spcBef>
+                <a:spcPts val="0"/>
+              </a:spcBef>
+              <a:spcAft>
+                <a:spcPts val="0"/>
+              </a:spcAft>
+              <a:buClrTx/>
+              <a:buSzTx/>
+              <a:buFontTx/>
+              <a:buNone/>
+              <a:tabLst/>
+              <a:defRPr/>
+            </a:pPr>
+            <a:endParaRPr lang="en-US"/>
+          </a:p>
+        </p:txBody>
+      </p:sp>
+      <p:sp>
+        <p:nvSpPr>
+          <p:cNvPr id="4" name="Foliennummernplatzhalter 3"/>
+          <p:cNvSpPr>
+            <a:spLocks noGrp="1"/>
+          </p:cNvSpPr>
+          <p:nvPr>
+            <p:ph type="sldNum" sz="quarter" idx="10"/>
+          </p:nvPr>
+        </p:nvSpPr>
+        <p:spPr/>
+        <p:txBody>
+          <a:bodyPr/>
+          <a:lstStyle/>
+          <a:p>
+            <a:fld id="{20A41429-B750-4047-B563-2878417A70E7}" type="slidenum">
+              <a:rPr lang="en-US" smtClean="0"/>
+              <a:t>36</a:t>
             </a:fld>
             <a:endParaRPr lang="en-US"/>
           </a:p>
@@ -3684,7 +3786,7 @@
           <a:p>
             <a:fld id="{5A1811BA-6AD9-41A7-B7A2-456C8523519C}" type="datetime1">
               <a:rPr lang="en-US" smtClean="0"/>
-              <a:t>4/26/2021</a:t>
+              <a:t>4/27/2021</a:t>
             </a:fld>
             <a:endParaRPr lang="en-US"/>
           </a:p>
@@ -3854,7 +3956,7 @@
           <a:p>
             <a:fld id="{B0494441-C196-4BB0-93EE-AF22360207AB}" type="datetime1">
               <a:rPr lang="en-US" smtClean="0"/>
-              <a:t>4/26/2021</a:t>
+              <a:t>4/27/2021</a:t>
             </a:fld>
             <a:endParaRPr lang="en-US"/>
           </a:p>
@@ -4034,7 +4136,7 @@
           <a:p>
             <a:fld id="{D7B9282B-C3CE-4F56-8DD1-5349F982F1D2}" type="datetime1">
               <a:rPr lang="en-US" smtClean="0"/>
-              <a:t>4/26/2021</a:t>
+              <a:t>4/27/2021</a:t>
             </a:fld>
             <a:endParaRPr lang="en-US"/>
           </a:p>
@@ -4204,7 +4306,7 @@
           <a:p>
             <a:fld id="{E6E86D6A-786F-4E85-AF3B-385015383ABA}" type="datetime1">
               <a:rPr lang="en-US" smtClean="0"/>
-              <a:t>4/26/2021</a:t>
+              <a:t>4/27/2021</a:t>
             </a:fld>
             <a:endParaRPr lang="en-US"/>
           </a:p>
@@ -4450,7 +4552,7 @@
           <a:p>
             <a:fld id="{051FFEB0-9C80-4A34-A5C7-72D52D52FC7D}" type="datetime1">
               <a:rPr lang="en-US" smtClean="0"/>
-              <a:t>4/26/2021</a:t>
+              <a:t>4/27/2021</a:t>
             </a:fld>
             <a:endParaRPr lang="en-US"/>
           </a:p>
@@ -4682,7 +4784,7 @@
           <a:p>
             <a:fld id="{084267AD-C299-471B-ABA1-D0EA94C7EDCF}" type="datetime1">
               <a:rPr lang="en-US" smtClean="0"/>
-              <a:t>4/26/2021</a:t>
+              <a:t>4/27/2021</a:t>
             </a:fld>
             <a:endParaRPr lang="en-US"/>
           </a:p>
@@ -5049,7 +5151,7 @@
           <a:p>
             <a:fld id="{6468DBC7-10F8-46A1-8CE1-DBB0A6F0EF3E}" type="datetime1">
               <a:rPr lang="en-US" smtClean="0"/>
-              <a:t>4/26/2021</a:t>
+              <a:t>4/27/2021</a:t>
             </a:fld>
             <a:endParaRPr lang="en-US"/>
           </a:p>
@@ -5167,7 +5269,7 @@
           <a:p>
             <a:fld id="{0A97ED80-8DDA-43A7-A78F-B0542D691D0E}" type="datetime1">
               <a:rPr lang="en-US" smtClean="0"/>
-              <a:t>4/26/2021</a:t>
+              <a:t>4/27/2021</a:t>
             </a:fld>
             <a:endParaRPr lang="en-US"/>
           </a:p>
@@ -5262,7 +5364,7 @@
           <a:p>
             <a:fld id="{0AF827E6-45BA-40D2-98F2-BE4FFF095577}" type="datetime1">
               <a:rPr lang="en-US" smtClean="0"/>
-              <a:t>4/26/2021</a:t>
+              <a:t>4/27/2021</a:t>
             </a:fld>
             <a:endParaRPr lang="en-US"/>
           </a:p>
@@ -5539,7 +5641,7 @@
           <a:p>
             <a:fld id="{42BD114C-22EA-4B1A-A45B-ED6465C7BB4E}" type="datetime1">
               <a:rPr lang="en-US" smtClean="0"/>
-              <a:t>4/26/2021</a:t>
+              <a:t>4/27/2021</a:t>
             </a:fld>
             <a:endParaRPr lang="en-US"/>
           </a:p>
@@ -5792,7 +5894,7 @@
           <a:p>
             <a:fld id="{F46F8903-38BE-4FD8-98FC-E4EF771B2D8C}" type="datetime1">
               <a:rPr lang="en-US" smtClean="0"/>
-              <a:t>4/26/2021</a:t>
+              <a:t>4/27/2021</a:t>
             </a:fld>
             <a:endParaRPr lang="en-US"/>
           </a:p>
@@ -6005,7 +6107,7 @@
           <a:p>
             <a:fld id="{A91AC8C7-9CA9-4E83-8CE3-AD3BE4150B39}" type="datetime1">
               <a:rPr lang="en-US" smtClean="0"/>
-              <a:t>4/26/2021</a:t>
+              <a:t>4/27/2021</a:t>
             </a:fld>
             <a:endParaRPr lang="en-US"/>
           </a:p>
@@ -14305,85 +14407,6 @@
       </p:grpSpPr>
       <p:sp>
         <p:nvSpPr>
-          <p:cNvPr id="2" name="Titel 1"/>
-          <p:cNvSpPr>
-            <a:spLocks noGrp="1"/>
-          </p:cNvSpPr>
-          <p:nvPr>
-            <p:ph type="title"/>
-          </p:nvPr>
-        </p:nvSpPr>
-        <p:spPr>
-          <a:xfrm>
-            <a:off x="1047750" y="1990724"/>
-            <a:ext cx="10299700" cy="2886075"/>
-          </a:xfrm>
-        </p:spPr>
-        <p:txBody>
-          <a:bodyPr/>
-          <a:lstStyle/>
-          <a:p>
-            <a:r>
-              <a:rPr lang="en-GB" b="1">
-                <a:effectLst>
-                  <a:outerShdw blurRad="38100" dist="38100" dir="2700000" algn="tl">
-                    <a:srgbClr val="000000">
-                      <a:alpha val="43137"/>
-                    </a:srgbClr>
-                  </a:outerShdw>
-                </a:effectLst>
-              </a:rPr>
-              <a:t>Part I: Intro NLP &amp; Task at Hand</a:t>
-            </a:r>
-            <a:endParaRPr lang="en-US" b="1">
-              <a:effectLst>
-                <a:outerShdw blurRad="38100" dist="38100" dir="2700000" algn="tl">
-                  <a:srgbClr val="000000">
-                    <a:alpha val="43137"/>
-                  </a:srgbClr>
-                </a:outerShdw>
-              </a:effectLst>
-            </a:endParaRPr>
-          </a:p>
-        </p:txBody>
-      </p:sp>
-      <p:sp>
-        <p:nvSpPr>
-          <p:cNvPr id="3" name="Textplatzhalter 2"/>
-          <p:cNvSpPr>
-            <a:spLocks noGrp="1"/>
-          </p:cNvSpPr>
-          <p:nvPr>
-            <p:ph type="body" idx="1"/>
-          </p:nvPr>
-        </p:nvSpPr>
-        <p:spPr>
-          <a:xfrm>
-            <a:off x="1047748" y="4876799"/>
-            <a:ext cx="10299701" cy="1212851"/>
-          </a:xfrm>
-        </p:spPr>
-        <p:txBody>
-          <a:bodyPr/>
-          <a:lstStyle/>
-          <a:p>
-            <a:r>
-              <a:rPr lang="en-US" b="1">
-                <a:effectLst>
-                  <a:outerShdw blurRad="38100" dist="38100" dir="2700000" algn="tl">
-                    <a:srgbClr val="000000">
-                      <a:alpha val="43137"/>
-                    </a:srgbClr>
-                  </a:outerShdw>
-                </a:effectLst>
-              </a:rPr>
-              <a:t>Quanteda Universe</a:t>
-            </a:r>
-          </a:p>
-        </p:txBody>
-      </p:sp>
-      <p:sp>
-        <p:nvSpPr>
           <p:cNvPr id="4" name="Foliennummernplatzhalter 3"/>
           <p:cNvSpPr>
             <a:spLocks noGrp="1"/>
@@ -14405,10 +14428,3443 @@
           </a:p>
         </p:txBody>
       </p:sp>
+      <p:sp>
+        <p:nvSpPr>
+          <p:cNvPr id="9" name="Titel 1">
+            <a:extLst>
+              <a:ext uri="{FF2B5EF4-FFF2-40B4-BE49-F238E27FC236}">
+                <a16:creationId xmlns:a16="http://schemas.microsoft.com/office/drawing/2014/main" id="{7807725C-718A-4D77-AD01-05225CF68388}"/>
+              </a:ext>
+            </a:extLst>
+          </p:cNvPr>
+          <p:cNvSpPr>
+            <a:spLocks noGrp="1"/>
+          </p:cNvSpPr>
+          <p:nvPr>
+            <p:ph type="title"/>
+          </p:nvPr>
+        </p:nvSpPr>
+        <p:spPr>
+          <a:xfrm>
+            <a:off x="1066800" y="561524"/>
+            <a:ext cx="10287000" cy="1129164"/>
+          </a:xfrm>
+        </p:spPr>
+        <p:txBody>
+          <a:bodyPr/>
+          <a:lstStyle/>
+          <a:p>
+            <a:r>
+              <a:rPr lang="en-US"/>
+              <a:t>ML Pipeline  </a:t>
+            </a:r>
+            <a:r>
+              <a:rPr lang="en-US" b="1"/>
+              <a:t>Static vs Dynamic Features</a:t>
+            </a:r>
+          </a:p>
+        </p:txBody>
+      </p:sp>
+      <p:grpSp>
+        <p:nvGrpSpPr>
+          <p:cNvPr id="113" name="Group 112">
+            <a:extLst>
+              <a:ext uri="{FF2B5EF4-FFF2-40B4-BE49-F238E27FC236}">
+                <a16:creationId xmlns:a16="http://schemas.microsoft.com/office/drawing/2014/main" id="{F7771660-91D5-4EAC-B3B3-4CF5AC423CED}"/>
+              </a:ext>
+            </a:extLst>
+          </p:cNvPr>
+          <p:cNvGrpSpPr/>
+          <p:nvPr/>
+        </p:nvGrpSpPr>
+        <p:grpSpPr>
+          <a:xfrm>
+            <a:off x="1049498" y="1894097"/>
+            <a:ext cx="8736002" cy="4449390"/>
+            <a:chOff x="1049498" y="1894097"/>
+            <a:chExt cx="8736002" cy="4449390"/>
+          </a:xfrm>
+        </p:grpSpPr>
+        <p:sp>
+          <p:nvSpPr>
+            <p:cNvPr id="5" name="Rectangle 4">
+              <a:extLst>
+                <a:ext uri="{FF2B5EF4-FFF2-40B4-BE49-F238E27FC236}">
+                  <a16:creationId xmlns:a16="http://schemas.microsoft.com/office/drawing/2014/main" id="{DAA43031-635F-460A-9C5C-27815E1F80C6}"/>
+                </a:ext>
+              </a:extLst>
+            </p:cNvPr>
+            <p:cNvSpPr/>
+            <p:nvPr/>
+          </p:nvSpPr>
+          <p:spPr>
+            <a:xfrm>
+              <a:off x="1066800" y="1993392"/>
+              <a:ext cx="2116836" cy="1129164"/>
+            </a:xfrm>
+            <a:prstGeom prst="rect">
+              <a:avLst/>
+            </a:prstGeom>
+            <a:solidFill>
+              <a:srgbClr val="66CCFF"/>
+            </a:solidFill>
+            <a:ln>
+              <a:solidFill>
+                <a:srgbClr val="66CCFF"/>
+              </a:solidFill>
+            </a:ln>
+          </p:spPr>
+          <p:style>
+            <a:lnRef idx="2">
+              <a:schemeClr val="accent1">
+                <a:shade val="50000"/>
+              </a:schemeClr>
+            </a:lnRef>
+            <a:fillRef idx="1">
+              <a:schemeClr val="accent1"/>
+            </a:fillRef>
+            <a:effectRef idx="0">
+              <a:schemeClr val="accent1"/>
+            </a:effectRef>
+            <a:fontRef idx="minor">
+              <a:schemeClr val="lt1"/>
+            </a:fontRef>
+          </p:style>
+          <p:txBody>
+            <a:bodyPr rtlCol="0" anchor="ctr"/>
+            <a:lstStyle/>
+            <a:p>
+              <a:pPr algn="ctr"/>
+              <a:r>
+                <a:rPr lang="de-DE">
+                  <a:solidFill>
+                    <a:schemeClr val="bg1"/>
+                  </a:solidFill>
+                </a:rPr>
+                <a:t>Raw data</a:t>
+              </a:r>
+            </a:p>
+          </p:txBody>
+        </p:sp>
+        <p:sp>
+          <p:nvSpPr>
+            <p:cNvPr id="6" name="Arrow: Left 5">
+              <a:extLst>
+                <a:ext uri="{FF2B5EF4-FFF2-40B4-BE49-F238E27FC236}">
+                  <a16:creationId xmlns:a16="http://schemas.microsoft.com/office/drawing/2014/main" id="{6E856B95-0AB6-4244-965E-51159036BA2B}"/>
+                </a:ext>
+              </a:extLst>
+            </p:cNvPr>
+            <p:cNvSpPr/>
+            <p:nvPr/>
+          </p:nvSpPr>
+          <p:spPr>
+            <a:xfrm>
+              <a:off x="3199286" y="2403408"/>
+              <a:ext cx="1411224" cy="369332"/>
+            </a:xfrm>
+            <a:prstGeom prst="leftArrow">
+              <a:avLst>
+                <a:gd name="adj1" fmla="val 16038"/>
+                <a:gd name="adj2" fmla="val 66502"/>
+              </a:avLst>
+            </a:prstGeom>
+            <a:solidFill>
+              <a:srgbClr val="66CCFF"/>
+            </a:solidFill>
+            <a:ln>
+              <a:solidFill>
+                <a:srgbClr val="66CCFF"/>
+              </a:solidFill>
+            </a:ln>
+          </p:spPr>
+          <p:style>
+            <a:lnRef idx="2">
+              <a:schemeClr val="accent1">
+                <a:shade val="50000"/>
+              </a:schemeClr>
+            </a:lnRef>
+            <a:fillRef idx="1">
+              <a:schemeClr val="accent1"/>
+            </a:fillRef>
+            <a:effectRef idx="0">
+              <a:schemeClr val="accent1"/>
+            </a:effectRef>
+            <a:fontRef idx="minor">
+              <a:schemeClr val="lt1"/>
+            </a:fontRef>
+          </p:style>
+          <p:txBody>
+            <a:bodyPr rtlCol="0" anchor="ctr"/>
+            <a:lstStyle/>
+            <a:p>
+              <a:pPr algn="ctr"/>
+              <a:endParaRPr lang="en-US"/>
+            </a:p>
+          </p:txBody>
+        </p:sp>
+        <p:sp>
+          <p:nvSpPr>
+            <p:cNvPr id="15" name="TextBox 14">
+              <a:extLst>
+                <a:ext uri="{FF2B5EF4-FFF2-40B4-BE49-F238E27FC236}">
+                  <a16:creationId xmlns:a16="http://schemas.microsoft.com/office/drawing/2014/main" id="{CAE114F2-9732-4D44-883B-E0CA0CD2492C}"/>
+                </a:ext>
+              </a:extLst>
+            </p:cNvPr>
+            <p:cNvSpPr txBox="1"/>
+            <p:nvPr/>
+          </p:nvSpPr>
+          <p:spPr>
+            <a:xfrm>
+              <a:off x="5244085" y="4672616"/>
+              <a:ext cx="2404872" cy="369332"/>
+            </a:xfrm>
+            <a:prstGeom prst="rect">
+              <a:avLst/>
+            </a:prstGeom>
+            <a:noFill/>
+          </p:spPr>
+          <p:txBody>
+            <a:bodyPr wrap="square" rtlCol="0">
+              <a:spAutoFit/>
+            </a:bodyPr>
+            <a:lstStyle/>
+            <a:p>
+              <a:pPr algn="ctr"/>
+              <a:r>
+                <a:rPr lang="de-DE">
+                  <a:solidFill>
+                    <a:schemeClr val="bg1"/>
+                  </a:solidFill>
+                </a:rPr>
+                <a:t>Static features</a:t>
+              </a:r>
+              <a:endParaRPr lang="en-US" i="1">
+                <a:solidFill>
+                  <a:schemeClr val="bg1"/>
+                </a:solidFill>
+              </a:endParaRPr>
+            </a:p>
+          </p:txBody>
+        </p:sp>
+        <p:grpSp>
+          <p:nvGrpSpPr>
+            <p:cNvPr id="25" name="Group 24">
+              <a:extLst>
+                <a:ext uri="{FF2B5EF4-FFF2-40B4-BE49-F238E27FC236}">
+                  <a16:creationId xmlns:a16="http://schemas.microsoft.com/office/drawing/2014/main" id="{66491A44-0263-43BD-B173-6D131706A89F}"/>
+                </a:ext>
+              </a:extLst>
+            </p:cNvPr>
+            <p:cNvGrpSpPr/>
+            <p:nvPr/>
+          </p:nvGrpSpPr>
+          <p:grpSpPr>
+            <a:xfrm>
+              <a:off x="4609338" y="1988852"/>
+              <a:ext cx="1312164" cy="1129164"/>
+              <a:chOff x="4609338" y="1988852"/>
+              <a:chExt cx="1312164" cy="1403636"/>
+            </a:xfrm>
+            <a:solidFill>
+              <a:schemeClr val="bg2">
+                <a:lumMod val="90000"/>
+              </a:schemeClr>
+            </a:solidFill>
+          </p:grpSpPr>
+          <p:sp>
+            <p:nvSpPr>
+              <p:cNvPr id="14" name="Rectangle 13">
+                <a:extLst>
+                  <a:ext uri="{FF2B5EF4-FFF2-40B4-BE49-F238E27FC236}">
+                    <a16:creationId xmlns:a16="http://schemas.microsoft.com/office/drawing/2014/main" id="{482BC11B-5AB3-4C7D-B1B8-23FE57872E5F}"/>
+                  </a:ext>
+                </a:extLst>
+              </p:cNvPr>
+              <p:cNvSpPr/>
+              <p:nvPr/>
+            </p:nvSpPr>
+            <p:spPr>
+              <a:xfrm>
+                <a:off x="4609338" y="1993392"/>
+                <a:ext cx="1312164" cy="1399096"/>
+              </a:xfrm>
+              <a:prstGeom prst="rect">
+                <a:avLst/>
+              </a:prstGeom>
+              <a:grpFill/>
+              <a:ln>
+                <a:solidFill>
+                  <a:schemeClr val="bg2">
+                    <a:lumMod val="90000"/>
+                  </a:schemeClr>
+                </a:solidFill>
+              </a:ln>
+            </p:spPr>
+            <p:style>
+              <a:lnRef idx="2">
+                <a:schemeClr val="accent1">
+                  <a:shade val="50000"/>
+                </a:schemeClr>
+              </a:lnRef>
+              <a:fillRef idx="1">
+                <a:schemeClr val="accent1"/>
+              </a:fillRef>
+              <a:effectRef idx="0">
+                <a:schemeClr val="accent1"/>
+              </a:effectRef>
+              <a:fontRef idx="minor">
+                <a:schemeClr val="lt1"/>
+              </a:fontRef>
+            </p:style>
+            <p:txBody>
+              <a:bodyPr rtlCol="0" anchor="ctr"/>
+              <a:lstStyle/>
+              <a:p>
+                <a:pPr algn="ctr"/>
+                <a:endParaRPr lang="en-US" i="1">
+                  <a:solidFill>
+                    <a:schemeClr val="bg1"/>
+                  </a:solidFill>
+                </a:endParaRPr>
+              </a:p>
+            </p:txBody>
+          </p:sp>
+          <p:cxnSp>
+            <p:nvCxnSpPr>
+              <p:cNvPr id="19" name="Straight Connector 18">
+                <a:extLst>
+                  <a:ext uri="{FF2B5EF4-FFF2-40B4-BE49-F238E27FC236}">
+                    <a16:creationId xmlns:a16="http://schemas.microsoft.com/office/drawing/2014/main" id="{92FE8F05-5C9E-434C-A815-65AA450103A4}"/>
+                  </a:ext>
+                </a:extLst>
+              </p:cNvPr>
+              <p:cNvCxnSpPr>
+                <a:cxnSpLocks/>
+              </p:cNvCxnSpPr>
+              <p:nvPr/>
+            </p:nvCxnSpPr>
+            <p:spPr>
+              <a:xfrm>
+                <a:off x="4930902" y="1993392"/>
+                <a:ext cx="0" cy="1399096"/>
+              </a:xfrm>
+              <a:prstGeom prst="line">
+                <a:avLst/>
+              </a:prstGeom>
+              <a:grpFill/>
+              <a:ln>
+                <a:solidFill>
+                  <a:schemeClr val="bg2">
+                    <a:lumMod val="75000"/>
+                  </a:schemeClr>
+                </a:solidFill>
+              </a:ln>
+            </p:spPr>
+            <p:style>
+              <a:lnRef idx="1">
+                <a:schemeClr val="accent1"/>
+              </a:lnRef>
+              <a:fillRef idx="0">
+                <a:schemeClr val="accent1"/>
+              </a:fillRef>
+              <a:effectRef idx="0">
+                <a:schemeClr val="accent1"/>
+              </a:effectRef>
+              <a:fontRef idx="minor">
+                <a:schemeClr val="tx1"/>
+              </a:fontRef>
+            </p:style>
+          </p:cxnSp>
+          <p:cxnSp>
+            <p:nvCxnSpPr>
+              <p:cNvPr id="20" name="Straight Connector 19">
+                <a:extLst>
+                  <a:ext uri="{FF2B5EF4-FFF2-40B4-BE49-F238E27FC236}">
+                    <a16:creationId xmlns:a16="http://schemas.microsoft.com/office/drawing/2014/main" id="{E46FA5E8-6413-4857-B5CC-98E603955F38}"/>
+                  </a:ext>
+                </a:extLst>
+              </p:cNvPr>
+              <p:cNvCxnSpPr>
+                <a:cxnSpLocks/>
+              </p:cNvCxnSpPr>
+              <p:nvPr/>
+            </p:nvCxnSpPr>
+            <p:spPr>
+              <a:xfrm>
+                <a:off x="5604510" y="1988852"/>
+                <a:ext cx="0" cy="1399096"/>
+              </a:xfrm>
+              <a:prstGeom prst="line">
+                <a:avLst/>
+              </a:prstGeom>
+              <a:grpFill/>
+              <a:ln>
+                <a:solidFill>
+                  <a:schemeClr val="bg2">
+                    <a:lumMod val="75000"/>
+                  </a:schemeClr>
+                </a:solidFill>
+              </a:ln>
+            </p:spPr>
+            <p:style>
+              <a:lnRef idx="1">
+                <a:schemeClr val="accent1"/>
+              </a:lnRef>
+              <a:fillRef idx="0">
+                <a:schemeClr val="accent1"/>
+              </a:fillRef>
+              <a:effectRef idx="0">
+                <a:schemeClr val="accent1"/>
+              </a:effectRef>
+              <a:fontRef idx="minor">
+                <a:schemeClr val="tx1"/>
+              </a:fontRef>
+            </p:style>
+          </p:cxnSp>
+          <p:cxnSp>
+            <p:nvCxnSpPr>
+              <p:cNvPr id="21" name="Straight Connector 20">
+                <a:extLst>
+                  <a:ext uri="{FF2B5EF4-FFF2-40B4-BE49-F238E27FC236}">
+                    <a16:creationId xmlns:a16="http://schemas.microsoft.com/office/drawing/2014/main" id="{5729BA14-B416-4FD2-AB50-068E338037D4}"/>
+                  </a:ext>
+                </a:extLst>
+              </p:cNvPr>
+              <p:cNvCxnSpPr>
+                <a:cxnSpLocks/>
+              </p:cNvCxnSpPr>
+              <p:nvPr/>
+            </p:nvCxnSpPr>
+            <p:spPr>
+              <a:xfrm>
+                <a:off x="5279898" y="1993392"/>
+                <a:ext cx="0" cy="1399096"/>
+              </a:xfrm>
+              <a:prstGeom prst="line">
+                <a:avLst/>
+              </a:prstGeom>
+              <a:grpFill/>
+              <a:ln>
+                <a:solidFill>
+                  <a:schemeClr val="bg2">
+                    <a:lumMod val="75000"/>
+                  </a:schemeClr>
+                </a:solidFill>
+              </a:ln>
+            </p:spPr>
+            <p:style>
+              <a:lnRef idx="1">
+                <a:schemeClr val="accent1"/>
+              </a:lnRef>
+              <a:fillRef idx="0">
+                <a:schemeClr val="accent1"/>
+              </a:fillRef>
+              <a:effectRef idx="0">
+                <a:schemeClr val="accent1"/>
+              </a:effectRef>
+              <a:fontRef idx="minor">
+                <a:schemeClr val="tx1"/>
+              </a:fontRef>
+            </p:style>
+          </p:cxnSp>
+        </p:grpSp>
+        <p:pic>
+          <p:nvPicPr>
+            <p:cNvPr id="8" name="Graphic 7" descr="Single gear with solid fill">
+              <a:extLst>
+                <a:ext uri="{FF2B5EF4-FFF2-40B4-BE49-F238E27FC236}">
+                  <a16:creationId xmlns:a16="http://schemas.microsoft.com/office/drawing/2014/main" id="{BA140A05-CC1E-416D-BF94-A3CD37F5D6B1}"/>
+                </a:ext>
+              </a:extLst>
+            </p:cNvPr>
+            <p:cNvPicPr>
+              <a:picLocks noChangeAspect="1"/>
+            </p:cNvPicPr>
+            <p:nvPr/>
+          </p:nvPicPr>
+          <p:blipFill>
+            <a:blip r:embed="rId3">
+              <a:extLst>
+                <a:ext uri="{28A0092B-C50C-407E-A947-70E740481C1C}">
+                  <a14:useLocalDpi xmlns:a14="http://schemas.microsoft.com/office/drawing/2010/main" val="0"/>
+                </a:ext>
+                <a:ext uri="{96DAC541-7B7A-43D3-8B79-37D633B846F1}">
+                  <asvg:svgBlip xmlns:asvg="http://schemas.microsoft.com/office/drawing/2016/SVG/main" r:embed="rId4"/>
+                </a:ext>
+              </a:extLst>
+            </a:blip>
+            <a:stretch>
+              <a:fillRect/>
+            </a:stretch>
+          </p:blipFill>
+          <p:spPr>
+            <a:xfrm>
+              <a:off x="5546062" y="1894097"/>
+              <a:ext cx="743963" cy="743963"/>
+            </a:xfrm>
+            <a:prstGeom prst="rect">
+              <a:avLst/>
+            </a:prstGeom>
+          </p:spPr>
+        </p:pic>
+        <p:sp>
+          <p:nvSpPr>
+            <p:cNvPr id="26" name="Rectangle 25">
+              <a:extLst>
+                <a:ext uri="{FF2B5EF4-FFF2-40B4-BE49-F238E27FC236}">
+                  <a16:creationId xmlns:a16="http://schemas.microsoft.com/office/drawing/2014/main" id="{68B15FF8-7972-42A8-B1E7-EBBF25FFD941}"/>
+                </a:ext>
+              </a:extLst>
+            </p:cNvPr>
+            <p:cNvSpPr/>
+            <p:nvPr/>
+          </p:nvSpPr>
+          <p:spPr>
+            <a:xfrm>
+              <a:off x="3192609" y="3785615"/>
+              <a:ext cx="2079778" cy="324000"/>
+            </a:xfrm>
+            <a:prstGeom prst="rect">
+              <a:avLst/>
+            </a:prstGeom>
+            <a:solidFill>
+              <a:schemeClr val="bg2"/>
+            </a:solidFill>
+            <a:ln>
+              <a:solidFill>
+                <a:schemeClr val="bg2"/>
+              </a:solidFill>
+            </a:ln>
+          </p:spPr>
+          <p:style>
+            <a:lnRef idx="2">
+              <a:schemeClr val="accent1">
+                <a:shade val="50000"/>
+              </a:schemeClr>
+            </a:lnRef>
+            <a:fillRef idx="1">
+              <a:schemeClr val="accent1"/>
+            </a:fillRef>
+            <a:effectRef idx="0">
+              <a:schemeClr val="accent1"/>
+            </a:effectRef>
+            <a:fontRef idx="minor">
+              <a:schemeClr val="lt1"/>
+            </a:fontRef>
+          </p:style>
+          <p:txBody>
+            <a:bodyPr rtlCol="0" anchor="ctr"/>
+            <a:lstStyle/>
+            <a:p>
+              <a:pPr algn="ctr"/>
+              <a:endParaRPr lang="en-US" i="1">
+                <a:solidFill>
+                  <a:sysClr val="windowText" lastClr="000000"/>
+                </a:solidFill>
+              </a:endParaRPr>
+            </a:p>
+          </p:txBody>
+        </p:sp>
+        <p:sp>
+          <p:nvSpPr>
+            <p:cNvPr id="27" name="Rectangle 26">
+              <a:extLst>
+                <a:ext uri="{FF2B5EF4-FFF2-40B4-BE49-F238E27FC236}">
+                  <a16:creationId xmlns:a16="http://schemas.microsoft.com/office/drawing/2014/main" id="{2F455D97-AC28-43DF-B750-C641D5173C47}"/>
+                </a:ext>
+              </a:extLst>
+            </p:cNvPr>
+            <p:cNvSpPr/>
+            <p:nvPr/>
+          </p:nvSpPr>
+          <p:spPr>
+            <a:xfrm>
+              <a:off x="3194662" y="4193961"/>
+              <a:ext cx="2085236" cy="324000"/>
+            </a:xfrm>
+            <a:prstGeom prst="rect">
+              <a:avLst/>
+            </a:prstGeom>
+            <a:solidFill>
+              <a:schemeClr val="bg2"/>
+            </a:solidFill>
+            <a:ln>
+              <a:solidFill>
+                <a:schemeClr val="bg2"/>
+              </a:solidFill>
+            </a:ln>
+          </p:spPr>
+          <p:style>
+            <a:lnRef idx="2">
+              <a:schemeClr val="accent1">
+                <a:shade val="50000"/>
+              </a:schemeClr>
+            </a:lnRef>
+            <a:fillRef idx="1">
+              <a:schemeClr val="accent1"/>
+            </a:fillRef>
+            <a:effectRef idx="0">
+              <a:schemeClr val="accent1"/>
+            </a:effectRef>
+            <a:fontRef idx="minor">
+              <a:schemeClr val="lt1"/>
+            </a:fontRef>
+          </p:style>
+          <p:txBody>
+            <a:bodyPr rtlCol="0" anchor="ctr"/>
+            <a:lstStyle/>
+            <a:p>
+              <a:pPr algn="ctr"/>
+              <a:endParaRPr lang="en-US" i="1">
+                <a:solidFill>
+                  <a:sysClr val="windowText" lastClr="000000"/>
+                </a:solidFill>
+              </a:endParaRPr>
+            </a:p>
+          </p:txBody>
+        </p:sp>
+        <p:sp>
+          <p:nvSpPr>
+            <p:cNvPr id="28" name="Rectangle 27">
+              <a:extLst>
+                <a:ext uri="{FF2B5EF4-FFF2-40B4-BE49-F238E27FC236}">
+                  <a16:creationId xmlns:a16="http://schemas.microsoft.com/office/drawing/2014/main" id="{9BF245DA-214D-46BF-8D09-8492A4C655AE}"/>
+                </a:ext>
+              </a:extLst>
+            </p:cNvPr>
+            <p:cNvSpPr/>
+            <p:nvPr/>
+          </p:nvSpPr>
+          <p:spPr>
+            <a:xfrm>
+              <a:off x="3194662" y="3383312"/>
+              <a:ext cx="2085235" cy="324000"/>
+            </a:xfrm>
+            <a:prstGeom prst="rect">
+              <a:avLst/>
+            </a:prstGeom>
+            <a:solidFill>
+              <a:schemeClr val="bg2"/>
+            </a:solidFill>
+            <a:ln>
+              <a:solidFill>
+                <a:schemeClr val="bg2"/>
+              </a:solidFill>
+            </a:ln>
+          </p:spPr>
+          <p:style>
+            <a:lnRef idx="2">
+              <a:schemeClr val="accent1">
+                <a:shade val="50000"/>
+              </a:schemeClr>
+            </a:lnRef>
+            <a:fillRef idx="1">
+              <a:schemeClr val="accent1"/>
+            </a:fillRef>
+            <a:effectRef idx="0">
+              <a:schemeClr val="accent1"/>
+            </a:effectRef>
+            <a:fontRef idx="minor">
+              <a:schemeClr val="lt1"/>
+            </a:fontRef>
+          </p:style>
+          <p:txBody>
+            <a:bodyPr rtlCol="0" anchor="ctr"/>
+            <a:lstStyle/>
+            <a:p>
+              <a:pPr algn="ctr"/>
+              <a:endParaRPr lang="en-US" i="1">
+                <a:solidFill>
+                  <a:sysClr val="windowText" lastClr="000000"/>
+                </a:solidFill>
+              </a:endParaRPr>
+            </a:p>
+          </p:txBody>
+        </p:sp>
+        <p:sp>
+          <p:nvSpPr>
+            <p:cNvPr id="31" name="Arrow: Left 30">
+              <a:extLst>
+                <a:ext uri="{FF2B5EF4-FFF2-40B4-BE49-F238E27FC236}">
+                  <a16:creationId xmlns:a16="http://schemas.microsoft.com/office/drawing/2014/main" id="{26B0B156-65E4-404D-A9E3-A1C20E01743D}"/>
+                </a:ext>
+              </a:extLst>
+            </p:cNvPr>
+            <p:cNvSpPr/>
+            <p:nvPr/>
+          </p:nvSpPr>
+          <p:spPr>
+            <a:xfrm flipH="1">
+              <a:off x="1679449" y="3780509"/>
+              <a:ext cx="1498091" cy="369332"/>
+            </a:xfrm>
+            <a:prstGeom prst="leftArrow">
+              <a:avLst>
+                <a:gd name="adj1" fmla="val 16038"/>
+                <a:gd name="adj2" fmla="val 66502"/>
+              </a:avLst>
+            </a:prstGeom>
+            <a:solidFill>
+              <a:srgbClr val="66CCFF"/>
+            </a:solidFill>
+            <a:ln>
+              <a:solidFill>
+                <a:srgbClr val="66CCFF"/>
+              </a:solidFill>
+            </a:ln>
+          </p:spPr>
+          <p:style>
+            <a:lnRef idx="2">
+              <a:schemeClr val="accent1">
+                <a:shade val="50000"/>
+              </a:schemeClr>
+            </a:lnRef>
+            <a:fillRef idx="1">
+              <a:schemeClr val="accent1"/>
+            </a:fillRef>
+            <a:effectRef idx="0">
+              <a:schemeClr val="accent1"/>
+            </a:effectRef>
+            <a:fontRef idx="minor">
+              <a:schemeClr val="lt1"/>
+            </a:fontRef>
+          </p:style>
+          <p:txBody>
+            <a:bodyPr rtlCol="0" anchor="ctr"/>
+            <a:lstStyle/>
+            <a:p>
+              <a:pPr algn="ctr"/>
+              <a:endParaRPr lang="en-US"/>
+            </a:p>
+          </p:txBody>
+        </p:sp>
+        <p:sp>
+          <p:nvSpPr>
+            <p:cNvPr id="32" name="Arrow: Left 31">
+              <a:extLst>
+                <a:ext uri="{FF2B5EF4-FFF2-40B4-BE49-F238E27FC236}">
+                  <a16:creationId xmlns:a16="http://schemas.microsoft.com/office/drawing/2014/main" id="{0C7B9DEE-A9F0-4E80-90A6-FFA732DB4F96}"/>
+                </a:ext>
+              </a:extLst>
+            </p:cNvPr>
+            <p:cNvSpPr/>
+            <p:nvPr/>
+          </p:nvSpPr>
+          <p:spPr>
+            <a:xfrm rot="5400000" flipH="1">
+              <a:off x="1136905" y="3475893"/>
+              <a:ext cx="1085087" cy="369332"/>
+            </a:xfrm>
+            <a:prstGeom prst="leftArrow">
+              <a:avLst>
+                <a:gd name="adj1" fmla="val 16038"/>
+                <a:gd name="adj2" fmla="val 66502"/>
+              </a:avLst>
+            </a:prstGeom>
+            <a:solidFill>
+              <a:srgbClr val="66CCFF"/>
+            </a:solidFill>
+            <a:ln>
+              <a:solidFill>
+                <a:srgbClr val="66CCFF"/>
+              </a:solidFill>
+            </a:ln>
+          </p:spPr>
+          <p:style>
+            <a:lnRef idx="2">
+              <a:schemeClr val="accent1">
+                <a:shade val="50000"/>
+              </a:schemeClr>
+            </a:lnRef>
+            <a:fillRef idx="1">
+              <a:schemeClr val="accent1"/>
+            </a:fillRef>
+            <a:effectRef idx="0">
+              <a:schemeClr val="accent1"/>
+            </a:effectRef>
+            <a:fontRef idx="minor">
+              <a:schemeClr val="lt1"/>
+            </a:fontRef>
+          </p:style>
+          <p:txBody>
+            <a:bodyPr rtlCol="0" anchor="ctr"/>
+            <a:lstStyle/>
+            <a:p>
+              <a:pPr algn="ctr"/>
+              <a:endParaRPr lang="en-US"/>
+            </a:p>
+          </p:txBody>
+        </p:sp>
+        <p:sp>
+          <p:nvSpPr>
+            <p:cNvPr id="29" name="Cloud 28">
+              <a:extLst>
+                <a:ext uri="{FF2B5EF4-FFF2-40B4-BE49-F238E27FC236}">
+                  <a16:creationId xmlns:a16="http://schemas.microsoft.com/office/drawing/2014/main" id="{6468380E-1F73-471F-839B-8DEE7E4519B3}"/>
+                </a:ext>
+              </a:extLst>
+            </p:cNvPr>
+            <p:cNvSpPr/>
+            <p:nvPr/>
+          </p:nvSpPr>
+          <p:spPr>
+            <a:xfrm>
+              <a:off x="1068202" y="3403649"/>
+              <a:ext cx="1683361" cy="1108576"/>
+            </a:xfrm>
+            <a:prstGeom prst="cloud">
+              <a:avLst/>
+            </a:prstGeom>
+            <a:solidFill>
+              <a:schemeClr val="accent3"/>
+            </a:solidFill>
+            <a:ln>
+              <a:solidFill>
+                <a:schemeClr val="accent3"/>
+              </a:solidFill>
+            </a:ln>
+          </p:spPr>
+          <p:style>
+            <a:lnRef idx="2">
+              <a:schemeClr val="accent1">
+                <a:shade val="50000"/>
+              </a:schemeClr>
+            </a:lnRef>
+            <a:fillRef idx="1">
+              <a:schemeClr val="accent1"/>
+            </a:fillRef>
+            <a:effectRef idx="0">
+              <a:schemeClr val="accent1"/>
+            </a:effectRef>
+            <a:fontRef idx="minor">
+              <a:schemeClr val="lt1"/>
+            </a:fontRef>
+          </p:style>
+          <p:txBody>
+            <a:bodyPr rtlCol="0" anchor="ctr"/>
+            <a:lstStyle/>
+            <a:p>
+              <a:pPr algn="ctr"/>
+              <a:endParaRPr lang="en-US"/>
+            </a:p>
+          </p:txBody>
+        </p:sp>
+        <p:pic>
+          <p:nvPicPr>
+            <p:cNvPr id="30" name="Graphic 29" descr="Single gear with solid fill">
+              <a:extLst>
+                <a:ext uri="{FF2B5EF4-FFF2-40B4-BE49-F238E27FC236}">
+                  <a16:creationId xmlns:a16="http://schemas.microsoft.com/office/drawing/2014/main" id="{41A304CE-5DA5-4B88-8815-7DABBEC2DD7E}"/>
+                </a:ext>
+              </a:extLst>
+            </p:cNvPr>
+            <p:cNvPicPr>
+              <a:picLocks noChangeAspect="1"/>
+            </p:cNvPicPr>
+            <p:nvPr/>
+          </p:nvPicPr>
+          <p:blipFill>
+            <a:blip r:embed="rId3">
+              <a:extLst>
+                <a:ext uri="{28A0092B-C50C-407E-A947-70E740481C1C}">
+                  <a14:useLocalDpi xmlns:a14="http://schemas.microsoft.com/office/drawing/2010/main" val="0"/>
+                </a:ext>
+                <a:ext uri="{96DAC541-7B7A-43D3-8B79-37D633B846F1}">
+                  <asvg:svgBlip xmlns:asvg="http://schemas.microsoft.com/office/drawing/2016/SVG/main" r:embed="rId4"/>
+                </a:ext>
+              </a:extLst>
+            </a:blip>
+            <a:stretch>
+              <a:fillRect/>
+            </a:stretch>
+          </p:blipFill>
+          <p:spPr>
+            <a:xfrm>
+              <a:off x="2071162" y="3042391"/>
+              <a:ext cx="914400" cy="914400"/>
+            </a:xfrm>
+            <a:prstGeom prst="rect">
+              <a:avLst/>
+            </a:prstGeom>
+          </p:spPr>
+        </p:pic>
+        <p:sp>
+          <p:nvSpPr>
+            <p:cNvPr id="33" name="Speech Bubble: Rectangle 32">
+              <a:extLst>
+                <a:ext uri="{FF2B5EF4-FFF2-40B4-BE49-F238E27FC236}">
+                  <a16:creationId xmlns:a16="http://schemas.microsoft.com/office/drawing/2014/main" id="{51BA0328-BB74-4231-B5F3-D25541364664}"/>
+                </a:ext>
+              </a:extLst>
+            </p:cNvPr>
+            <p:cNvSpPr/>
+            <p:nvPr/>
+          </p:nvSpPr>
+          <p:spPr>
+            <a:xfrm>
+              <a:off x="1049498" y="3735445"/>
+              <a:ext cx="1723325" cy="444501"/>
+            </a:xfrm>
+            <a:prstGeom prst="wedgeRectCallout">
+              <a:avLst>
+                <a:gd name="adj1" fmla="val -60500"/>
+                <a:gd name="adj2" fmla="val -7955"/>
+              </a:avLst>
+            </a:prstGeom>
+            <a:noFill/>
+            <a:ln>
+              <a:noFill/>
+            </a:ln>
+          </p:spPr>
+          <p:style>
+            <a:lnRef idx="2">
+              <a:schemeClr val="accent1">
+                <a:shade val="50000"/>
+              </a:schemeClr>
+            </a:lnRef>
+            <a:fillRef idx="1">
+              <a:schemeClr val="accent1"/>
+            </a:fillRef>
+            <a:effectRef idx="0">
+              <a:schemeClr val="accent1"/>
+            </a:effectRef>
+            <a:fontRef idx="minor">
+              <a:schemeClr val="lt1"/>
+            </a:fontRef>
+          </p:style>
+          <p:txBody>
+            <a:bodyPr rtlCol="0" anchor="ctr"/>
+            <a:lstStyle/>
+            <a:p>
+              <a:pPr algn="ctr"/>
+              <a:r>
+                <a:rPr lang="de-DE" i="1">
+                  <a:solidFill>
+                    <a:schemeClr val="bg1"/>
+                  </a:solidFill>
+                </a:rPr>
+                <a:t>topic modeling</a:t>
+              </a:r>
+              <a:endParaRPr lang="en-US" i="1">
+                <a:solidFill>
+                  <a:schemeClr val="bg1"/>
+                </a:solidFill>
+              </a:endParaRPr>
+            </a:p>
+          </p:txBody>
+        </p:sp>
+        <p:sp>
+          <p:nvSpPr>
+            <p:cNvPr id="34" name="Speech Bubble: Rectangle 33">
+              <a:extLst>
+                <a:ext uri="{FF2B5EF4-FFF2-40B4-BE49-F238E27FC236}">
+                  <a16:creationId xmlns:a16="http://schemas.microsoft.com/office/drawing/2014/main" id="{2A20C51C-D43C-4D3E-ACE1-CB2ADBDDFE73}"/>
+                </a:ext>
+              </a:extLst>
+            </p:cNvPr>
+            <p:cNvSpPr/>
+            <p:nvPr/>
+          </p:nvSpPr>
+          <p:spPr>
+            <a:xfrm>
+              <a:off x="5918044" y="2625201"/>
+              <a:ext cx="1769351" cy="534103"/>
+            </a:xfrm>
+            <a:prstGeom prst="wedgeRectCallout">
+              <a:avLst>
+                <a:gd name="adj1" fmla="val -60500"/>
+                <a:gd name="adj2" fmla="val -7955"/>
+              </a:avLst>
+            </a:prstGeom>
+            <a:noFill/>
+            <a:ln>
+              <a:noFill/>
+            </a:ln>
+          </p:spPr>
+          <p:style>
+            <a:lnRef idx="2">
+              <a:schemeClr val="accent1">
+                <a:shade val="50000"/>
+              </a:schemeClr>
+            </a:lnRef>
+            <a:fillRef idx="1">
+              <a:schemeClr val="accent1"/>
+            </a:fillRef>
+            <a:effectRef idx="0">
+              <a:schemeClr val="accent1"/>
+            </a:effectRef>
+            <a:fontRef idx="minor">
+              <a:schemeClr val="lt1"/>
+            </a:fontRef>
+          </p:style>
+          <p:txBody>
+            <a:bodyPr rtlCol="0" anchor="ctr"/>
+            <a:lstStyle/>
+            <a:p>
+              <a:r>
+                <a:rPr lang="de-DE" i="1">
+                  <a:solidFill>
+                    <a:schemeClr val="tx1"/>
+                  </a:solidFill>
+                </a:rPr>
+                <a:t>static feature extraction</a:t>
+              </a:r>
+              <a:endParaRPr lang="en-US" i="1">
+                <a:solidFill>
+                  <a:schemeClr val="tx1"/>
+                </a:solidFill>
+              </a:endParaRPr>
+            </a:p>
+          </p:txBody>
+        </p:sp>
+        <p:sp>
+          <p:nvSpPr>
+            <p:cNvPr id="35" name="Arrow: Left 34">
+              <a:extLst>
+                <a:ext uri="{FF2B5EF4-FFF2-40B4-BE49-F238E27FC236}">
+                  <a16:creationId xmlns:a16="http://schemas.microsoft.com/office/drawing/2014/main" id="{4EEAA237-43EF-4CCC-B987-3115210F7679}"/>
+                </a:ext>
+              </a:extLst>
+            </p:cNvPr>
+            <p:cNvSpPr/>
+            <p:nvPr/>
+          </p:nvSpPr>
+          <p:spPr>
+            <a:xfrm flipH="1">
+              <a:off x="5274559" y="3787882"/>
+              <a:ext cx="2717580" cy="369332"/>
+            </a:xfrm>
+            <a:prstGeom prst="leftArrow">
+              <a:avLst>
+                <a:gd name="adj1" fmla="val 16038"/>
+                <a:gd name="adj2" fmla="val 66502"/>
+              </a:avLst>
+            </a:prstGeom>
+            <a:solidFill>
+              <a:srgbClr val="66CCFF"/>
+            </a:solidFill>
+            <a:ln>
+              <a:solidFill>
+                <a:srgbClr val="66CCFF"/>
+              </a:solidFill>
+            </a:ln>
+          </p:spPr>
+          <p:style>
+            <a:lnRef idx="2">
+              <a:schemeClr val="accent1">
+                <a:shade val="50000"/>
+              </a:schemeClr>
+            </a:lnRef>
+            <a:fillRef idx="1">
+              <a:schemeClr val="accent1"/>
+            </a:fillRef>
+            <a:effectRef idx="0">
+              <a:schemeClr val="accent1"/>
+            </a:effectRef>
+            <a:fontRef idx="minor">
+              <a:schemeClr val="lt1"/>
+            </a:fontRef>
+          </p:style>
+          <p:txBody>
+            <a:bodyPr rtlCol="0" anchor="ctr"/>
+            <a:lstStyle/>
+            <a:p>
+              <a:pPr algn="ctr"/>
+              <a:endParaRPr lang="en-US"/>
+            </a:p>
+          </p:txBody>
+        </p:sp>
+        <p:sp>
+          <p:nvSpPr>
+            <p:cNvPr id="36" name="Cloud 35">
+              <a:extLst>
+                <a:ext uri="{FF2B5EF4-FFF2-40B4-BE49-F238E27FC236}">
+                  <a16:creationId xmlns:a16="http://schemas.microsoft.com/office/drawing/2014/main" id="{3743F7B5-FDA6-4910-9161-9FDC901A0FAA}"/>
+                </a:ext>
+              </a:extLst>
+            </p:cNvPr>
+            <p:cNvSpPr/>
+            <p:nvPr/>
+          </p:nvSpPr>
+          <p:spPr>
+            <a:xfrm>
+              <a:off x="5710429" y="3402976"/>
+              <a:ext cx="1683361" cy="1109249"/>
+            </a:xfrm>
+            <a:prstGeom prst="cloud">
+              <a:avLst/>
+            </a:prstGeom>
+            <a:solidFill>
+              <a:schemeClr val="accent3"/>
+            </a:solidFill>
+            <a:ln>
+              <a:solidFill>
+                <a:schemeClr val="accent3"/>
+              </a:solidFill>
+            </a:ln>
+          </p:spPr>
+          <p:style>
+            <a:lnRef idx="2">
+              <a:schemeClr val="accent1">
+                <a:shade val="50000"/>
+              </a:schemeClr>
+            </a:lnRef>
+            <a:fillRef idx="1">
+              <a:schemeClr val="accent1"/>
+            </a:fillRef>
+            <a:effectRef idx="0">
+              <a:schemeClr val="accent1"/>
+            </a:effectRef>
+            <a:fontRef idx="minor">
+              <a:schemeClr val="lt1"/>
+            </a:fontRef>
+          </p:style>
+          <p:txBody>
+            <a:bodyPr rtlCol="0" anchor="ctr"/>
+            <a:lstStyle/>
+            <a:p>
+              <a:pPr algn="ctr"/>
+              <a:endParaRPr lang="en-US"/>
+            </a:p>
+          </p:txBody>
+        </p:sp>
+        <p:sp>
+          <p:nvSpPr>
+            <p:cNvPr id="37" name="Speech Bubble: Rectangle 36">
+              <a:extLst>
+                <a:ext uri="{FF2B5EF4-FFF2-40B4-BE49-F238E27FC236}">
+                  <a16:creationId xmlns:a16="http://schemas.microsoft.com/office/drawing/2014/main" id="{70940FC4-0ECA-4CA9-A9C9-99A20FEECEF9}"/>
+                </a:ext>
+              </a:extLst>
+            </p:cNvPr>
+            <p:cNvSpPr/>
+            <p:nvPr/>
+          </p:nvSpPr>
+          <p:spPr>
+            <a:xfrm>
+              <a:off x="5686741" y="3735445"/>
+              <a:ext cx="1723325" cy="444501"/>
+            </a:xfrm>
+            <a:prstGeom prst="wedgeRectCallout">
+              <a:avLst>
+                <a:gd name="adj1" fmla="val -60500"/>
+                <a:gd name="adj2" fmla="val -7955"/>
+              </a:avLst>
+            </a:prstGeom>
+            <a:noFill/>
+            <a:ln>
+              <a:noFill/>
+            </a:ln>
+          </p:spPr>
+          <p:style>
+            <a:lnRef idx="2">
+              <a:schemeClr val="accent1">
+                <a:shade val="50000"/>
+              </a:schemeClr>
+            </a:lnRef>
+            <a:fillRef idx="1">
+              <a:schemeClr val="accent1"/>
+            </a:fillRef>
+            <a:effectRef idx="0">
+              <a:schemeClr val="accent1"/>
+            </a:effectRef>
+            <a:fontRef idx="minor">
+              <a:schemeClr val="lt1"/>
+            </a:fontRef>
+          </p:style>
+          <p:txBody>
+            <a:bodyPr rtlCol="0" anchor="ctr"/>
+            <a:lstStyle/>
+            <a:p>
+              <a:pPr algn="ctr"/>
+              <a:r>
+                <a:rPr lang="de-DE" i="1">
+                  <a:solidFill>
+                    <a:schemeClr val="bg1"/>
+                  </a:solidFill>
+                </a:rPr>
+                <a:t>embeddings</a:t>
+              </a:r>
+              <a:endParaRPr lang="en-US" i="1">
+                <a:solidFill>
+                  <a:schemeClr val="bg1"/>
+                </a:solidFill>
+              </a:endParaRPr>
+            </a:p>
+          </p:txBody>
+        </p:sp>
+        <p:pic>
+          <p:nvPicPr>
+            <p:cNvPr id="53" name="Graphic 52" descr="Single gear with solid fill">
+              <a:extLst>
+                <a:ext uri="{FF2B5EF4-FFF2-40B4-BE49-F238E27FC236}">
+                  <a16:creationId xmlns:a16="http://schemas.microsoft.com/office/drawing/2014/main" id="{657BECE2-F856-4A6E-9009-AA514228E59E}"/>
+                </a:ext>
+              </a:extLst>
+            </p:cNvPr>
+            <p:cNvPicPr>
+              <a:picLocks noChangeAspect="1"/>
+            </p:cNvPicPr>
+            <p:nvPr/>
+          </p:nvPicPr>
+          <p:blipFill>
+            <a:blip r:embed="rId3">
+              <a:extLst>
+                <a:ext uri="{28A0092B-C50C-407E-A947-70E740481C1C}">
+                  <a14:useLocalDpi xmlns:a14="http://schemas.microsoft.com/office/drawing/2010/main" val="0"/>
+                </a:ext>
+                <a:ext uri="{96DAC541-7B7A-43D3-8B79-37D633B846F1}">
+                  <asvg:svgBlip xmlns:asvg="http://schemas.microsoft.com/office/drawing/2016/SVG/main" r:embed="rId4"/>
+                </a:ext>
+              </a:extLst>
+            </a:blip>
+            <a:stretch>
+              <a:fillRect/>
+            </a:stretch>
+          </p:blipFill>
+          <p:spPr>
+            <a:xfrm>
+              <a:off x="6874354" y="3039639"/>
+              <a:ext cx="914400" cy="914400"/>
+            </a:xfrm>
+            <a:prstGeom prst="rect">
+              <a:avLst/>
+            </a:prstGeom>
+          </p:spPr>
+        </p:pic>
+        <p:grpSp>
+          <p:nvGrpSpPr>
+            <p:cNvPr id="64" name="Group 63">
+              <a:extLst>
+                <a:ext uri="{FF2B5EF4-FFF2-40B4-BE49-F238E27FC236}">
+                  <a16:creationId xmlns:a16="http://schemas.microsoft.com/office/drawing/2014/main" id="{5A731928-CC9E-49E8-9C21-415C61B6BBB9}"/>
+                </a:ext>
+              </a:extLst>
+            </p:cNvPr>
+            <p:cNvGrpSpPr/>
+            <p:nvPr/>
+          </p:nvGrpSpPr>
+          <p:grpSpPr>
+            <a:xfrm>
+              <a:off x="1066800" y="5187125"/>
+              <a:ext cx="1312164" cy="1109352"/>
+              <a:chOff x="4609338" y="1988852"/>
+              <a:chExt cx="1312164" cy="1403636"/>
+            </a:xfrm>
+            <a:solidFill>
+              <a:schemeClr val="bg2">
+                <a:lumMod val="90000"/>
+              </a:schemeClr>
+            </a:solidFill>
+          </p:grpSpPr>
+          <p:sp>
+            <p:nvSpPr>
+              <p:cNvPr id="65" name="Rectangle 64">
+                <a:extLst>
+                  <a:ext uri="{FF2B5EF4-FFF2-40B4-BE49-F238E27FC236}">
+                    <a16:creationId xmlns:a16="http://schemas.microsoft.com/office/drawing/2014/main" id="{D488622E-9B4E-45B2-892F-08EDA0FD76D2}"/>
+                  </a:ext>
+                </a:extLst>
+              </p:cNvPr>
+              <p:cNvSpPr/>
+              <p:nvPr/>
+            </p:nvSpPr>
+            <p:spPr>
+              <a:xfrm>
+                <a:off x="4609338" y="1993392"/>
+                <a:ext cx="1312164" cy="1399096"/>
+              </a:xfrm>
+              <a:prstGeom prst="rect">
+                <a:avLst/>
+              </a:prstGeom>
+              <a:grpFill/>
+              <a:ln>
+                <a:solidFill>
+                  <a:schemeClr val="bg2">
+                    <a:lumMod val="90000"/>
+                  </a:schemeClr>
+                </a:solidFill>
+              </a:ln>
+            </p:spPr>
+            <p:style>
+              <a:lnRef idx="2">
+                <a:schemeClr val="accent1">
+                  <a:shade val="50000"/>
+                </a:schemeClr>
+              </a:lnRef>
+              <a:fillRef idx="1">
+                <a:schemeClr val="accent1"/>
+              </a:fillRef>
+              <a:effectRef idx="0">
+                <a:schemeClr val="accent1"/>
+              </a:effectRef>
+              <a:fontRef idx="minor">
+                <a:schemeClr val="lt1"/>
+              </a:fontRef>
+            </p:style>
+            <p:txBody>
+              <a:bodyPr rtlCol="0" anchor="ctr"/>
+              <a:lstStyle/>
+              <a:p>
+                <a:pPr algn="ctr"/>
+                <a:endParaRPr lang="en-US" i="1">
+                  <a:solidFill>
+                    <a:schemeClr val="bg1"/>
+                  </a:solidFill>
+                </a:endParaRPr>
+              </a:p>
+            </p:txBody>
+          </p:sp>
+          <p:cxnSp>
+            <p:nvCxnSpPr>
+              <p:cNvPr id="66" name="Straight Connector 65">
+                <a:extLst>
+                  <a:ext uri="{FF2B5EF4-FFF2-40B4-BE49-F238E27FC236}">
+                    <a16:creationId xmlns:a16="http://schemas.microsoft.com/office/drawing/2014/main" id="{DEE38735-129C-46F6-806F-80E1CA51DB28}"/>
+                  </a:ext>
+                </a:extLst>
+              </p:cNvPr>
+              <p:cNvCxnSpPr>
+                <a:cxnSpLocks/>
+              </p:cNvCxnSpPr>
+              <p:nvPr/>
+            </p:nvCxnSpPr>
+            <p:spPr>
+              <a:xfrm>
+                <a:off x="4930902" y="1993392"/>
+                <a:ext cx="0" cy="1399096"/>
+              </a:xfrm>
+              <a:prstGeom prst="line">
+                <a:avLst/>
+              </a:prstGeom>
+              <a:grpFill/>
+              <a:ln>
+                <a:solidFill>
+                  <a:schemeClr val="bg2">
+                    <a:lumMod val="75000"/>
+                  </a:schemeClr>
+                </a:solidFill>
+              </a:ln>
+            </p:spPr>
+            <p:style>
+              <a:lnRef idx="1">
+                <a:schemeClr val="accent1"/>
+              </a:lnRef>
+              <a:fillRef idx="0">
+                <a:schemeClr val="accent1"/>
+              </a:fillRef>
+              <a:effectRef idx="0">
+                <a:schemeClr val="accent1"/>
+              </a:effectRef>
+              <a:fontRef idx="minor">
+                <a:schemeClr val="tx1"/>
+              </a:fontRef>
+            </p:style>
+          </p:cxnSp>
+          <p:cxnSp>
+            <p:nvCxnSpPr>
+              <p:cNvPr id="67" name="Straight Connector 66">
+                <a:extLst>
+                  <a:ext uri="{FF2B5EF4-FFF2-40B4-BE49-F238E27FC236}">
+                    <a16:creationId xmlns:a16="http://schemas.microsoft.com/office/drawing/2014/main" id="{750976C0-CEF0-4FC1-8EA5-9DDFA27236D0}"/>
+                  </a:ext>
+                </a:extLst>
+              </p:cNvPr>
+              <p:cNvCxnSpPr>
+                <a:cxnSpLocks/>
+              </p:cNvCxnSpPr>
+              <p:nvPr/>
+            </p:nvCxnSpPr>
+            <p:spPr>
+              <a:xfrm>
+                <a:off x="5604510" y="1988852"/>
+                <a:ext cx="0" cy="1399096"/>
+              </a:xfrm>
+              <a:prstGeom prst="line">
+                <a:avLst/>
+              </a:prstGeom>
+              <a:grpFill/>
+              <a:ln>
+                <a:solidFill>
+                  <a:schemeClr val="bg2">
+                    <a:lumMod val="75000"/>
+                  </a:schemeClr>
+                </a:solidFill>
+              </a:ln>
+            </p:spPr>
+            <p:style>
+              <a:lnRef idx="1">
+                <a:schemeClr val="accent1"/>
+              </a:lnRef>
+              <a:fillRef idx="0">
+                <a:schemeClr val="accent1"/>
+              </a:fillRef>
+              <a:effectRef idx="0">
+                <a:schemeClr val="accent1"/>
+              </a:effectRef>
+              <a:fontRef idx="minor">
+                <a:schemeClr val="tx1"/>
+              </a:fontRef>
+            </p:style>
+          </p:cxnSp>
+          <p:cxnSp>
+            <p:nvCxnSpPr>
+              <p:cNvPr id="68" name="Straight Connector 67">
+                <a:extLst>
+                  <a:ext uri="{FF2B5EF4-FFF2-40B4-BE49-F238E27FC236}">
+                    <a16:creationId xmlns:a16="http://schemas.microsoft.com/office/drawing/2014/main" id="{66EA8C61-1ED3-4F87-9C37-A44639C4464D}"/>
+                  </a:ext>
+                </a:extLst>
+              </p:cNvPr>
+              <p:cNvCxnSpPr>
+                <a:cxnSpLocks/>
+              </p:cNvCxnSpPr>
+              <p:nvPr/>
+            </p:nvCxnSpPr>
+            <p:spPr>
+              <a:xfrm>
+                <a:off x="5279898" y="1993392"/>
+                <a:ext cx="0" cy="1399096"/>
+              </a:xfrm>
+              <a:prstGeom prst="line">
+                <a:avLst/>
+              </a:prstGeom>
+              <a:grpFill/>
+              <a:ln>
+                <a:solidFill>
+                  <a:schemeClr val="bg2">
+                    <a:lumMod val="75000"/>
+                  </a:schemeClr>
+                </a:solidFill>
+              </a:ln>
+            </p:spPr>
+            <p:style>
+              <a:lnRef idx="1">
+                <a:schemeClr val="accent1"/>
+              </a:lnRef>
+              <a:fillRef idx="0">
+                <a:schemeClr val="accent1"/>
+              </a:fillRef>
+              <a:effectRef idx="0">
+                <a:schemeClr val="accent1"/>
+              </a:effectRef>
+              <a:fontRef idx="minor">
+                <a:schemeClr val="tx1"/>
+              </a:fontRef>
+            </p:style>
+          </p:cxnSp>
+        </p:grpSp>
+        <p:grpSp>
+          <p:nvGrpSpPr>
+            <p:cNvPr id="83" name="Group 82">
+              <a:extLst>
+                <a:ext uri="{FF2B5EF4-FFF2-40B4-BE49-F238E27FC236}">
+                  <a16:creationId xmlns:a16="http://schemas.microsoft.com/office/drawing/2014/main" id="{E98E0282-303E-4F73-B97D-C45A2AA526C5}"/>
+                </a:ext>
+              </a:extLst>
+            </p:cNvPr>
+            <p:cNvGrpSpPr/>
+            <p:nvPr/>
+          </p:nvGrpSpPr>
+          <p:grpSpPr>
+            <a:xfrm>
+              <a:off x="7996738" y="3383312"/>
+              <a:ext cx="1723325" cy="1129165"/>
+              <a:chOff x="7744962" y="3383312"/>
+              <a:chExt cx="1723325" cy="1129165"/>
+            </a:xfrm>
+          </p:grpSpPr>
+          <p:grpSp>
+            <p:nvGrpSpPr>
+              <p:cNvPr id="47" name="Group 46">
+                <a:extLst>
+                  <a:ext uri="{FF2B5EF4-FFF2-40B4-BE49-F238E27FC236}">
+                    <a16:creationId xmlns:a16="http://schemas.microsoft.com/office/drawing/2014/main" id="{BA87F972-1BD6-4550-8337-6260E4EF5ACC}"/>
+                  </a:ext>
+                </a:extLst>
+              </p:cNvPr>
+              <p:cNvGrpSpPr/>
+              <p:nvPr/>
+            </p:nvGrpSpPr>
+            <p:grpSpPr>
+              <a:xfrm>
+                <a:off x="7744962" y="3383312"/>
+                <a:ext cx="1723325" cy="1129165"/>
+                <a:chOff x="7744962" y="3383312"/>
+                <a:chExt cx="2073600" cy="1329801"/>
+              </a:xfrm>
+            </p:grpSpPr>
+            <p:sp>
+              <p:nvSpPr>
+                <p:cNvPr id="38" name="Rectangle 37">
+                  <a:extLst>
+                    <a:ext uri="{FF2B5EF4-FFF2-40B4-BE49-F238E27FC236}">
+                      <a16:creationId xmlns:a16="http://schemas.microsoft.com/office/drawing/2014/main" id="{842770EE-ACFB-4ED0-B8A4-78E127E3C2C1}"/>
+                    </a:ext>
+                  </a:extLst>
+                </p:cNvPr>
+                <p:cNvSpPr/>
+                <p:nvPr/>
+              </p:nvSpPr>
+              <p:spPr>
+                <a:xfrm>
+                  <a:off x="7744964" y="3383312"/>
+                  <a:ext cx="2073598" cy="1329504"/>
+                </a:xfrm>
+                <a:prstGeom prst="rect">
+                  <a:avLst/>
+                </a:prstGeom>
+                <a:solidFill>
+                  <a:schemeClr val="bg2"/>
+                </a:solidFill>
+                <a:ln>
+                  <a:solidFill>
+                    <a:schemeClr val="bg2"/>
+                  </a:solidFill>
+                </a:ln>
+              </p:spPr>
+              <p:style>
+                <a:lnRef idx="2">
+                  <a:schemeClr val="accent1">
+                    <a:shade val="50000"/>
+                  </a:schemeClr>
+                </a:lnRef>
+                <a:fillRef idx="1">
+                  <a:schemeClr val="accent1"/>
+                </a:fillRef>
+                <a:effectRef idx="0">
+                  <a:schemeClr val="accent1"/>
+                </a:effectRef>
+                <a:fontRef idx="minor">
+                  <a:schemeClr val="lt1"/>
+                </a:fontRef>
+              </p:style>
+              <p:txBody>
+                <a:bodyPr rtlCol="0" anchor="ctr"/>
+                <a:lstStyle/>
+                <a:p>
+                  <a:pPr algn="ctr"/>
+                  <a:endParaRPr lang="en-US" i="1">
+                    <a:solidFill>
+                      <a:sysClr val="windowText" lastClr="000000"/>
+                    </a:solidFill>
+                  </a:endParaRPr>
+                </a:p>
+              </p:txBody>
+            </p:sp>
+            <p:sp>
+              <p:nvSpPr>
+                <p:cNvPr id="39" name="Rectangle 38">
+                  <a:extLst>
+                    <a:ext uri="{FF2B5EF4-FFF2-40B4-BE49-F238E27FC236}">
+                      <a16:creationId xmlns:a16="http://schemas.microsoft.com/office/drawing/2014/main" id="{C3C00273-2C06-4EF1-BA31-893B86B0265E}"/>
+                    </a:ext>
+                  </a:extLst>
+                </p:cNvPr>
+                <p:cNvSpPr/>
+                <p:nvPr/>
+              </p:nvSpPr>
+              <p:spPr>
+                <a:xfrm>
+                  <a:off x="7744962" y="3386488"/>
+                  <a:ext cx="691200" cy="442800"/>
+                </a:xfrm>
+                <a:prstGeom prst="rect">
+                  <a:avLst/>
+                </a:prstGeom>
+                <a:solidFill>
+                  <a:schemeClr val="bg2">
+                    <a:lumMod val="90000"/>
+                  </a:schemeClr>
+                </a:solidFill>
+                <a:ln>
+                  <a:solidFill>
+                    <a:schemeClr val="bg2">
+                      <a:lumMod val="90000"/>
+                    </a:schemeClr>
+                  </a:solidFill>
+                </a:ln>
+              </p:spPr>
+              <p:style>
+                <a:lnRef idx="2">
+                  <a:schemeClr val="accent1">
+                    <a:shade val="50000"/>
+                  </a:schemeClr>
+                </a:lnRef>
+                <a:fillRef idx="1">
+                  <a:schemeClr val="accent1"/>
+                </a:fillRef>
+                <a:effectRef idx="0">
+                  <a:schemeClr val="accent1"/>
+                </a:effectRef>
+                <a:fontRef idx="minor">
+                  <a:schemeClr val="lt1"/>
+                </a:fontRef>
+              </p:style>
+              <p:txBody>
+                <a:bodyPr rtlCol="0" anchor="ctr"/>
+                <a:lstStyle/>
+                <a:p>
+                  <a:pPr algn="ctr"/>
+                  <a:endParaRPr lang="en-US" i="1">
+                    <a:solidFill>
+                      <a:schemeClr val="bg1"/>
+                    </a:solidFill>
+                  </a:endParaRPr>
+                </a:p>
+              </p:txBody>
+            </p:sp>
+            <p:sp>
+              <p:nvSpPr>
+                <p:cNvPr id="40" name="Rectangle 39">
+                  <a:extLst>
+                    <a:ext uri="{FF2B5EF4-FFF2-40B4-BE49-F238E27FC236}">
+                      <a16:creationId xmlns:a16="http://schemas.microsoft.com/office/drawing/2014/main" id="{D9C7A878-19D8-469E-96BE-A85D757E157B}"/>
+                    </a:ext>
+                  </a:extLst>
+                </p:cNvPr>
+                <p:cNvSpPr/>
+                <p:nvPr/>
+              </p:nvSpPr>
+              <p:spPr>
+                <a:xfrm>
+                  <a:off x="8436162" y="3833835"/>
+                  <a:ext cx="691200" cy="442800"/>
+                </a:xfrm>
+                <a:prstGeom prst="rect">
+                  <a:avLst/>
+                </a:prstGeom>
+                <a:solidFill>
+                  <a:schemeClr val="bg2">
+                    <a:lumMod val="90000"/>
+                  </a:schemeClr>
+                </a:solidFill>
+                <a:ln>
+                  <a:solidFill>
+                    <a:schemeClr val="bg2">
+                      <a:lumMod val="90000"/>
+                    </a:schemeClr>
+                  </a:solidFill>
+                </a:ln>
+              </p:spPr>
+              <p:style>
+                <a:lnRef idx="2">
+                  <a:schemeClr val="accent1">
+                    <a:shade val="50000"/>
+                  </a:schemeClr>
+                </a:lnRef>
+                <a:fillRef idx="1">
+                  <a:schemeClr val="accent1"/>
+                </a:fillRef>
+                <a:effectRef idx="0">
+                  <a:schemeClr val="accent1"/>
+                </a:effectRef>
+                <a:fontRef idx="minor">
+                  <a:schemeClr val="lt1"/>
+                </a:fontRef>
+              </p:style>
+              <p:txBody>
+                <a:bodyPr rtlCol="0" anchor="ctr"/>
+                <a:lstStyle/>
+                <a:p>
+                  <a:pPr algn="ctr"/>
+                  <a:endParaRPr lang="en-US" i="1">
+                    <a:solidFill>
+                      <a:schemeClr val="bg1"/>
+                    </a:solidFill>
+                  </a:endParaRPr>
+                </a:p>
+              </p:txBody>
+            </p:sp>
+            <p:sp>
+              <p:nvSpPr>
+                <p:cNvPr id="41" name="Rectangle 40">
+                  <a:extLst>
+                    <a:ext uri="{FF2B5EF4-FFF2-40B4-BE49-F238E27FC236}">
+                      <a16:creationId xmlns:a16="http://schemas.microsoft.com/office/drawing/2014/main" id="{8607071A-7B52-4F13-937A-A87CC3A4C5AA}"/>
+                    </a:ext>
+                  </a:extLst>
+                </p:cNvPr>
+                <p:cNvSpPr/>
+                <p:nvPr/>
+              </p:nvSpPr>
+              <p:spPr>
+                <a:xfrm>
+                  <a:off x="9127362" y="4270313"/>
+                  <a:ext cx="691200" cy="442800"/>
+                </a:xfrm>
+                <a:prstGeom prst="rect">
+                  <a:avLst/>
+                </a:prstGeom>
+                <a:solidFill>
+                  <a:schemeClr val="bg2">
+                    <a:lumMod val="90000"/>
+                  </a:schemeClr>
+                </a:solidFill>
+                <a:ln>
+                  <a:solidFill>
+                    <a:schemeClr val="bg2">
+                      <a:lumMod val="90000"/>
+                    </a:schemeClr>
+                  </a:solidFill>
+                </a:ln>
+              </p:spPr>
+              <p:style>
+                <a:lnRef idx="2">
+                  <a:schemeClr val="accent1">
+                    <a:shade val="50000"/>
+                  </a:schemeClr>
+                </a:lnRef>
+                <a:fillRef idx="1">
+                  <a:schemeClr val="accent1"/>
+                </a:fillRef>
+                <a:effectRef idx="0">
+                  <a:schemeClr val="accent1"/>
+                </a:effectRef>
+                <a:fontRef idx="minor">
+                  <a:schemeClr val="lt1"/>
+                </a:fontRef>
+              </p:style>
+              <p:txBody>
+                <a:bodyPr rtlCol="0" anchor="ctr"/>
+                <a:lstStyle/>
+                <a:p>
+                  <a:pPr algn="ctr"/>
+                  <a:endParaRPr lang="en-US" i="1">
+                    <a:solidFill>
+                      <a:schemeClr val="bg1"/>
+                    </a:solidFill>
+                  </a:endParaRPr>
+                </a:p>
+              </p:txBody>
+            </p:sp>
+          </p:grpSp>
+          <p:cxnSp>
+            <p:nvCxnSpPr>
+              <p:cNvPr id="69" name="Straight Connector 68">
+                <a:extLst>
+                  <a:ext uri="{FF2B5EF4-FFF2-40B4-BE49-F238E27FC236}">
+                    <a16:creationId xmlns:a16="http://schemas.microsoft.com/office/drawing/2014/main" id="{8CA1FB5A-4739-45E2-A045-F04CC656F576}"/>
+                  </a:ext>
+                </a:extLst>
+              </p:cNvPr>
+              <p:cNvCxnSpPr>
+                <a:cxnSpLocks/>
+              </p:cNvCxnSpPr>
+              <p:nvPr/>
+            </p:nvCxnSpPr>
+            <p:spPr>
+              <a:xfrm>
+                <a:off x="7888029" y="3398379"/>
+                <a:ext cx="0" cy="1105764"/>
+              </a:xfrm>
+              <a:prstGeom prst="line">
+                <a:avLst/>
+              </a:prstGeom>
+              <a:solidFill>
+                <a:schemeClr val="bg2">
+                  <a:lumMod val="90000"/>
+                </a:schemeClr>
+              </a:solidFill>
+              <a:ln>
+                <a:solidFill>
+                  <a:schemeClr val="bg2">
+                    <a:lumMod val="75000"/>
+                  </a:schemeClr>
+                </a:solidFill>
+              </a:ln>
+            </p:spPr>
+            <p:style>
+              <a:lnRef idx="1">
+                <a:schemeClr val="accent1"/>
+              </a:lnRef>
+              <a:fillRef idx="0">
+                <a:schemeClr val="accent1"/>
+              </a:fillRef>
+              <a:effectRef idx="0">
+                <a:schemeClr val="accent1"/>
+              </a:effectRef>
+              <a:fontRef idx="minor">
+                <a:schemeClr val="tx1"/>
+              </a:fontRef>
+            </p:style>
+          </p:cxnSp>
+          <p:cxnSp>
+            <p:nvCxnSpPr>
+              <p:cNvPr id="70" name="Straight Connector 69">
+                <a:extLst>
+                  <a:ext uri="{FF2B5EF4-FFF2-40B4-BE49-F238E27FC236}">
+                    <a16:creationId xmlns:a16="http://schemas.microsoft.com/office/drawing/2014/main" id="{0ED12344-54FF-472A-8FBE-BC35B9815BBE}"/>
+                  </a:ext>
+                </a:extLst>
+              </p:cNvPr>
+              <p:cNvCxnSpPr>
+                <a:cxnSpLocks/>
+              </p:cNvCxnSpPr>
+              <p:nvPr/>
+            </p:nvCxnSpPr>
+            <p:spPr>
+              <a:xfrm>
+                <a:off x="8031096" y="3398379"/>
+                <a:ext cx="0" cy="1105764"/>
+              </a:xfrm>
+              <a:prstGeom prst="line">
+                <a:avLst/>
+              </a:prstGeom>
+              <a:solidFill>
+                <a:schemeClr val="bg2">
+                  <a:lumMod val="90000"/>
+                </a:schemeClr>
+              </a:solidFill>
+              <a:ln>
+                <a:solidFill>
+                  <a:schemeClr val="bg2">
+                    <a:lumMod val="75000"/>
+                  </a:schemeClr>
+                </a:solidFill>
+              </a:ln>
+            </p:spPr>
+            <p:style>
+              <a:lnRef idx="1">
+                <a:schemeClr val="accent1"/>
+              </a:lnRef>
+              <a:fillRef idx="0">
+                <a:schemeClr val="accent1"/>
+              </a:fillRef>
+              <a:effectRef idx="0">
+                <a:schemeClr val="accent1"/>
+              </a:effectRef>
+              <a:fontRef idx="minor">
+                <a:schemeClr val="tx1"/>
+              </a:fontRef>
+            </p:style>
+          </p:cxnSp>
+          <p:cxnSp>
+            <p:nvCxnSpPr>
+              <p:cNvPr id="71" name="Straight Connector 70">
+                <a:extLst>
+                  <a:ext uri="{FF2B5EF4-FFF2-40B4-BE49-F238E27FC236}">
+                    <a16:creationId xmlns:a16="http://schemas.microsoft.com/office/drawing/2014/main" id="{2D39ACBF-6D7C-4E3F-B257-F007A0240B36}"/>
+                  </a:ext>
+                </a:extLst>
+              </p:cNvPr>
+              <p:cNvCxnSpPr>
+                <a:cxnSpLocks/>
+              </p:cNvCxnSpPr>
+              <p:nvPr/>
+            </p:nvCxnSpPr>
+            <p:spPr>
+              <a:xfrm>
+                <a:off x="8317230" y="3398379"/>
+                <a:ext cx="0" cy="1105764"/>
+              </a:xfrm>
+              <a:prstGeom prst="line">
+                <a:avLst/>
+              </a:prstGeom>
+              <a:solidFill>
+                <a:schemeClr val="bg2">
+                  <a:lumMod val="90000"/>
+                </a:schemeClr>
+              </a:solidFill>
+              <a:ln>
+                <a:solidFill>
+                  <a:schemeClr val="bg2">
+                    <a:lumMod val="75000"/>
+                  </a:schemeClr>
+                </a:solidFill>
+              </a:ln>
+            </p:spPr>
+            <p:style>
+              <a:lnRef idx="1">
+                <a:schemeClr val="accent1"/>
+              </a:lnRef>
+              <a:fillRef idx="0">
+                <a:schemeClr val="accent1"/>
+              </a:fillRef>
+              <a:effectRef idx="0">
+                <a:schemeClr val="accent1"/>
+              </a:effectRef>
+              <a:fontRef idx="minor">
+                <a:schemeClr val="tx1"/>
+              </a:fontRef>
+            </p:style>
+          </p:cxnSp>
+          <p:cxnSp>
+            <p:nvCxnSpPr>
+              <p:cNvPr id="72" name="Straight Connector 71">
+                <a:extLst>
+                  <a:ext uri="{FF2B5EF4-FFF2-40B4-BE49-F238E27FC236}">
+                    <a16:creationId xmlns:a16="http://schemas.microsoft.com/office/drawing/2014/main" id="{F3A23078-43C7-4FD4-92E9-8B9EE2B2DA27}"/>
+                  </a:ext>
+                </a:extLst>
+              </p:cNvPr>
+              <p:cNvCxnSpPr>
+                <a:cxnSpLocks/>
+              </p:cNvCxnSpPr>
+              <p:nvPr/>
+            </p:nvCxnSpPr>
+            <p:spPr>
+              <a:xfrm>
+                <a:off x="8461384" y="3398379"/>
+                <a:ext cx="0" cy="1105764"/>
+              </a:xfrm>
+              <a:prstGeom prst="line">
+                <a:avLst/>
+              </a:prstGeom>
+              <a:solidFill>
+                <a:schemeClr val="bg2">
+                  <a:lumMod val="90000"/>
+                </a:schemeClr>
+              </a:solidFill>
+              <a:ln>
+                <a:solidFill>
+                  <a:schemeClr val="bg2">
+                    <a:lumMod val="75000"/>
+                  </a:schemeClr>
+                </a:solidFill>
+              </a:ln>
+            </p:spPr>
+            <p:style>
+              <a:lnRef idx="1">
+                <a:schemeClr val="accent1"/>
+              </a:lnRef>
+              <a:fillRef idx="0">
+                <a:schemeClr val="accent1"/>
+              </a:fillRef>
+              <a:effectRef idx="0">
+                <a:schemeClr val="accent1"/>
+              </a:effectRef>
+              <a:fontRef idx="minor">
+                <a:schemeClr val="tx1"/>
+              </a:fontRef>
+            </p:style>
+          </p:cxnSp>
+          <p:cxnSp>
+            <p:nvCxnSpPr>
+              <p:cNvPr id="73" name="Straight Connector 72">
+                <a:extLst>
+                  <a:ext uri="{FF2B5EF4-FFF2-40B4-BE49-F238E27FC236}">
+                    <a16:creationId xmlns:a16="http://schemas.microsoft.com/office/drawing/2014/main" id="{9D5E80F8-8538-4A49-8634-5C66F247F671}"/>
+                  </a:ext>
+                </a:extLst>
+              </p:cNvPr>
+              <p:cNvCxnSpPr>
+                <a:cxnSpLocks/>
+              </p:cNvCxnSpPr>
+              <p:nvPr/>
+            </p:nvCxnSpPr>
+            <p:spPr>
+              <a:xfrm>
+                <a:off x="8605538" y="3398379"/>
+                <a:ext cx="0" cy="1105764"/>
+              </a:xfrm>
+              <a:prstGeom prst="line">
+                <a:avLst/>
+              </a:prstGeom>
+              <a:solidFill>
+                <a:schemeClr val="bg2">
+                  <a:lumMod val="90000"/>
+                </a:schemeClr>
+              </a:solidFill>
+              <a:ln>
+                <a:solidFill>
+                  <a:schemeClr val="bg2">
+                    <a:lumMod val="75000"/>
+                  </a:schemeClr>
+                </a:solidFill>
+              </a:ln>
+            </p:spPr>
+            <p:style>
+              <a:lnRef idx="1">
+                <a:schemeClr val="accent1"/>
+              </a:lnRef>
+              <a:fillRef idx="0">
+                <a:schemeClr val="accent1"/>
+              </a:fillRef>
+              <a:effectRef idx="0">
+                <a:schemeClr val="accent1"/>
+              </a:effectRef>
+              <a:fontRef idx="minor">
+                <a:schemeClr val="tx1"/>
+              </a:fontRef>
+            </p:style>
+          </p:cxnSp>
+          <p:cxnSp>
+            <p:nvCxnSpPr>
+              <p:cNvPr id="74" name="Straight Connector 73">
+                <a:extLst>
+                  <a:ext uri="{FF2B5EF4-FFF2-40B4-BE49-F238E27FC236}">
+                    <a16:creationId xmlns:a16="http://schemas.microsoft.com/office/drawing/2014/main" id="{5BD2F970-6E30-46DD-8D4A-5198D608E28A}"/>
+                  </a:ext>
+                </a:extLst>
+              </p:cNvPr>
+              <p:cNvCxnSpPr>
+                <a:cxnSpLocks/>
+              </p:cNvCxnSpPr>
+              <p:nvPr/>
+            </p:nvCxnSpPr>
+            <p:spPr>
+              <a:xfrm>
+                <a:off x="8749692" y="3398379"/>
+                <a:ext cx="0" cy="1105764"/>
+              </a:xfrm>
+              <a:prstGeom prst="line">
+                <a:avLst/>
+              </a:prstGeom>
+              <a:solidFill>
+                <a:schemeClr val="bg2">
+                  <a:lumMod val="90000"/>
+                </a:schemeClr>
+              </a:solidFill>
+              <a:ln>
+                <a:solidFill>
+                  <a:schemeClr val="bg2">
+                    <a:lumMod val="75000"/>
+                  </a:schemeClr>
+                </a:solidFill>
+              </a:ln>
+            </p:spPr>
+            <p:style>
+              <a:lnRef idx="1">
+                <a:schemeClr val="accent1"/>
+              </a:lnRef>
+              <a:fillRef idx="0">
+                <a:schemeClr val="accent1"/>
+              </a:fillRef>
+              <a:effectRef idx="0">
+                <a:schemeClr val="accent1"/>
+              </a:effectRef>
+              <a:fontRef idx="minor">
+                <a:schemeClr val="tx1"/>
+              </a:fontRef>
+            </p:style>
+          </p:cxnSp>
+          <p:cxnSp>
+            <p:nvCxnSpPr>
+              <p:cNvPr id="75" name="Straight Connector 74">
+                <a:extLst>
+                  <a:ext uri="{FF2B5EF4-FFF2-40B4-BE49-F238E27FC236}">
+                    <a16:creationId xmlns:a16="http://schemas.microsoft.com/office/drawing/2014/main" id="{C42B5F87-01C8-465A-BFE3-126E23154040}"/>
+                  </a:ext>
+                </a:extLst>
+              </p:cNvPr>
+              <p:cNvCxnSpPr>
+                <a:cxnSpLocks/>
+              </p:cNvCxnSpPr>
+              <p:nvPr/>
+            </p:nvCxnSpPr>
+            <p:spPr>
+              <a:xfrm>
+                <a:off x="8893845" y="3398379"/>
+                <a:ext cx="0" cy="1105764"/>
+              </a:xfrm>
+              <a:prstGeom prst="line">
+                <a:avLst/>
+              </a:prstGeom>
+              <a:solidFill>
+                <a:schemeClr val="bg2">
+                  <a:lumMod val="90000"/>
+                </a:schemeClr>
+              </a:solidFill>
+              <a:ln>
+                <a:solidFill>
+                  <a:schemeClr val="bg2">
+                    <a:lumMod val="75000"/>
+                  </a:schemeClr>
+                </a:solidFill>
+              </a:ln>
+            </p:spPr>
+            <p:style>
+              <a:lnRef idx="1">
+                <a:schemeClr val="accent1"/>
+              </a:lnRef>
+              <a:fillRef idx="0">
+                <a:schemeClr val="accent1"/>
+              </a:fillRef>
+              <a:effectRef idx="0">
+                <a:schemeClr val="accent1"/>
+              </a:effectRef>
+              <a:fontRef idx="minor">
+                <a:schemeClr val="tx1"/>
+              </a:fontRef>
+            </p:style>
+          </p:cxnSp>
+          <p:cxnSp>
+            <p:nvCxnSpPr>
+              <p:cNvPr id="76" name="Straight Connector 75">
+                <a:extLst>
+                  <a:ext uri="{FF2B5EF4-FFF2-40B4-BE49-F238E27FC236}">
+                    <a16:creationId xmlns:a16="http://schemas.microsoft.com/office/drawing/2014/main" id="{359DFB7A-D0FC-4A72-B0BF-909EA78DF5FA}"/>
+                  </a:ext>
+                </a:extLst>
+              </p:cNvPr>
+              <p:cNvCxnSpPr>
+                <a:cxnSpLocks/>
+              </p:cNvCxnSpPr>
+              <p:nvPr/>
+            </p:nvCxnSpPr>
+            <p:spPr>
+              <a:xfrm>
+                <a:off x="9041511" y="3398379"/>
+                <a:ext cx="0" cy="1105764"/>
+              </a:xfrm>
+              <a:prstGeom prst="line">
+                <a:avLst/>
+              </a:prstGeom>
+              <a:solidFill>
+                <a:schemeClr val="bg2">
+                  <a:lumMod val="90000"/>
+                </a:schemeClr>
+              </a:solidFill>
+              <a:ln>
+                <a:solidFill>
+                  <a:schemeClr val="bg2">
+                    <a:lumMod val="75000"/>
+                  </a:schemeClr>
+                </a:solidFill>
+              </a:ln>
+            </p:spPr>
+            <p:style>
+              <a:lnRef idx="1">
+                <a:schemeClr val="accent1"/>
+              </a:lnRef>
+              <a:fillRef idx="0">
+                <a:schemeClr val="accent1"/>
+              </a:fillRef>
+              <a:effectRef idx="0">
+                <a:schemeClr val="accent1"/>
+              </a:effectRef>
+              <a:fontRef idx="minor">
+                <a:schemeClr val="tx1"/>
+              </a:fontRef>
+            </p:style>
+          </p:cxnSp>
+          <p:cxnSp>
+            <p:nvCxnSpPr>
+              <p:cNvPr id="77" name="Straight Connector 76">
+                <a:extLst>
+                  <a:ext uri="{FF2B5EF4-FFF2-40B4-BE49-F238E27FC236}">
+                    <a16:creationId xmlns:a16="http://schemas.microsoft.com/office/drawing/2014/main" id="{5FF66592-326C-4EB5-8398-38BA8D6CED8B}"/>
+                  </a:ext>
+                </a:extLst>
+              </p:cNvPr>
+              <p:cNvCxnSpPr>
+                <a:cxnSpLocks/>
+              </p:cNvCxnSpPr>
+              <p:nvPr/>
+            </p:nvCxnSpPr>
+            <p:spPr>
+              <a:xfrm>
+                <a:off x="9181066" y="3398379"/>
+                <a:ext cx="0" cy="1105764"/>
+              </a:xfrm>
+              <a:prstGeom prst="line">
+                <a:avLst/>
+              </a:prstGeom>
+              <a:solidFill>
+                <a:schemeClr val="bg2">
+                  <a:lumMod val="90000"/>
+                </a:schemeClr>
+              </a:solidFill>
+              <a:ln>
+                <a:solidFill>
+                  <a:schemeClr val="bg2">
+                    <a:lumMod val="75000"/>
+                  </a:schemeClr>
+                </a:solidFill>
+              </a:ln>
+            </p:spPr>
+            <p:style>
+              <a:lnRef idx="1">
+                <a:schemeClr val="accent1"/>
+              </a:lnRef>
+              <a:fillRef idx="0">
+                <a:schemeClr val="accent1"/>
+              </a:fillRef>
+              <a:effectRef idx="0">
+                <a:schemeClr val="accent1"/>
+              </a:effectRef>
+              <a:fontRef idx="minor">
+                <a:schemeClr val="tx1"/>
+              </a:fontRef>
+            </p:style>
+          </p:cxnSp>
+          <p:cxnSp>
+            <p:nvCxnSpPr>
+              <p:cNvPr id="78" name="Straight Connector 77">
+                <a:extLst>
+                  <a:ext uri="{FF2B5EF4-FFF2-40B4-BE49-F238E27FC236}">
+                    <a16:creationId xmlns:a16="http://schemas.microsoft.com/office/drawing/2014/main" id="{9475637E-8B35-4D35-97D4-3967122DC215}"/>
+                  </a:ext>
+                </a:extLst>
+              </p:cNvPr>
+              <p:cNvCxnSpPr>
+                <a:cxnSpLocks/>
+              </p:cNvCxnSpPr>
+              <p:nvPr/>
+            </p:nvCxnSpPr>
+            <p:spPr>
+              <a:xfrm>
+                <a:off x="8174163" y="3398379"/>
+                <a:ext cx="0" cy="1105764"/>
+              </a:xfrm>
+              <a:prstGeom prst="line">
+                <a:avLst/>
+              </a:prstGeom>
+              <a:solidFill>
+                <a:schemeClr val="bg2">
+                  <a:lumMod val="90000"/>
+                </a:schemeClr>
+              </a:solidFill>
+              <a:ln>
+                <a:solidFill>
+                  <a:schemeClr val="bg2">
+                    <a:lumMod val="75000"/>
+                  </a:schemeClr>
+                </a:solidFill>
+              </a:ln>
+            </p:spPr>
+            <p:style>
+              <a:lnRef idx="1">
+                <a:schemeClr val="accent1"/>
+              </a:lnRef>
+              <a:fillRef idx="0">
+                <a:schemeClr val="accent1"/>
+              </a:fillRef>
+              <a:effectRef idx="0">
+                <a:schemeClr val="accent1"/>
+              </a:effectRef>
+              <a:fontRef idx="minor">
+                <a:schemeClr val="tx1"/>
+              </a:fontRef>
+            </p:style>
+          </p:cxnSp>
+          <p:cxnSp>
+            <p:nvCxnSpPr>
+              <p:cNvPr id="81" name="Straight Connector 80">
+                <a:extLst>
+                  <a:ext uri="{FF2B5EF4-FFF2-40B4-BE49-F238E27FC236}">
+                    <a16:creationId xmlns:a16="http://schemas.microsoft.com/office/drawing/2014/main" id="{650D2A6B-A811-4205-9300-AFCC7B287A7C}"/>
+                  </a:ext>
+                </a:extLst>
+              </p:cNvPr>
+              <p:cNvCxnSpPr>
+                <a:cxnSpLocks/>
+              </p:cNvCxnSpPr>
+              <p:nvPr/>
+            </p:nvCxnSpPr>
+            <p:spPr>
+              <a:xfrm>
+                <a:off x="9324134" y="3398379"/>
+                <a:ext cx="0" cy="1105764"/>
+              </a:xfrm>
+              <a:prstGeom prst="line">
+                <a:avLst/>
+              </a:prstGeom>
+              <a:solidFill>
+                <a:schemeClr val="bg2">
+                  <a:lumMod val="90000"/>
+                </a:schemeClr>
+              </a:solidFill>
+              <a:ln>
+                <a:solidFill>
+                  <a:schemeClr val="bg2">
+                    <a:lumMod val="75000"/>
+                  </a:schemeClr>
+                </a:solidFill>
+              </a:ln>
+            </p:spPr>
+            <p:style>
+              <a:lnRef idx="1">
+                <a:schemeClr val="accent1"/>
+              </a:lnRef>
+              <a:fillRef idx="0">
+                <a:schemeClr val="accent1"/>
+              </a:fillRef>
+              <a:effectRef idx="0">
+                <a:schemeClr val="accent1"/>
+              </a:effectRef>
+              <a:fontRef idx="minor">
+                <a:schemeClr val="tx1"/>
+              </a:fontRef>
+            </p:style>
+          </p:cxnSp>
+        </p:grpSp>
+        <p:grpSp>
+          <p:nvGrpSpPr>
+            <p:cNvPr id="84" name="Group 83">
+              <a:extLst>
+                <a:ext uri="{FF2B5EF4-FFF2-40B4-BE49-F238E27FC236}">
+                  <a16:creationId xmlns:a16="http://schemas.microsoft.com/office/drawing/2014/main" id="{A2EB045F-86B6-4049-B3A6-D2CD7475BC8C}"/>
+                </a:ext>
+              </a:extLst>
+            </p:cNvPr>
+            <p:cNvGrpSpPr/>
+            <p:nvPr/>
+          </p:nvGrpSpPr>
+          <p:grpSpPr>
+            <a:xfrm>
+              <a:off x="2386584" y="5187124"/>
+              <a:ext cx="1723325" cy="1109353"/>
+              <a:chOff x="7744962" y="3383312"/>
+              <a:chExt cx="1723325" cy="1129165"/>
+            </a:xfrm>
+          </p:grpSpPr>
+          <p:grpSp>
+            <p:nvGrpSpPr>
+              <p:cNvPr id="85" name="Group 84">
+                <a:extLst>
+                  <a:ext uri="{FF2B5EF4-FFF2-40B4-BE49-F238E27FC236}">
+                    <a16:creationId xmlns:a16="http://schemas.microsoft.com/office/drawing/2014/main" id="{03CA9D10-DAE4-4E64-876B-D277805843B5}"/>
+                  </a:ext>
+                </a:extLst>
+              </p:cNvPr>
+              <p:cNvGrpSpPr/>
+              <p:nvPr/>
+            </p:nvGrpSpPr>
+            <p:grpSpPr>
+              <a:xfrm>
+                <a:off x="7744962" y="3383312"/>
+                <a:ext cx="1723325" cy="1129165"/>
+                <a:chOff x="7744962" y="3383312"/>
+                <a:chExt cx="2073600" cy="1329801"/>
+              </a:xfrm>
+            </p:grpSpPr>
+            <p:sp>
+              <p:nvSpPr>
+                <p:cNvPr id="98" name="Rectangle 97">
+                  <a:extLst>
+                    <a:ext uri="{FF2B5EF4-FFF2-40B4-BE49-F238E27FC236}">
+                      <a16:creationId xmlns:a16="http://schemas.microsoft.com/office/drawing/2014/main" id="{1080BCF2-DC00-41DF-9695-A8F08EA85841}"/>
+                    </a:ext>
+                  </a:extLst>
+                </p:cNvPr>
+                <p:cNvSpPr/>
+                <p:nvPr/>
+              </p:nvSpPr>
+              <p:spPr>
+                <a:xfrm>
+                  <a:off x="7744964" y="3383312"/>
+                  <a:ext cx="2073598" cy="1329504"/>
+                </a:xfrm>
+                <a:prstGeom prst="rect">
+                  <a:avLst/>
+                </a:prstGeom>
+                <a:solidFill>
+                  <a:schemeClr val="bg2"/>
+                </a:solidFill>
+                <a:ln>
+                  <a:solidFill>
+                    <a:schemeClr val="bg2"/>
+                  </a:solidFill>
+                </a:ln>
+              </p:spPr>
+              <p:style>
+                <a:lnRef idx="2">
+                  <a:schemeClr val="accent1">
+                    <a:shade val="50000"/>
+                  </a:schemeClr>
+                </a:lnRef>
+                <a:fillRef idx="1">
+                  <a:schemeClr val="accent1"/>
+                </a:fillRef>
+                <a:effectRef idx="0">
+                  <a:schemeClr val="accent1"/>
+                </a:effectRef>
+                <a:fontRef idx="minor">
+                  <a:schemeClr val="lt1"/>
+                </a:fontRef>
+              </p:style>
+              <p:txBody>
+                <a:bodyPr rtlCol="0" anchor="ctr"/>
+                <a:lstStyle/>
+                <a:p>
+                  <a:pPr algn="ctr"/>
+                  <a:endParaRPr lang="en-US" i="1">
+                    <a:solidFill>
+                      <a:sysClr val="windowText" lastClr="000000"/>
+                    </a:solidFill>
+                  </a:endParaRPr>
+                </a:p>
+              </p:txBody>
+            </p:sp>
+            <p:sp>
+              <p:nvSpPr>
+                <p:cNvPr id="99" name="Rectangle 98">
+                  <a:extLst>
+                    <a:ext uri="{FF2B5EF4-FFF2-40B4-BE49-F238E27FC236}">
+                      <a16:creationId xmlns:a16="http://schemas.microsoft.com/office/drawing/2014/main" id="{9F46D267-84A8-4A09-87DC-9CD13BE5ECDB}"/>
+                    </a:ext>
+                  </a:extLst>
+                </p:cNvPr>
+                <p:cNvSpPr/>
+                <p:nvPr/>
+              </p:nvSpPr>
+              <p:spPr>
+                <a:xfrm>
+                  <a:off x="7744962" y="3393656"/>
+                  <a:ext cx="691200" cy="442800"/>
+                </a:xfrm>
+                <a:prstGeom prst="rect">
+                  <a:avLst/>
+                </a:prstGeom>
+                <a:solidFill>
+                  <a:schemeClr val="bg2">
+                    <a:lumMod val="90000"/>
+                  </a:schemeClr>
+                </a:solidFill>
+                <a:ln>
+                  <a:solidFill>
+                    <a:schemeClr val="bg2">
+                      <a:lumMod val="90000"/>
+                    </a:schemeClr>
+                  </a:solidFill>
+                </a:ln>
+              </p:spPr>
+              <p:style>
+                <a:lnRef idx="2">
+                  <a:schemeClr val="accent1">
+                    <a:shade val="50000"/>
+                  </a:schemeClr>
+                </a:lnRef>
+                <a:fillRef idx="1">
+                  <a:schemeClr val="accent1"/>
+                </a:fillRef>
+                <a:effectRef idx="0">
+                  <a:schemeClr val="accent1"/>
+                </a:effectRef>
+                <a:fontRef idx="minor">
+                  <a:schemeClr val="lt1"/>
+                </a:fontRef>
+              </p:style>
+              <p:txBody>
+                <a:bodyPr rtlCol="0" anchor="ctr"/>
+                <a:lstStyle/>
+                <a:p>
+                  <a:pPr algn="ctr"/>
+                  <a:endParaRPr lang="en-US" i="1">
+                    <a:solidFill>
+                      <a:schemeClr val="bg1"/>
+                    </a:solidFill>
+                  </a:endParaRPr>
+                </a:p>
+              </p:txBody>
+            </p:sp>
+            <p:sp>
+              <p:nvSpPr>
+                <p:cNvPr id="100" name="Rectangle 99">
+                  <a:extLst>
+                    <a:ext uri="{FF2B5EF4-FFF2-40B4-BE49-F238E27FC236}">
+                      <a16:creationId xmlns:a16="http://schemas.microsoft.com/office/drawing/2014/main" id="{6A8397CF-CF85-4662-AC42-3F5CE170A5E4}"/>
+                    </a:ext>
+                  </a:extLst>
+                </p:cNvPr>
+                <p:cNvSpPr/>
+                <p:nvPr/>
+              </p:nvSpPr>
+              <p:spPr>
+                <a:xfrm>
+                  <a:off x="8436162" y="3833835"/>
+                  <a:ext cx="691200" cy="442800"/>
+                </a:xfrm>
+                <a:prstGeom prst="rect">
+                  <a:avLst/>
+                </a:prstGeom>
+                <a:solidFill>
+                  <a:schemeClr val="bg2">
+                    <a:lumMod val="90000"/>
+                  </a:schemeClr>
+                </a:solidFill>
+                <a:ln>
+                  <a:solidFill>
+                    <a:schemeClr val="bg2">
+                      <a:lumMod val="90000"/>
+                    </a:schemeClr>
+                  </a:solidFill>
+                </a:ln>
+              </p:spPr>
+              <p:style>
+                <a:lnRef idx="2">
+                  <a:schemeClr val="accent1">
+                    <a:shade val="50000"/>
+                  </a:schemeClr>
+                </a:lnRef>
+                <a:fillRef idx="1">
+                  <a:schemeClr val="accent1"/>
+                </a:fillRef>
+                <a:effectRef idx="0">
+                  <a:schemeClr val="accent1"/>
+                </a:effectRef>
+                <a:fontRef idx="minor">
+                  <a:schemeClr val="lt1"/>
+                </a:fontRef>
+              </p:style>
+              <p:txBody>
+                <a:bodyPr rtlCol="0" anchor="ctr"/>
+                <a:lstStyle/>
+                <a:p>
+                  <a:pPr algn="ctr"/>
+                  <a:endParaRPr lang="en-US" i="1">
+                    <a:solidFill>
+                      <a:schemeClr val="bg1"/>
+                    </a:solidFill>
+                  </a:endParaRPr>
+                </a:p>
+              </p:txBody>
+            </p:sp>
+            <p:sp>
+              <p:nvSpPr>
+                <p:cNvPr id="101" name="Rectangle 100">
+                  <a:extLst>
+                    <a:ext uri="{FF2B5EF4-FFF2-40B4-BE49-F238E27FC236}">
+                      <a16:creationId xmlns:a16="http://schemas.microsoft.com/office/drawing/2014/main" id="{8BD83FA7-2AE6-478F-89BA-8E9BB9210661}"/>
+                    </a:ext>
+                  </a:extLst>
+                </p:cNvPr>
+                <p:cNvSpPr/>
+                <p:nvPr/>
+              </p:nvSpPr>
+              <p:spPr>
+                <a:xfrm>
+                  <a:off x="9127362" y="4270313"/>
+                  <a:ext cx="691200" cy="442800"/>
+                </a:xfrm>
+                <a:prstGeom prst="rect">
+                  <a:avLst/>
+                </a:prstGeom>
+                <a:solidFill>
+                  <a:schemeClr val="bg2">
+                    <a:lumMod val="90000"/>
+                  </a:schemeClr>
+                </a:solidFill>
+                <a:ln>
+                  <a:solidFill>
+                    <a:schemeClr val="bg2">
+                      <a:lumMod val="90000"/>
+                    </a:schemeClr>
+                  </a:solidFill>
+                </a:ln>
+              </p:spPr>
+              <p:style>
+                <a:lnRef idx="2">
+                  <a:schemeClr val="accent1">
+                    <a:shade val="50000"/>
+                  </a:schemeClr>
+                </a:lnRef>
+                <a:fillRef idx="1">
+                  <a:schemeClr val="accent1"/>
+                </a:fillRef>
+                <a:effectRef idx="0">
+                  <a:schemeClr val="accent1"/>
+                </a:effectRef>
+                <a:fontRef idx="minor">
+                  <a:schemeClr val="lt1"/>
+                </a:fontRef>
+              </p:style>
+              <p:txBody>
+                <a:bodyPr rtlCol="0" anchor="ctr"/>
+                <a:lstStyle/>
+                <a:p>
+                  <a:pPr algn="ctr"/>
+                  <a:endParaRPr lang="en-US" i="1">
+                    <a:solidFill>
+                      <a:schemeClr val="bg1"/>
+                    </a:solidFill>
+                  </a:endParaRPr>
+                </a:p>
+              </p:txBody>
+            </p:sp>
+          </p:grpSp>
+          <p:cxnSp>
+            <p:nvCxnSpPr>
+              <p:cNvPr id="86" name="Straight Connector 85">
+                <a:extLst>
+                  <a:ext uri="{FF2B5EF4-FFF2-40B4-BE49-F238E27FC236}">
+                    <a16:creationId xmlns:a16="http://schemas.microsoft.com/office/drawing/2014/main" id="{B8F3183B-1B8E-48D1-B914-6E8867BCE51E}"/>
+                  </a:ext>
+                </a:extLst>
+              </p:cNvPr>
+              <p:cNvCxnSpPr>
+                <a:cxnSpLocks/>
+              </p:cNvCxnSpPr>
+              <p:nvPr/>
+            </p:nvCxnSpPr>
+            <p:spPr>
+              <a:xfrm>
+                <a:off x="7888029" y="3398379"/>
+                <a:ext cx="0" cy="1105764"/>
+              </a:xfrm>
+              <a:prstGeom prst="line">
+                <a:avLst/>
+              </a:prstGeom>
+              <a:solidFill>
+                <a:schemeClr val="bg2">
+                  <a:lumMod val="90000"/>
+                </a:schemeClr>
+              </a:solidFill>
+              <a:ln>
+                <a:solidFill>
+                  <a:schemeClr val="bg2">
+                    <a:lumMod val="75000"/>
+                  </a:schemeClr>
+                </a:solidFill>
+              </a:ln>
+            </p:spPr>
+            <p:style>
+              <a:lnRef idx="1">
+                <a:schemeClr val="accent1"/>
+              </a:lnRef>
+              <a:fillRef idx="0">
+                <a:schemeClr val="accent1"/>
+              </a:fillRef>
+              <a:effectRef idx="0">
+                <a:schemeClr val="accent1"/>
+              </a:effectRef>
+              <a:fontRef idx="minor">
+                <a:schemeClr val="tx1"/>
+              </a:fontRef>
+            </p:style>
+          </p:cxnSp>
+          <p:cxnSp>
+            <p:nvCxnSpPr>
+              <p:cNvPr id="87" name="Straight Connector 86">
+                <a:extLst>
+                  <a:ext uri="{FF2B5EF4-FFF2-40B4-BE49-F238E27FC236}">
+                    <a16:creationId xmlns:a16="http://schemas.microsoft.com/office/drawing/2014/main" id="{AC4A8ECB-D955-40CE-B593-CF24EF3E7BC0}"/>
+                  </a:ext>
+                </a:extLst>
+              </p:cNvPr>
+              <p:cNvCxnSpPr>
+                <a:cxnSpLocks/>
+              </p:cNvCxnSpPr>
+              <p:nvPr/>
+            </p:nvCxnSpPr>
+            <p:spPr>
+              <a:xfrm>
+                <a:off x="8031096" y="3398379"/>
+                <a:ext cx="0" cy="1105764"/>
+              </a:xfrm>
+              <a:prstGeom prst="line">
+                <a:avLst/>
+              </a:prstGeom>
+              <a:solidFill>
+                <a:schemeClr val="bg2">
+                  <a:lumMod val="90000"/>
+                </a:schemeClr>
+              </a:solidFill>
+              <a:ln>
+                <a:solidFill>
+                  <a:schemeClr val="bg2">
+                    <a:lumMod val="75000"/>
+                  </a:schemeClr>
+                </a:solidFill>
+              </a:ln>
+            </p:spPr>
+            <p:style>
+              <a:lnRef idx="1">
+                <a:schemeClr val="accent1"/>
+              </a:lnRef>
+              <a:fillRef idx="0">
+                <a:schemeClr val="accent1"/>
+              </a:fillRef>
+              <a:effectRef idx="0">
+                <a:schemeClr val="accent1"/>
+              </a:effectRef>
+              <a:fontRef idx="minor">
+                <a:schemeClr val="tx1"/>
+              </a:fontRef>
+            </p:style>
+          </p:cxnSp>
+          <p:cxnSp>
+            <p:nvCxnSpPr>
+              <p:cNvPr id="88" name="Straight Connector 87">
+                <a:extLst>
+                  <a:ext uri="{FF2B5EF4-FFF2-40B4-BE49-F238E27FC236}">
+                    <a16:creationId xmlns:a16="http://schemas.microsoft.com/office/drawing/2014/main" id="{8B1C4170-E373-441F-BC33-DD476C5CD221}"/>
+                  </a:ext>
+                </a:extLst>
+              </p:cNvPr>
+              <p:cNvCxnSpPr>
+                <a:cxnSpLocks/>
+              </p:cNvCxnSpPr>
+              <p:nvPr/>
+            </p:nvCxnSpPr>
+            <p:spPr>
+              <a:xfrm>
+                <a:off x="8317230" y="3398379"/>
+                <a:ext cx="0" cy="1105764"/>
+              </a:xfrm>
+              <a:prstGeom prst="line">
+                <a:avLst/>
+              </a:prstGeom>
+              <a:solidFill>
+                <a:schemeClr val="bg2">
+                  <a:lumMod val="90000"/>
+                </a:schemeClr>
+              </a:solidFill>
+              <a:ln>
+                <a:solidFill>
+                  <a:schemeClr val="bg2">
+                    <a:lumMod val="75000"/>
+                  </a:schemeClr>
+                </a:solidFill>
+              </a:ln>
+            </p:spPr>
+            <p:style>
+              <a:lnRef idx="1">
+                <a:schemeClr val="accent1"/>
+              </a:lnRef>
+              <a:fillRef idx="0">
+                <a:schemeClr val="accent1"/>
+              </a:fillRef>
+              <a:effectRef idx="0">
+                <a:schemeClr val="accent1"/>
+              </a:effectRef>
+              <a:fontRef idx="minor">
+                <a:schemeClr val="tx1"/>
+              </a:fontRef>
+            </p:style>
+          </p:cxnSp>
+          <p:cxnSp>
+            <p:nvCxnSpPr>
+              <p:cNvPr id="89" name="Straight Connector 88">
+                <a:extLst>
+                  <a:ext uri="{FF2B5EF4-FFF2-40B4-BE49-F238E27FC236}">
+                    <a16:creationId xmlns:a16="http://schemas.microsoft.com/office/drawing/2014/main" id="{21871944-9988-4F3C-A755-B1DB74D527A8}"/>
+                  </a:ext>
+                </a:extLst>
+              </p:cNvPr>
+              <p:cNvCxnSpPr>
+                <a:cxnSpLocks/>
+              </p:cNvCxnSpPr>
+              <p:nvPr/>
+            </p:nvCxnSpPr>
+            <p:spPr>
+              <a:xfrm>
+                <a:off x="8461384" y="3398379"/>
+                <a:ext cx="0" cy="1105764"/>
+              </a:xfrm>
+              <a:prstGeom prst="line">
+                <a:avLst/>
+              </a:prstGeom>
+              <a:solidFill>
+                <a:schemeClr val="bg2">
+                  <a:lumMod val="90000"/>
+                </a:schemeClr>
+              </a:solidFill>
+              <a:ln>
+                <a:solidFill>
+                  <a:schemeClr val="bg2">
+                    <a:lumMod val="75000"/>
+                  </a:schemeClr>
+                </a:solidFill>
+              </a:ln>
+            </p:spPr>
+            <p:style>
+              <a:lnRef idx="1">
+                <a:schemeClr val="accent1"/>
+              </a:lnRef>
+              <a:fillRef idx="0">
+                <a:schemeClr val="accent1"/>
+              </a:fillRef>
+              <a:effectRef idx="0">
+                <a:schemeClr val="accent1"/>
+              </a:effectRef>
+              <a:fontRef idx="minor">
+                <a:schemeClr val="tx1"/>
+              </a:fontRef>
+            </p:style>
+          </p:cxnSp>
+          <p:cxnSp>
+            <p:nvCxnSpPr>
+              <p:cNvPr id="90" name="Straight Connector 89">
+                <a:extLst>
+                  <a:ext uri="{FF2B5EF4-FFF2-40B4-BE49-F238E27FC236}">
+                    <a16:creationId xmlns:a16="http://schemas.microsoft.com/office/drawing/2014/main" id="{67030473-E3A7-49B3-B529-69E74D1AA030}"/>
+                  </a:ext>
+                </a:extLst>
+              </p:cNvPr>
+              <p:cNvCxnSpPr>
+                <a:cxnSpLocks/>
+              </p:cNvCxnSpPr>
+              <p:nvPr/>
+            </p:nvCxnSpPr>
+            <p:spPr>
+              <a:xfrm>
+                <a:off x="8605538" y="3398379"/>
+                <a:ext cx="0" cy="1105764"/>
+              </a:xfrm>
+              <a:prstGeom prst="line">
+                <a:avLst/>
+              </a:prstGeom>
+              <a:solidFill>
+                <a:schemeClr val="bg2">
+                  <a:lumMod val="90000"/>
+                </a:schemeClr>
+              </a:solidFill>
+              <a:ln>
+                <a:solidFill>
+                  <a:schemeClr val="bg2">
+                    <a:lumMod val="75000"/>
+                  </a:schemeClr>
+                </a:solidFill>
+              </a:ln>
+            </p:spPr>
+            <p:style>
+              <a:lnRef idx="1">
+                <a:schemeClr val="accent1"/>
+              </a:lnRef>
+              <a:fillRef idx="0">
+                <a:schemeClr val="accent1"/>
+              </a:fillRef>
+              <a:effectRef idx="0">
+                <a:schemeClr val="accent1"/>
+              </a:effectRef>
+              <a:fontRef idx="minor">
+                <a:schemeClr val="tx1"/>
+              </a:fontRef>
+            </p:style>
+          </p:cxnSp>
+          <p:cxnSp>
+            <p:nvCxnSpPr>
+              <p:cNvPr id="91" name="Straight Connector 90">
+                <a:extLst>
+                  <a:ext uri="{FF2B5EF4-FFF2-40B4-BE49-F238E27FC236}">
+                    <a16:creationId xmlns:a16="http://schemas.microsoft.com/office/drawing/2014/main" id="{FD420DBA-5B68-4187-9AE9-1F699B78B5F4}"/>
+                  </a:ext>
+                </a:extLst>
+              </p:cNvPr>
+              <p:cNvCxnSpPr>
+                <a:cxnSpLocks/>
+              </p:cNvCxnSpPr>
+              <p:nvPr/>
+            </p:nvCxnSpPr>
+            <p:spPr>
+              <a:xfrm>
+                <a:off x="8749692" y="3398379"/>
+                <a:ext cx="0" cy="1105764"/>
+              </a:xfrm>
+              <a:prstGeom prst="line">
+                <a:avLst/>
+              </a:prstGeom>
+              <a:solidFill>
+                <a:schemeClr val="bg2">
+                  <a:lumMod val="90000"/>
+                </a:schemeClr>
+              </a:solidFill>
+              <a:ln>
+                <a:solidFill>
+                  <a:schemeClr val="bg2">
+                    <a:lumMod val="75000"/>
+                  </a:schemeClr>
+                </a:solidFill>
+              </a:ln>
+            </p:spPr>
+            <p:style>
+              <a:lnRef idx="1">
+                <a:schemeClr val="accent1"/>
+              </a:lnRef>
+              <a:fillRef idx="0">
+                <a:schemeClr val="accent1"/>
+              </a:fillRef>
+              <a:effectRef idx="0">
+                <a:schemeClr val="accent1"/>
+              </a:effectRef>
+              <a:fontRef idx="minor">
+                <a:schemeClr val="tx1"/>
+              </a:fontRef>
+            </p:style>
+          </p:cxnSp>
+          <p:cxnSp>
+            <p:nvCxnSpPr>
+              <p:cNvPr id="92" name="Straight Connector 91">
+                <a:extLst>
+                  <a:ext uri="{FF2B5EF4-FFF2-40B4-BE49-F238E27FC236}">
+                    <a16:creationId xmlns:a16="http://schemas.microsoft.com/office/drawing/2014/main" id="{D8394A3F-5FD1-421D-9EE9-D03445726E24}"/>
+                  </a:ext>
+                </a:extLst>
+              </p:cNvPr>
+              <p:cNvCxnSpPr>
+                <a:cxnSpLocks/>
+              </p:cNvCxnSpPr>
+              <p:nvPr/>
+            </p:nvCxnSpPr>
+            <p:spPr>
+              <a:xfrm>
+                <a:off x="8893845" y="3398379"/>
+                <a:ext cx="0" cy="1105764"/>
+              </a:xfrm>
+              <a:prstGeom prst="line">
+                <a:avLst/>
+              </a:prstGeom>
+              <a:solidFill>
+                <a:schemeClr val="bg2">
+                  <a:lumMod val="90000"/>
+                </a:schemeClr>
+              </a:solidFill>
+              <a:ln>
+                <a:solidFill>
+                  <a:schemeClr val="bg2">
+                    <a:lumMod val="75000"/>
+                  </a:schemeClr>
+                </a:solidFill>
+              </a:ln>
+            </p:spPr>
+            <p:style>
+              <a:lnRef idx="1">
+                <a:schemeClr val="accent1"/>
+              </a:lnRef>
+              <a:fillRef idx="0">
+                <a:schemeClr val="accent1"/>
+              </a:fillRef>
+              <a:effectRef idx="0">
+                <a:schemeClr val="accent1"/>
+              </a:effectRef>
+              <a:fontRef idx="minor">
+                <a:schemeClr val="tx1"/>
+              </a:fontRef>
+            </p:style>
+          </p:cxnSp>
+          <p:cxnSp>
+            <p:nvCxnSpPr>
+              <p:cNvPr id="93" name="Straight Connector 92">
+                <a:extLst>
+                  <a:ext uri="{FF2B5EF4-FFF2-40B4-BE49-F238E27FC236}">
+                    <a16:creationId xmlns:a16="http://schemas.microsoft.com/office/drawing/2014/main" id="{4E8109F2-A7BF-4768-9748-F775BE52EB9F}"/>
+                  </a:ext>
+                </a:extLst>
+              </p:cNvPr>
+              <p:cNvCxnSpPr>
+                <a:cxnSpLocks/>
+              </p:cNvCxnSpPr>
+              <p:nvPr/>
+            </p:nvCxnSpPr>
+            <p:spPr>
+              <a:xfrm>
+                <a:off x="9041511" y="3398379"/>
+                <a:ext cx="0" cy="1105764"/>
+              </a:xfrm>
+              <a:prstGeom prst="line">
+                <a:avLst/>
+              </a:prstGeom>
+              <a:solidFill>
+                <a:schemeClr val="bg2">
+                  <a:lumMod val="90000"/>
+                </a:schemeClr>
+              </a:solidFill>
+              <a:ln>
+                <a:solidFill>
+                  <a:schemeClr val="bg2">
+                    <a:lumMod val="75000"/>
+                  </a:schemeClr>
+                </a:solidFill>
+              </a:ln>
+            </p:spPr>
+            <p:style>
+              <a:lnRef idx="1">
+                <a:schemeClr val="accent1"/>
+              </a:lnRef>
+              <a:fillRef idx="0">
+                <a:schemeClr val="accent1"/>
+              </a:fillRef>
+              <a:effectRef idx="0">
+                <a:schemeClr val="accent1"/>
+              </a:effectRef>
+              <a:fontRef idx="minor">
+                <a:schemeClr val="tx1"/>
+              </a:fontRef>
+            </p:style>
+          </p:cxnSp>
+          <p:cxnSp>
+            <p:nvCxnSpPr>
+              <p:cNvPr id="94" name="Straight Connector 93">
+                <a:extLst>
+                  <a:ext uri="{FF2B5EF4-FFF2-40B4-BE49-F238E27FC236}">
+                    <a16:creationId xmlns:a16="http://schemas.microsoft.com/office/drawing/2014/main" id="{1F9F8B2F-C518-42A7-8E8F-B95C33E1C6C6}"/>
+                  </a:ext>
+                </a:extLst>
+              </p:cNvPr>
+              <p:cNvCxnSpPr>
+                <a:cxnSpLocks/>
+              </p:cNvCxnSpPr>
+              <p:nvPr/>
+            </p:nvCxnSpPr>
+            <p:spPr>
+              <a:xfrm>
+                <a:off x="9181066" y="3398379"/>
+                <a:ext cx="0" cy="1105764"/>
+              </a:xfrm>
+              <a:prstGeom prst="line">
+                <a:avLst/>
+              </a:prstGeom>
+              <a:solidFill>
+                <a:schemeClr val="bg2">
+                  <a:lumMod val="90000"/>
+                </a:schemeClr>
+              </a:solidFill>
+              <a:ln>
+                <a:solidFill>
+                  <a:schemeClr val="bg2">
+                    <a:lumMod val="75000"/>
+                  </a:schemeClr>
+                </a:solidFill>
+              </a:ln>
+            </p:spPr>
+            <p:style>
+              <a:lnRef idx="1">
+                <a:schemeClr val="accent1"/>
+              </a:lnRef>
+              <a:fillRef idx="0">
+                <a:schemeClr val="accent1"/>
+              </a:fillRef>
+              <a:effectRef idx="0">
+                <a:schemeClr val="accent1"/>
+              </a:effectRef>
+              <a:fontRef idx="minor">
+                <a:schemeClr val="tx1"/>
+              </a:fontRef>
+            </p:style>
+          </p:cxnSp>
+          <p:cxnSp>
+            <p:nvCxnSpPr>
+              <p:cNvPr id="95" name="Straight Connector 94">
+                <a:extLst>
+                  <a:ext uri="{FF2B5EF4-FFF2-40B4-BE49-F238E27FC236}">
+                    <a16:creationId xmlns:a16="http://schemas.microsoft.com/office/drawing/2014/main" id="{C539046E-7A31-4560-A978-B4A4599084BF}"/>
+                  </a:ext>
+                </a:extLst>
+              </p:cNvPr>
+              <p:cNvCxnSpPr>
+                <a:cxnSpLocks/>
+              </p:cNvCxnSpPr>
+              <p:nvPr/>
+            </p:nvCxnSpPr>
+            <p:spPr>
+              <a:xfrm>
+                <a:off x="8174163" y="3398379"/>
+                <a:ext cx="0" cy="1105764"/>
+              </a:xfrm>
+              <a:prstGeom prst="line">
+                <a:avLst/>
+              </a:prstGeom>
+              <a:solidFill>
+                <a:schemeClr val="bg2">
+                  <a:lumMod val="90000"/>
+                </a:schemeClr>
+              </a:solidFill>
+              <a:ln>
+                <a:solidFill>
+                  <a:schemeClr val="bg2">
+                    <a:lumMod val="75000"/>
+                  </a:schemeClr>
+                </a:solidFill>
+              </a:ln>
+            </p:spPr>
+            <p:style>
+              <a:lnRef idx="1">
+                <a:schemeClr val="accent1"/>
+              </a:lnRef>
+              <a:fillRef idx="0">
+                <a:schemeClr val="accent1"/>
+              </a:fillRef>
+              <a:effectRef idx="0">
+                <a:schemeClr val="accent1"/>
+              </a:effectRef>
+              <a:fontRef idx="minor">
+                <a:schemeClr val="tx1"/>
+              </a:fontRef>
+            </p:style>
+          </p:cxnSp>
+          <p:cxnSp>
+            <p:nvCxnSpPr>
+              <p:cNvPr id="96" name="Straight Connector 95">
+                <a:extLst>
+                  <a:ext uri="{FF2B5EF4-FFF2-40B4-BE49-F238E27FC236}">
+                    <a16:creationId xmlns:a16="http://schemas.microsoft.com/office/drawing/2014/main" id="{EB8B5389-E3CF-4A5C-A617-C5EA08B3FF66}"/>
+                  </a:ext>
+                </a:extLst>
+              </p:cNvPr>
+              <p:cNvCxnSpPr>
+                <a:cxnSpLocks/>
+              </p:cNvCxnSpPr>
+              <p:nvPr/>
+            </p:nvCxnSpPr>
+            <p:spPr>
+              <a:xfrm>
+                <a:off x="9179980" y="3398379"/>
+                <a:ext cx="0" cy="1105764"/>
+              </a:xfrm>
+              <a:prstGeom prst="line">
+                <a:avLst/>
+              </a:prstGeom>
+              <a:solidFill>
+                <a:schemeClr val="bg2">
+                  <a:lumMod val="90000"/>
+                </a:schemeClr>
+              </a:solidFill>
+              <a:ln>
+                <a:solidFill>
+                  <a:schemeClr val="bg2">
+                    <a:lumMod val="75000"/>
+                  </a:schemeClr>
+                </a:solidFill>
+              </a:ln>
+            </p:spPr>
+            <p:style>
+              <a:lnRef idx="1">
+                <a:schemeClr val="accent1"/>
+              </a:lnRef>
+              <a:fillRef idx="0">
+                <a:schemeClr val="accent1"/>
+              </a:fillRef>
+              <a:effectRef idx="0">
+                <a:schemeClr val="accent1"/>
+              </a:effectRef>
+              <a:fontRef idx="minor">
+                <a:schemeClr val="tx1"/>
+              </a:fontRef>
+            </p:style>
+          </p:cxnSp>
+          <p:cxnSp>
+            <p:nvCxnSpPr>
+              <p:cNvPr id="97" name="Straight Connector 96">
+                <a:extLst>
+                  <a:ext uri="{FF2B5EF4-FFF2-40B4-BE49-F238E27FC236}">
+                    <a16:creationId xmlns:a16="http://schemas.microsoft.com/office/drawing/2014/main" id="{BAAA4B93-6667-4E0C-8F18-B90968434A2C}"/>
+                  </a:ext>
+                </a:extLst>
+              </p:cNvPr>
+              <p:cNvCxnSpPr>
+                <a:cxnSpLocks/>
+              </p:cNvCxnSpPr>
+              <p:nvPr/>
+            </p:nvCxnSpPr>
+            <p:spPr>
+              <a:xfrm>
+                <a:off x="9324134" y="3398379"/>
+                <a:ext cx="0" cy="1105764"/>
+              </a:xfrm>
+              <a:prstGeom prst="line">
+                <a:avLst/>
+              </a:prstGeom>
+              <a:solidFill>
+                <a:schemeClr val="bg2">
+                  <a:lumMod val="90000"/>
+                </a:schemeClr>
+              </a:solidFill>
+              <a:ln>
+                <a:solidFill>
+                  <a:schemeClr val="bg2">
+                    <a:lumMod val="75000"/>
+                  </a:schemeClr>
+                </a:solidFill>
+              </a:ln>
+            </p:spPr>
+            <p:style>
+              <a:lnRef idx="1">
+                <a:schemeClr val="accent1"/>
+              </a:lnRef>
+              <a:fillRef idx="0">
+                <a:schemeClr val="accent1"/>
+              </a:fillRef>
+              <a:effectRef idx="0">
+                <a:schemeClr val="accent1"/>
+              </a:effectRef>
+              <a:fontRef idx="minor">
+                <a:schemeClr val="tx1"/>
+              </a:fontRef>
+            </p:style>
+          </p:cxnSp>
+        </p:grpSp>
+        <p:cxnSp>
+          <p:nvCxnSpPr>
+            <p:cNvPr id="102" name="Straight Connector 101">
+              <a:extLst>
+                <a:ext uri="{FF2B5EF4-FFF2-40B4-BE49-F238E27FC236}">
+                  <a16:creationId xmlns:a16="http://schemas.microsoft.com/office/drawing/2014/main" id="{6BE504D8-B3D1-4D35-AEDA-748E77AA2465}"/>
+                </a:ext>
+              </a:extLst>
+            </p:cNvPr>
+            <p:cNvCxnSpPr>
+              <a:cxnSpLocks/>
+            </p:cNvCxnSpPr>
+            <p:nvPr/>
+          </p:nvCxnSpPr>
+          <p:spPr>
+            <a:xfrm>
+              <a:off x="2378964" y="5187125"/>
+              <a:ext cx="0" cy="1105764"/>
+            </a:xfrm>
+            <a:prstGeom prst="line">
+              <a:avLst/>
+            </a:prstGeom>
+            <a:solidFill>
+              <a:schemeClr val="bg2">
+                <a:lumMod val="90000"/>
+              </a:schemeClr>
+            </a:solidFill>
+            <a:ln>
+              <a:solidFill>
+                <a:schemeClr val="bg2">
+                  <a:lumMod val="75000"/>
+                </a:schemeClr>
+              </a:solidFill>
+            </a:ln>
+          </p:spPr>
+          <p:style>
+            <a:lnRef idx="1">
+              <a:schemeClr val="accent1"/>
+            </a:lnRef>
+            <a:fillRef idx="0">
+              <a:schemeClr val="accent1"/>
+            </a:fillRef>
+            <a:effectRef idx="0">
+              <a:schemeClr val="accent1"/>
+            </a:effectRef>
+            <a:fontRef idx="minor">
+              <a:schemeClr val="tx1"/>
+            </a:fontRef>
+          </p:style>
+        </p:cxnSp>
+        <p:sp>
+          <p:nvSpPr>
+            <p:cNvPr id="103" name="Half Frame 102">
+              <a:extLst>
+                <a:ext uri="{FF2B5EF4-FFF2-40B4-BE49-F238E27FC236}">
+                  <a16:creationId xmlns:a16="http://schemas.microsoft.com/office/drawing/2014/main" id="{5CD83E42-071A-42C6-88B6-F0169B0F1407}"/>
+                </a:ext>
+              </a:extLst>
+            </p:cNvPr>
+            <p:cNvSpPr/>
+            <p:nvPr/>
+          </p:nvSpPr>
+          <p:spPr>
+            <a:xfrm rot="8059677">
+              <a:off x="4189743" y="5363877"/>
+              <a:ext cx="839188" cy="819323"/>
+            </a:xfrm>
+            <a:prstGeom prst="halfFrame">
+              <a:avLst>
+                <a:gd name="adj1" fmla="val 6022"/>
+                <a:gd name="adj2" fmla="val 6672"/>
+              </a:avLst>
+            </a:prstGeom>
+            <a:solidFill>
+              <a:srgbClr val="66CCFF"/>
+            </a:solidFill>
+            <a:ln>
+              <a:solidFill>
+                <a:srgbClr val="66CCFF"/>
+              </a:solidFill>
+            </a:ln>
+          </p:spPr>
+          <p:style>
+            <a:lnRef idx="2">
+              <a:schemeClr val="dk1">
+                <a:shade val="50000"/>
+              </a:schemeClr>
+            </a:lnRef>
+            <a:fillRef idx="1">
+              <a:schemeClr val="dk1"/>
+            </a:fillRef>
+            <a:effectRef idx="0">
+              <a:schemeClr val="dk1"/>
+            </a:effectRef>
+            <a:fontRef idx="minor">
+              <a:schemeClr val="lt1"/>
+            </a:fontRef>
+          </p:style>
+          <p:txBody>
+            <a:bodyPr rtlCol="0" anchor="ctr"/>
+            <a:lstStyle/>
+            <a:p>
+              <a:pPr algn="ctr"/>
+              <a:endParaRPr lang="en-US">
+                <a:solidFill>
+                  <a:schemeClr val="tx1"/>
+                </a:solidFill>
+              </a:endParaRPr>
+            </a:p>
+          </p:txBody>
+        </p:sp>
+        <p:sp>
+          <p:nvSpPr>
+            <p:cNvPr id="104" name="Speech Bubble: Rectangle 103">
+              <a:extLst>
+                <a:ext uri="{FF2B5EF4-FFF2-40B4-BE49-F238E27FC236}">
+                  <a16:creationId xmlns:a16="http://schemas.microsoft.com/office/drawing/2014/main" id="{0EC814BD-C80E-4799-BEC4-FB6293718F81}"/>
+                </a:ext>
+              </a:extLst>
+            </p:cNvPr>
+            <p:cNvSpPr/>
+            <p:nvPr/>
+          </p:nvSpPr>
+          <p:spPr>
+            <a:xfrm>
+              <a:off x="5546062" y="5487253"/>
+              <a:ext cx="2776638" cy="534103"/>
+            </a:xfrm>
+            <a:prstGeom prst="wedgeRectCallout">
+              <a:avLst>
+                <a:gd name="adj1" fmla="val -60500"/>
+                <a:gd name="adj2" fmla="val -7955"/>
+              </a:avLst>
+            </a:prstGeom>
+            <a:noFill/>
+            <a:ln>
+              <a:noFill/>
+            </a:ln>
+          </p:spPr>
+          <p:style>
+            <a:lnRef idx="2">
+              <a:schemeClr val="accent1">
+                <a:shade val="50000"/>
+              </a:schemeClr>
+            </a:lnRef>
+            <a:fillRef idx="1">
+              <a:schemeClr val="accent1"/>
+            </a:fillRef>
+            <a:effectRef idx="0">
+              <a:schemeClr val="accent1"/>
+            </a:effectRef>
+            <a:fontRef idx="minor">
+              <a:schemeClr val="lt1"/>
+            </a:fontRef>
+          </p:style>
+          <p:txBody>
+            <a:bodyPr rtlCol="0" anchor="ctr"/>
+            <a:lstStyle/>
+            <a:p>
+              <a:r>
+                <a:rPr lang="de-DE" sz="2400" i="1">
+                  <a:solidFill>
+                    <a:schemeClr val="tx1"/>
+                  </a:solidFill>
+                </a:rPr>
+                <a:t>sentiment analysis</a:t>
+              </a:r>
+              <a:endParaRPr lang="en-US" sz="2400" i="1">
+                <a:solidFill>
+                  <a:schemeClr val="tx1"/>
+                </a:solidFill>
+              </a:endParaRPr>
+            </a:p>
+          </p:txBody>
+        </p:sp>
+        <p:cxnSp>
+          <p:nvCxnSpPr>
+            <p:cNvPr id="108" name="Straight Connector 107">
+              <a:extLst>
+                <a:ext uri="{FF2B5EF4-FFF2-40B4-BE49-F238E27FC236}">
+                  <a16:creationId xmlns:a16="http://schemas.microsoft.com/office/drawing/2014/main" id="{B99C51BB-1A42-4D87-BDA6-B86CA67C3804}"/>
+                </a:ext>
+              </a:extLst>
+            </p:cNvPr>
+            <p:cNvCxnSpPr>
+              <a:cxnSpLocks/>
+            </p:cNvCxnSpPr>
+            <p:nvPr/>
+          </p:nvCxnSpPr>
+          <p:spPr>
+            <a:xfrm>
+              <a:off x="1066800" y="4857282"/>
+              <a:ext cx="8662416" cy="0"/>
+            </a:xfrm>
+            <a:prstGeom prst="line">
+              <a:avLst/>
+            </a:prstGeom>
+            <a:ln w="28575">
+              <a:solidFill>
+                <a:schemeClr val="tx1"/>
+              </a:solidFill>
+              <a:prstDash val="sysDash"/>
+            </a:ln>
+          </p:spPr>
+          <p:style>
+            <a:lnRef idx="1">
+              <a:schemeClr val="accent1"/>
+            </a:lnRef>
+            <a:fillRef idx="0">
+              <a:schemeClr val="accent1"/>
+            </a:fillRef>
+            <a:effectRef idx="0">
+              <a:schemeClr val="accent1"/>
+            </a:effectRef>
+            <a:fontRef idx="minor">
+              <a:schemeClr val="tx1"/>
+            </a:fontRef>
+          </p:style>
+        </p:cxnSp>
+        <p:pic>
+          <p:nvPicPr>
+            <p:cNvPr id="109" name="Picture 108" descr="Icon&#10;&#10;Description automatically generated">
+              <a:extLst>
+                <a:ext uri="{FF2B5EF4-FFF2-40B4-BE49-F238E27FC236}">
+                  <a16:creationId xmlns:a16="http://schemas.microsoft.com/office/drawing/2014/main" id="{D87D366F-E3B1-497B-B27A-ABCFDC008272}"/>
+                </a:ext>
+              </a:extLst>
+            </p:cNvPr>
+            <p:cNvPicPr>
+              <a:picLocks noChangeAspect="1"/>
+            </p:cNvPicPr>
+            <p:nvPr/>
+          </p:nvPicPr>
+          <p:blipFill rotWithShape="1">
+            <a:blip r:embed="rId5" cstate="print">
+              <a:extLst>
+                <a:ext uri="{BEBA8EAE-BF5A-486C-A8C5-ECC9F3942E4B}">
+                  <a14:imgProps xmlns:a14="http://schemas.microsoft.com/office/drawing/2010/main">
+                    <a14:imgLayer r:embed="rId6">
+                      <a14:imgEffect>
+                        <a14:backgroundRemoval t="9804" b="89706" l="1481" r="95062">
+                          <a14:foregroundMark x1="83951" y1="52941" x2="71111" y2="68627"/>
+                          <a14:foregroundMark x1="78765" y1="27451" x2="86173" y2="60784"/>
+                          <a14:foregroundMark x1="86173" y1="60784" x2="83951" y2="41176"/>
+                          <a14:foregroundMark x1="89136" y1="22549" x2="90370" y2="33824"/>
+                          <a14:foregroundMark x1="83951" y1="23529" x2="92099" y2="38235"/>
+                          <a14:foregroundMark x1="95062" y1="26471" x2="95062" y2="26471"/>
+                          <a14:foregroundMark x1="93827" y1="38725" x2="93827" y2="38725"/>
+                          <a14:foregroundMark x1="94568" y1="21078" x2="94568" y2="21078"/>
+                          <a14:foregroundMark x1="92346" y1="38235" x2="93580" y2="36765"/>
+                          <a14:foregroundMark x1="92346" y1="36765" x2="93086" y2="38235"/>
+                          <a14:foregroundMark x1="47654" y1="47059" x2="47654" y2="47059"/>
+                          <a14:foregroundMark x1="47654" y1="38725" x2="47654" y2="28431"/>
+                          <a14:foregroundMark x1="1481" y1="56863" x2="2963" y2="33333"/>
+                          <a14:foregroundMark x1="9136" y1="31373" x2="10123" y2="42647"/>
+                          <a14:foregroundMark x1="28395" y1="47549" x2="28889" y2="55392"/>
+                          <a14:backgroundMark x1="69383" y1="9804" x2="54321" y2="4902"/>
+                          <a14:backgroundMark x1="54321" y1="4902" x2="55802" y2="9314"/>
+                          <a14:backgroundMark x1="93528" y1="37546" x2="94568" y2="38725"/>
+                        </a14:backgroundRemoval>
+                      </a14:imgEffect>
+                    </a14:imgLayer>
+                  </a14:imgProps>
+                </a:ext>
+                <a:ext uri="{28A0092B-C50C-407E-A947-70E740481C1C}">
+                  <a14:useLocalDpi xmlns:a14="http://schemas.microsoft.com/office/drawing/2010/main" val="0"/>
+                </a:ext>
+              </a:extLst>
+            </a:blip>
+            <a:srcRect r="50000"/>
+            <a:stretch/>
+          </p:blipFill>
+          <p:spPr>
+            <a:xfrm>
+              <a:off x="8579457" y="5127517"/>
+              <a:ext cx="1206043" cy="1215970"/>
+            </a:xfrm>
+            <a:prstGeom prst="rect">
+              <a:avLst/>
+            </a:prstGeom>
+          </p:spPr>
+        </p:pic>
+      </p:grpSp>
     </p:spTree>
     <p:extLst>
       <p:ext uri="{BB962C8B-B14F-4D97-AF65-F5344CB8AC3E}">
-        <p14:creationId xmlns:p14="http://schemas.microsoft.com/office/powerpoint/2010/main" val="2898289662"/>
+        <p14:creationId xmlns:p14="http://schemas.microsoft.com/office/powerpoint/2010/main" val="3827436290"/>
       </p:ext>
     </p:extLst>
   </p:cSld>
@@ -14437,6 +17893,85 @@
       </p:grpSpPr>
       <p:sp>
         <p:nvSpPr>
+          <p:cNvPr id="2" name="Titel 1"/>
+          <p:cNvSpPr>
+            <a:spLocks noGrp="1"/>
+          </p:cNvSpPr>
+          <p:nvPr>
+            <p:ph type="title"/>
+          </p:nvPr>
+        </p:nvSpPr>
+        <p:spPr>
+          <a:xfrm>
+            <a:off x="1047750" y="1990724"/>
+            <a:ext cx="10299700" cy="2886075"/>
+          </a:xfrm>
+        </p:spPr>
+        <p:txBody>
+          <a:bodyPr/>
+          <a:lstStyle/>
+          <a:p>
+            <a:r>
+              <a:rPr lang="en-GB" b="1">
+                <a:effectLst>
+                  <a:outerShdw blurRad="38100" dist="38100" dir="2700000" algn="tl">
+                    <a:srgbClr val="000000">
+                      <a:alpha val="43137"/>
+                    </a:srgbClr>
+                  </a:outerShdw>
+                </a:effectLst>
+              </a:rPr>
+              <a:t>Part I: Intro NLP &amp; Task at Hand</a:t>
+            </a:r>
+            <a:endParaRPr lang="en-US" b="1">
+              <a:effectLst>
+                <a:outerShdw blurRad="38100" dist="38100" dir="2700000" algn="tl">
+                  <a:srgbClr val="000000">
+                    <a:alpha val="43137"/>
+                  </a:srgbClr>
+                </a:outerShdw>
+              </a:effectLst>
+            </a:endParaRPr>
+          </a:p>
+        </p:txBody>
+      </p:sp>
+      <p:sp>
+        <p:nvSpPr>
+          <p:cNvPr id="3" name="Textplatzhalter 2"/>
+          <p:cNvSpPr>
+            <a:spLocks noGrp="1"/>
+          </p:cNvSpPr>
+          <p:nvPr>
+            <p:ph type="body" idx="1"/>
+          </p:nvPr>
+        </p:nvSpPr>
+        <p:spPr>
+          <a:xfrm>
+            <a:off x="1047748" y="4876799"/>
+            <a:ext cx="10299701" cy="1212851"/>
+          </a:xfrm>
+        </p:spPr>
+        <p:txBody>
+          <a:bodyPr/>
+          <a:lstStyle/>
+          <a:p>
+            <a:r>
+              <a:rPr lang="en-US" b="1">
+                <a:effectLst>
+                  <a:outerShdw blurRad="38100" dist="38100" dir="2700000" algn="tl">
+                    <a:srgbClr val="000000">
+                      <a:alpha val="43137"/>
+                    </a:srgbClr>
+                  </a:outerShdw>
+                </a:effectLst>
+              </a:rPr>
+              <a:t>Quanteda Universe</a:t>
+            </a:r>
+          </a:p>
+        </p:txBody>
+      </p:sp>
+      <p:sp>
+        <p:nvSpPr>
           <p:cNvPr id="4" name="Foliennummernplatzhalter 3"/>
           <p:cNvSpPr>
             <a:spLocks noGrp="1"/>
@@ -14453,6 +17988,59 @@
             <a:fld id="{C9E0B00B-E6DF-4183-A694-3DE28BEFB357}" type="slidenum">
               <a:rPr lang="en-US" smtClean="0"/>
               <a:t>28</a:t>
+            </a:fld>
+            <a:endParaRPr lang="en-US"/>
+          </a:p>
+        </p:txBody>
+      </p:sp>
+    </p:spTree>
+    <p:extLst>
+      <p:ext uri="{BB962C8B-B14F-4D97-AF65-F5344CB8AC3E}">
+        <p14:creationId xmlns:p14="http://schemas.microsoft.com/office/powerpoint/2010/main" val="2898289662"/>
+      </p:ext>
+    </p:extLst>
+  </p:cSld>
+  <p:clrMapOvr>
+    <a:masterClrMapping/>
+  </p:clrMapOvr>
+</p:sld>
+</file>
+
+<file path=ppt/slides/slide29.xml><?xml version="1.0" encoding="utf-8"?>
+<p:sld xmlns:a="http://schemas.openxmlformats.org/drawingml/2006/main" xmlns:r="http://schemas.openxmlformats.org/officeDocument/2006/relationships" xmlns:p="http://schemas.openxmlformats.org/presentationml/2006/main">
+  <p:cSld>
+    <p:spTree>
+      <p:nvGrpSpPr>
+        <p:cNvPr id="1" name=""/>
+        <p:cNvGrpSpPr/>
+        <p:nvPr/>
+      </p:nvGrpSpPr>
+      <p:grpSpPr>
+        <a:xfrm>
+          <a:off x="0" y="0"/>
+          <a:ext cx="0" cy="0"/>
+          <a:chOff x="0" y="0"/>
+          <a:chExt cx="0" cy="0"/>
+        </a:xfrm>
+      </p:grpSpPr>
+      <p:sp>
+        <p:nvSpPr>
+          <p:cNvPr id="4" name="Foliennummernplatzhalter 3"/>
+          <p:cNvSpPr>
+            <a:spLocks noGrp="1"/>
+          </p:cNvSpPr>
+          <p:nvPr>
+            <p:ph type="sldNum" sz="quarter" idx="12"/>
+          </p:nvPr>
+        </p:nvSpPr>
+        <p:spPr/>
+        <p:txBody>
+          <a:bodyPr/>
+          <a:lstStyle/>
+          <a:p>
+            <a:fld id="{C9E0B00B-E6DF-4183-A694-3DE28BEFB357}" type="slidenum">
+              <a:rPr lang="en-US" smtClean="0"/>
+              <a:t>29</a:t>
             </a:fld>
             <a:endParaRPr lang="en-US"/>
           </a:p>
@@ -14726,7 +18314,7 @@
 </p:sld>
 </file>
 
-<file path=ppt/slides/slide29.xml><?xml version="1.0" encoding="utf-8"?>
+<file path=ppt/slides/slide3.xml><?xml version="1.0" encoding="utf-8"?>
 <p:sld xmlns:a="http://schemas.openxmlformats.org/drawingml/2006/main" xmlns:r="http://schemas.openxmlformats.org/officeDocument/2006/relationships" xmlns:p="http://schemas.openxmlformats.org/presentationml/2006/main">
   <p:cSld>
     <p:spTree>
@@ -14745,6 +18333,85 @@
       </p:grpSpPr>
       <p:sp>
         <p:nvSpPr>
+          <p:cNvPr id="2" name="Titel 1"/>
+          <p:cNvSpPr>
+            <a:spLocks noGrp="1"/>
+          </p:cNvSpPr>
+          <p:nvPr>
+            <p:ph type="title"/>
+          </p:nvPr>
+        </p:nvSpPr>
+        <p:spPr>
+          <a:xfrm>
+            <a:off x="1066800" y="1990724"/>
+            <a:ext cx="10280650" cy="2886075"/>
+          </a:xfrm>
+        </p:spPr>
+        <p:txBody>
+          <a:bodyPr/>
+          <a:lstStyle/>
+          <a:p>
+            <a:r>
+              <a:rPr lang="en-GB" b="1">
+                <a:effectLst>
+                  <a:outerShdw blurRad="38100" dist="38100" dir="2700000" algn="tl">
+                    <a:srgbClr val="000000">
+                      <a:alpha val="43137"/>
+                    </a:srgbClr>
+                  </a:outerShdw>
+                </a:effectLst>
+              </a:rPr>
+              <a:t>Part I: Intro NLP &amp; Task at Hand</a:t>
+            </a:r>
+            <a:endParaRPr lang="en-US" b="1">
+              <a:effectLst>
+                <a:outerShdw blurRad="38100" dist="38100" dir="2700000" algn="tl">
+                  <a:srgbClr val="000000">
+                    <a:alpha val="43137"/>
+                  </a:srgbClr>
+                </a:outerShdw>
+              </a:effectLst>
+            </a:endParaRPr>
+          </a:p>
+        </p:txBody>
+      </p:sp>
+      <p:sp>
+        <p:nvSpPr>
+          <p:cNvPr id="3" name="Textplatzhalter 2"/>
+          <p:cNvSpPr>
+            <a:spLocks noGrp="1"/>
+          </p:cNvSpPr>
+          <p:nvPr>
+            <p:ph type="body" idx="1"/>
+          </p:nvPr>
+        </p:nvSpPr>
+        <p:spPr>
+          <a:xfrm>
+            <a:off x="1066798" y="4876799"/>
+            <a:ext cx="10280651" cy="1212851"/>
+          </a:xfrm>
+        </p:spPr>
+        <p:txBody>
+          <a:bodyPr/>
+          <a:lstStyle/>
+          <a:p>
+            <a:r>
+              <a:rPr lang="en-US" b="1">
+                <a:effectLst>
+                  <a:outerShdw blurRad="38100" dist="38100" dir="2700000" algn="tl">
+                    <a:srgbClr val="000000">
+                      <a:alpha val="43137"/>
+                    </a:srgbClr>
+                  </a:outerShdw>
+                </a:effectLst>
+              </a:rPr>
+              <a:t>Intro NLP</a:t>
+            </a:r>
+          </a:p>
+        </p:txBody>
+      </p:sp>
+      <p:sp>
+        <p:nvSpPr>
           <p:cNvPr id="4" name="Foliennummernplatzhalter 3"/>
           <p:cNvSpPr>
             <a:spLocks noGrp="1"/>
@@ -14760,7 +18427,60 @@
           <a:p>
             <a:fld id="{C9E0B00B-E6DF-4183-A694-3DE28BEFB357}" type="slidenum">
               <a:rPr lang="en-US" smtClean="0"/>
-              <a:t>29</a:t>
+              <a:t>3</a:t>
+            </a:fld>
+            <a:endParaRPr lang="en-US"/>
+          </a:p>
+        </p:txBody>
+      </p:sp>
+    </p:spTree>
+    <p:extLst>
+      <p:ext uri="{BB962C8B-B14F-4D97-AF65-F5344CB8AC3E}">
+        <p14:creationId xmlns:p14="http://schemas.microsoft.com/office/powerpoint/2010/main" val="2635496787"/>
+      </p:ext>
+    </p:extLst>
+  </p:cSld>
+  <p:clrMapOvr>
+    <a:masterClrMapping/>
+  </p:clrMapOvr>
+</p:sld>
+</file>
+
+<file path=ppt/slides/slide30.xml><?xml version="1.0" encoding="utf-8"?>
+<p:sld xmlns:a="http://schemas.openxmlformats.org/drawingml/2006/main" xmlns:r="http://schemas.openxmlformats.org/officeDocument/2006/relationships" xmlns:p="http://schemas.openxmlformats.org/presentationml/2006/main">
+  <p:cSld>
+    <p:spTree>
+      <p:nvGrpSpPr>
+        <p:cNvPr id="1" name=""/>
+        <p:cNvGrpSpPr/>
+        <p:nvPr/>
+      </p:nvGrpSpPr>
+      <p:grpSpPr>
+        <a:xfrm>
+          <a:off x="0" y="0"/>
+          <a:ext cx="0" cy="0"/>
+          <a:chOff x="0" y="0"/>
+          <a:chExt cx="0" cy="0"/>
+        </a:xfrm>
+      </p:grpSpPr>
+      <p:sp>
+        <p:nvSpPr>
+          <p:cNvPr id="4" name="Foliennummernplatzhalter 3"/>
+          <p:cNvSpPr>
+            <a:spLocks noGrp="1"/>
+          </p:cNvSpPr>
+          <p:nvPr>
+            <p:ph type="sldNum" sz="quarter" idx="12"/>
+          </p:nvPr>
+        </p:nvSpPr>
+        <p:spPr/>
+        <p:txBody>
+          <a:bodyPr/>
+          <a:lstStyle/>
+          <a:p>
+            <a:fld id="{C9E0B00B-E6DF-4183-A694-3DE28BEFB357}" type="slidenum">
+              <a:rPr lang="en-US" smtClean="0"/>
+              <a:t>30</a:t>
             </a:fld>
             <a:endParaRPr lang="en-US"/>
           </a:p>
@@ -15158,7 +18878,7 @@
 </p:sld>
 </file>
 
-<file path=ppt/slides/slide3.xml><?xml version="1.0" encoding="utf-8"?>
+<file path=ppt/slides/slide31.xml><?xml version="1.0" encoding="utf-8"?>
 <p:sld xmlns:a="http://schemas.openxmlformats.org/drawingml/2006/main" xmlns:r="http://schemas.openxmlformats.org/officeDocument/2006/relationships" xmlns:p="http://schemas.openxmlformats.org/presentationml/2006/main">
   <p:cSld>
     <p:spTree>
@@ -15177,85 +18897,6 @@
       </p:grpSpPr>
       <p:sp>
         <p:nvSpPr>
-          <p:cNvPr id="2" name="Titel 1"/>
-          <p:cNvSpPr>
-            <a:spLocks noGrp="1"/>
-          </p:cNvSpPr>
-          <p:nvPr>
-            <p:ph type="title"/>
-          </p:nvPr>
-        </p:nvSpPr>
-        <p:spPr>
-          <a:xfrm>
-            <a:off x="1066800" y="1990724"/>
-            <a:ext cx="10280650" cy="2886075"/>
-          </a:xfrm>
-        </p:spPr>
-        <p:txBody>
-          <a:bodyPr/>
-          <a:lstStyle/>
-          <a:p>
-            <a:r>
-              <a:rPr lang="en-GB" b="1">
-                <a:effectLst>
-                  <a:outerShdw blurRad="38100" dist="38100" dir="2700000" algn="tl">
-                    <a:srgbClr val="000000">
-                      <a:alpha val="43137"/>
-                    </a:srgbClr>
-                  </a:outerShdw>
-                </a:effectLst>
-              </a:rPr>
-              <a:t>Part I: Intro NLP &amp; Task at Hand</a:t>
-            </a:r>
-            <a:endParaRPr lang="en-US" b="1">
-              <a:effectLst>
-                <a:outerShdw blurRad="38100" dist="38100" dir="2700000" algn="tl">
-                  <a:srgbClr val="000000">
-                    <a:alpha val="43137"/>
-                  </a:srgbClr>
-                </a:outerShdw>
-              </a:effectLst>
-            </a:endParaRPr>
-          </a:p>
-        </p:txBody>
-      </p:sp>
-      <p:sp>
-        <p:nvSpPr>
-          <p:cNvPr id="3" name="Textplatzhalter 2"/>
-          <p:cNvSpPr>
-            <a:spLocks noGrp="1"/>
-          </p:cNvSpPr>
-          <p:nvPr>
-            <p:ph type="body" idx="1"/>
-          </p:nvPr>
-        </p:nvSpPr>
-        <p:spPr>
-          <a:xfrm>
-            <a:off x="1066798" y="4876799"/>
-            <a:ext cx="10280651" cy="1212851"/>
-          </a:xfrm>
-        </p:spPr>
-        <p:txBody>
-          <a:bodyPr/>
-          <a:lstStyle/>
-          <a:p>
-            <a:r>
-              <a:rPr lang="en-US" b="1">
-                <a:effectLst>
-                  <a:outerShdw blurRad="38100" dist="38100" dir="2700000" algn="tl">
-                    <a:srgbClr val="000000">
-                      <a:alpha val="43137"/>
-                    </a:srgbClr>
-                  </a:outerShdw>
-                </a:effectLst>
-              </a:rPr>
-              <a:t>Intro NLP</a:t>
-            </a:r>
-          </a:p>
-        </p:txBody>
-      </p:sp>
-      <p:sp>
-        <p:nvSpPr>
           <p:cNvPr id="4" name="Foliennummernplatzhalter 3"/>
           <p:cNvSpPr>
             <a:spLocks noGrp="1"/>
@@ -15271,60 +18912,7 @@
           <a:p>
             <a:fld id="{C9E0B00B-E6DF-4183-A694-3DE28BEFB357}" type="slidenum">
               <a:rPr lang="en-US" smtClean="0"/>
-              <a:t>3</a:t>
-            </a:fld>
-            <a:endParaRPr lang="en-US"/>
-          </a:p>
-        </p:txBody>
-      </p:sp>
-    </p:spTree>
-    <p:extLst>
-      <p:ext uri="{BB962C8B-B14F-4D97-AF65-F5344CB8AC3E}">
-        <p14:creationId xmlns:p14="http://schemas.microsoft.com/office/powerpoint/2010/main" val="2635496787"/>
-      </p:ext>
-    </p:extLst>
-  </p:cSld>
-  <p:clrMapOvr>
-    <a:masterClrMapping/>
-  </p:clrMapOvr>
-</p:sld>
-</file>
-
-<file path=ppt/slides/slide30.xml><?xml version="1.0" encoding="utf-8"?>
-<p:sld xmlns:a="http://schemas.openxmlformats.org/drawingml/2006/main" xmlns:r="http://schemas.openxmlformats.org/officeDocument/2006/relationships" xmlns:p="http://schemas.openxmlformats.org/presentationml/2006/main">
-  <p:cSld>
-    <p:spTree>
-      <p:nvGrpSpPr>
-        <p:cNvPr id="1" name=""/>
-        <p:cNvGrpSpPr/>
-        <p:nvPr/>
-      </p:nvGrpSpPr>
-      <p:grpSpPr>
-        <a:xfrm>
-          <a:off x="0" y="0"/>
-          <a:ext cx="0" cy="0"/>
-          <a:chOff x="0" y="0"/>
-          <a:chExt cx="0" cy="0"/>
-        </a:xfrm>
-      </p:grpSpPr>
-      <p:sp>
-        <p:nvSpPr>
-          <p:cNvPr id="4" name="Foliennummernplatzhalter 3"/>
-          <p:cNvSpPr>
-            <a:spLocks noGrp="1"/>
-          </p:cNvSpPr>
-          <p:nvPr>
-            <p:ph type="sldNum" sz="quarter" idx="12"/>
-          </p:nvPr>
-        </p:nvSpPr>
-        <p:spPr/>
-        <p:txBody>
-          <a:bodyPr/>
-          <a:lstStyle/>
-          <a:p>
-            <a:fld id="{C9E0B00B-E6DF-4183-A694-3DE28BEFB357}" type="slidenum">
-              <a:rPr lang="en-US" smtClean="0"/>
-              <a:t>30</a:t>
+              <a:t>31</a:t>
             </a:fld>
             <a:endParaRPr lang="en-US"/>
           </a:p>
@@ -15672,7 +19260,7 @@
 </p:sld>
 </file>
 
-<file path=ppt/slides/slide31.xml><?xml version="1.0" encoding="utf-8"?>
+<file path=ppt/slides/slide32.xml><?xml version="1.0" encoding="utf-8"?>
 <p:sld xmlns:a="http://schemas.openxmlformats.org/drawingml/2006/main" xmlns:r="http://schemas.openxmlformats.org/officeDocument/2006/relationships" xmlns:p="http://schemas.openxmlformats.org/presentationml/2006/main">
   <p:cSld>
     <p:spTree>
@@ -15706,7 +19294,7 @@
           <a:p>
             <a:fld id="{C9E0B00B-E6DF-4183-A694-3DE28BEFB357}" type="slidenum">
               <a:rPr lang="en-US" smtClean="0"/>
-              <a:t>31</a:t>
+              <a:t>32</a:t>
             </a:fld>
             <a:endParaRPr lang="en-US"/>
           </a:p>
@@ -15930,7 +19518,7 @@
 </p:sld>
 </file>
 
-<file path=ppt/slides/slide32.xml><?xml version="1.0" encoding="utf-8"?>
+<file path=ppt/slides/slide33.xml><?xml version="1.0" encoding="utf-8"?>
 <p:sld xmlns:a="http://schemas.openxmlformats.org/drawingml/2006/main" xmlns:r="http://schemas.openxmlformats.org/officeDocument/2006/relationships" xmlns:p="http://schemas.openxmlformats.org/presentationml/2006/main">
   <p:cSld>
     <p:spTree>
@@ -15964,7 +19552,7 @@
           <a:p>
             <a:fld id="{C9E0B00B-E6DF-4183-A694-3DE28BEFB357}" type="slidenum">
               <a:rPr lang="en-US" smtClean="0"/>
-              <a:t>32</a:t>
+              <a:t>33</a:t>
             </a:fld>
             <a:endParaRPr lang="en-US"/>
           </a:p>
@@ -16208,7 +19796,7 @@
 </p:sld>
 </file>
 
-<file path=ppt/slides/slide33.xml><?xml version="1.0" encoding="utf-8"?>
+<file path=ppt/slides/slide34.xml><?xml version="1.0" encoding="utf-8"?>
 <p:sld xmlns:a="http://schemas.openxmlformats.org/drawingml/2006/main" xmlns:r="http://schemas.openxmlformats.org/officeDocument/2006/relationships" xmlns:p="http://schemas.openxmlformats.org/presentationml/2006/main">
   <p:cSld>
     <p:spTree>
@@ -16242,7 +19830,7 @@
           <a:p>
             <a:fld id="{C9E0B00B-E6DF-4183-A694-3DE28BEFB357}" type="slidenum">
               <a:rPr lang="en-US" smtClean="0"/>
-              <a:t>33</a:t>
+              <a:t>34</a:t>
             </a:fld>
             <a:endParaRPr lang="en-US"/>
           </a:p>
@@ -16396,7 +19984,7 @@
 </p:sld>
 </file>
 
-<file path=ppt/slides/slide34.xml><?xml version="1.0" encoding="utf-8"?>
+<file path=ppt/slides/slide35.xml><?xml version="1.0" encoding="utf-8"?>
 <p:sld xmlns:a="http://schemas.openxmlformats.org/drawingml/2006/main" xmlns:r="http://schemas.openxmlformats.org/officeDocument/2006/relationships" xmlns:p="http://schemas.openxmlformats.org/presentationml/2006/main">
   <p:cSld>
     <p:spTree>
@@ -16430,7 +20018,7 @@
           <a:p>
             <a:fld id="{C9E0B00B-E6DF-4183-A694-3DE28BEFB357}" type="slidenum">
               <a:rPr lang="en-US" smtClean="0"/>
-              <a:t>34</a:t>
+              <a:t>35</a:t>
             </a:fld>
             <a:endParaRPr lang="en-US"/>
           </a:p>
@@ -16662,7 +20250,7 @@
 </p:sld>
 </file>
 
-<file path=ppt/slides/slide35.xml><?xml version="1.0" encoding="utf-8"?>
+<file path=ppt/slides/slide36.xml><?xml version="1.0" encoding="utf-8"?>
 <p:sld xmlns:a="http://schemas.openxmlformats.org/drawingml/2006/main" xmlns:r="http://schemas.openxmlformats.org/officeDocument/2006/relationships" xmlns:p="http://schemas.openxmlformats.org/presentationml/2006/main">
   <p:cSld>
     <p:spTree>
@@ -16696,7 +20284,7 @@
           <a:p>
             <a:fld id="{C9E0B00B-E6DF-4183-A694-3DE28BEFB357}" type="slidenum">
               <a:rPr lang="en-US" smtClean="0"/>
-              <a:t>35</a:t>
+              <a:t>36</a:t>
             </a:fld>
             <a:endParaRPr lang="en-US"/>
           </a:p>
@@ -17171,138 +20759,6 @@
 </p:sld>
 </file>
 
-<file path=ppt/slides/slide36.xml><?xml version="1.0" encoding="utf-8"?>
-<p:sld xmlns:a="http://schemas.openxmlformats.org/drawingml/2006/main" xmlns:r="http://schemas.openxmlformats.org/officeDocument/2006/relationships" xmlns:p="http://schemas.openxmlformats.org/presentationml/2006/main">
-  <p:cSld>
-    <p:spTree>
-      <p:nvGrpSpPr>
-        <p:cNvPr id="1" name=""/>
-        <p:cNvGrpSpPr/>
-        <p:nvPr/>
-      </p:nvGrpSpPr>
-      <p:grpSpPr>
-        <a:xfrm>
-          <a:off x="0" y="0"/>
-          <a:ext cx="0" cy="0"/>
-          <a:chOff x="0" y="0"/>
-          <a:chExt cx="0" cy="0"/>
-        </a:xfrm>
-      </p:grpSpPr>
-      <p:sp>
-        <p:nvSpPr>
-          <p:cNvPr id="2" name="Titel 1"/>
-          <p:cNvSpPr>
-            <a:spLocks noGrp="1"/>
-          </p:cNvSpPr>
-          <p:nvPr>
-            <p:ph type="title"/>
-          </p:nvPr>
-        </p:nvSpPr>
-        <p:spPr>
-          <a:xfrm>
-            <a:off x="1047750" y="1990724"/>
-            <a:ext cx="10299700" cy="2886075"/>
-          </a:xfrm>
-        </p:spPr>
-        <p:txBody>
-          <a:bodyPr/>
-          <a:lstStyle/>
-          <a:p>
-            <a:r>
-              <a:rPr lang="en-GB" b="1">
-                <a:effectLst>
-                  <a:outerShdw blurRad="38100" dist="38100" dir="2700000" algn="tl">
-                    <a:srgbClr val="000000">
-                      <a:alpha val="43137"/>
-                    </a:srgbClr>
-                  </a:outerShdw>
-                </a:effectLst>
-              </a:rPr>
-              <a:t>Part I: Intro NLP &amp; Task at Hand</a:t>
-            </a:r>
-            <a:endParaRPr lang="en-US" b="1">
-              <a:effectLst>
-                <a:outerShdw blurRad="38100" dist="38100" dir="2700000" algn="tl">
-                  <a:srgbClr val="000000">
-                    <a:alpha val="43137"/>
-                  </a:srgbClr>
-                </a:outerShdw>
-              </a:effectLst>
-            </a:endParaRPr>
-          </a:p>
-        </p:txBody>
-      </p:sp>
-      <p:sp>
-        <p:nvSpPr>
-          <p:cNvPr id="3" name="Textplatzhalter 2"/>
-          <p:cNvSpPr>
-            <a:spLocks noGrp="1"/>
-          </p:cNvSpPr>
-          <p:nvPr>
-            <p:ph type="body" idx="1"/>
-          </p:nvPr>
-        </p:nvSpPr>
-        <p:spPr>
-          <a:xfrm>
-            <a:off x="1047748" y="4876799"/>
-            <a:ext cx="10299701" cy="1212851"/>
-          </a:xfrm>
-        </p:spPr>
-        <p:txBody>
-          <a:bodyPr/>
-          <a:lstStyle/>
-          <a:p>
-            <a:r>
-              <a:rPr lang="en-US" b="1">
-                <a:effectLst>
-                  <a:outerShdw blurRad="38100" dist="38100" dir="2700000" algn="tl">
-                    <a:srgbClr val="000000">
-                      <a:alpha val="43137"/>
-                    </a:srgbClr>
-                  </a:outerShdw>
-                </a:effectLst>
-              </a:rPr>
-              <a:t>Literature and References</a:t>
-            </a:r>
-          </a:p>
-        </p:txBody>
-      </p:sp>
-      <p:sp>
-        <p:nvSpPr>
-          <p:cNvPr id="4" name="Foliennummernplatzhalter 3"/>
-          <p:cNvSpPr>
-            <a:spLocks noGrp="1"/>
-          </p:cNvSpPr>
-          <p:nvPr>
-            <p:ph type="sldNum" sz="quarter" idx="12"/>
-          </p:nvPr>
-        </p:nvSpPr>
-        <p:spPr/>
-        <p:txBody>
-          <a:bodyPr/>
-          <a:lstStyle/>
-          <a:p>
-            <a:fld id="{C9E0B00B-E6DF-4183-A694-3DE28BEFB357}" type="slidenum">
-              <a:rPr lang="en-US" smtClean="0"/>
-              <a:t>36</a:t>
-            </a:fld>
-            <a:endParaRPr lang="en-US"/>
-          </a:p>
-        </p:txBody>
-      </p:sp>
-    </p:spTree>
-    <p:extLst>
-      <p:ext uri="{BB962C8B-B14F-4D97-AF65-F5344CB8AC3E}">
-        <p14:creationId xmlns:p14="http://schemas.microsoft.com/office/powerpoint/2010/main" val="2386872643"/>
-      </p:ext>
-    </p:extLst>
-  </p:cSld>
-  <p:clrMapOvr>
-    <a:masterClrMapping/>
-  </p:clrMapOvr>
-</p:sld>
-</file>
-
 <file path=ppt/slides/slide37.xml><?xml version="1.0" encoding="utf-8"?>
 <p:sld xmlns:a="http://schemas.openxmlformats.org/drawingml/2006/main" xmlns:r="http://schemas.openxmlformats.org/officeDocument/2006/relationships" xmlns:p="http://schemas.openxmlformats.org/presentationml/2006/main">
   <p:cSld>
@@ -17322,6 +20778,138 @@
       </p:grpSpPr>
       <p:sp>
         <p:nvSpPr>
+          <p:cNvPr id="2" name="Titel 1"/>
+          <p:cNvSpPr>
+            <a:spLocks noGrp="1"/>
+          </p:cNvSpPr>
+          <p:nvPr>
+            <p:ph type="title"/>
+          </p:nvPr>
+        </p:nvSpPr>
+        <p:spPr>
+          <a:xfrm>
+            <a:off x="1047750" y="1990724"/>
+            <a:ext cx="10299700" cy="2886075"/>
+          </a:xfrm>
+        </p:spPr>
+        <p:txBody>
+          <a:bodyPr/>
+          <a:lstStyle/>
+          <a:p>
+            <a:r>
+              <a:rPr lang="en-GB" b="1">
+                <a:effectLst>
+                  <a:outerShdw blurRad="38100" dist="38100" dir="2700000" algn="tl">
+                    <a:srgbClr val="000000">
+                      <a:alpha val="43137"/>
+                    </a:srgbClr>
+                  </a:outerShdw>
+                </a:effectLst>
+              </a:rPr>
+              <a:t>Part I: Intro NLP &amp; Task at Hand</a:t>
+            </a:r>
+            <a:endParaRPr lang="en-US" b="1">
+              <a:effectLst>
+                <a:outerShdw blurRad="38100" dist="38100" dir="2700000" algn="tl">
+                  <a:srgbClr val="000000">
+                    <a:alpha val="43137"/>
+                  </a:srgbClr>
+                </a:outerShdw>
+              </a:effectLst>
+            </a:endParaRPr>
+          </a:p>
+        </p:txBody>
+      </p:sp>
+      <p:sp>
+        <p:nvSpPr>
+          <p:cNvPr id="3" name="Textplatzhalter 2"/>
+          <p:cNvSpPr>
+            <a:spLocks noGrp="1"/>
+          </p:cNvSpPr>
+          <p:nvPr>
+            <p:ph type="body" idx="1"/>
+          </p:nvPr>
+        </p:nvSpPr>
+        <p:spPr>
+          <a:xfrm>
+            <a:off x="1047748" y="4876799"/>
+            <a:ext cx="10299701" cy="1212851"/>
+          </a:xfrm>
+        </p:spPr>
+        <p:txBody>
+          <a:bodyPr/>
+          <a:lstStyle/>
+          <a:p>
+            <a:r>
+              <a:rPr lang="en-US" b="1">
+                <a:effectLst>
+                  <a:outerShdw blurRad="38100" dist="38100" dir="2700000" algn="tl">
+                    <a:srgbClr val="000000">
+                      <a:alpha val="43137"/>
+                    </a:srgbClr>
+                  </a:outerShdw>
+                </a:effectLst>
+              </a:rPr>
+              <a:t>Literature and References</a:t>
+            </a:r>
+          </a:p>
+        </p:txBody>
+      </p:sp>
+      <p:sp>
+        <p:nvSpPr>
+          <p:cNvPr id="4" name="Foliennummernplatzhalter 3"/>
+          <p:cNvSpPr>
+            <a:spLocks noGrp="1"/>
+          </p:cNvSpPr>
+          <p:nvPr>
+            <p:ph type="sldNum" sz="quarter" idx="12"/>
+          </p:nvPr>
+        </p:nvSpPr>
+        <p:spPr/>
+        <p:txBody>
+          <a:bodyPr/>
+          <a:lstStyle/>
+          <a:p>
+            <a:fld id="{C9E0B00B-E6DF-4183-A694-3DE28BEFB357}" type="slidenum">
+              <a:rPr lang="en-US" smtClean="0"/>
+              <a:t>37</a:t>
+            </a:fld>
+            <a:endParaRPr lang="en-US"/>
+          </a:p>
+        </p:txBody>
+      </p:sp>
+    </p:spTree>
+    <p:extLst>
+      <p:ext uri="{BB962C8B-B14F-4D97-AF65-F5344CB8AC3E}">
+        <p14:creationId xmlns:p14="http://schemas.microsoft.com/office/powerpoint/2010/main" val="2386872643"/>
+      </p:ext>
+    </p:extLst>
+  </p:cSld>
+  <p:clrMapOvr>
+    <a:masterClrMapping/>
+  </p:clrMapOvr>
+</p:sld>
+</file>
+
+<file path=ppt/slides/slide38.xml><?xml version="1.0" encoding="utf-8"?>
+<p:sld xmlns:a="http://schemas.openxmlformats.org/drawingml/2006/main" xmlns:r="http://schemas.openxmlformats.org/officeDocument/2006/relationships" xmlns:p="http://schemas.openxmlformats.org/presentationml/2006/main">
+  <p:cSld>
+    <p:spTree>
+      <p:nvGrpSpPr>
+        <p:cNvPr id="1" name=""/>
+        <p:cNvGrpSpPr/>
+        <p:nvPr/>
+      </p:nvGrpSpPr>
+      <p:grpSpPr>
+        <a:xfrm>
+          <a:off x="0" y="0"/>
+          <a:ext cx="0" cy="0"/>
+          <a:chOff x="0" y="0"/>
+          <a:chExt cx="0" cy="0"/>
+        </a:xfrm>
+      </p:grpSpPr>
+      <p:sp>
+        <p:nvSpPr>
           <p:cNvPr id="3" name="Content Placeholder 2">
             <a:extLst>
               <a:ext uri="{FF2B5EF4-FFF2-40B4-BE49-F238E27FC236}">
@@ -17491,7 +21079,7 @@
           <a:p>
             <a:fld id="{C9E0B00B-E6DF-4183-A694-3DE28BEFB357}" type="slidenum">
               <a:rPr lang="en-US" smtClean="0"/>
-              <a:t>37</a:t>
+              <a:t>38</a:t>
             </a:fld>
             <a:endParaRPr lang="en-US"/>
           </a:p>

</xml_diff>

<commit_message>
worked on bert slides
</commit_message>
<xml_diff>
--- a/5_seminar/Contents_Part_01/slides_I.pptx
+++ b/5_seminar/Contents_Part_01/slides_I.pptx
@@ -245,7 +245,7 @@
           <a:p>
             <a:fld id="{7A5B87F2-13FD-4A24-9F19-39B31C60B536}" type="datetimeFigureOut">
               <a:rPr lang="en-US" smtClean="0"/>
-              <a:t>4/27/2021</a:t>
+              <a:t>5/3/2021</a:t>
             </a:fld>
             <a:endParaRPr lang="en-US"/>
           </a:p>
@@ -3786,7 +3786,7 @@
           <a:p>
             <a:fld id="{5A1811BA-6AD9-41A7-B7A2-456C8523519C}" type="datetime1">
               <a:rPr lang="en-US" smtClean="0"/>
-              <a:t>4/27/2021</a:t>
+              <a:t>5/3/2021</a:t>
             </a:fld>
             <a:endParaRPr lang="en-US"/>
           </a:p>
@@ -3956,7 +3956,7 @@
           <a:p>
             <a:fld id="{B0494441-C196-4BB0-93EE-AF22360207AB}" type="datetime1">
               <a:rPr lang="en-US" smtClean="0"/>
-              <a:t>4/27/2021</a:t>
+              <a:t>5/3/2021</a:t>
             </a:fld>
             <a:endParaRPr lang="en-US"/>
           </a:p>
@@ -4136,7 +4136,7 @@
           <a:p>
             <a:fld id="{D7B9282B-C3CE-4F56-8DD1-5349F982F1D2}" type="datetime1">
               <a:rPr lang="en-US" smtClean="0"/>
-              <a:t>4/27/2021</a:t>
+              <a:t>5/3/2021</a:t>
             </a:fld>
             <a:endParaRPr lang="en-US"/>
           </a:p>
@@ -4306,7 +4306,7 @@
           <a:p>
             <a:fld id="{E6E86D6A-786F-4E85-AF3B-385015383ABA}" type="datetime1">
               <a:rPr lang="en-US" smtClean="0"/>
-              <a:t>4/27/2021</a:t>
+              <a:t>5/3/2021</a:t>
             </a:fld>
             <a:endParaRPr lang="en-US"/>
           </a:p>
@@ -4552,7 +4552,7 @@
           <a:p>
             <a:fld id="{051FFEB0-9C80-4A34-A5C7-72D52D52FC7D}" type="datetime1">
               <a:rPr lang="en-US" smtClean="0"/>
-              <a:t>4/27/2021</a:t>
+              <a:t>5/3/2021</a:t>
             </a:fld>
             <a:endParaRPr lang="en-US"/>
           </a:p>
@@ -4784,7 +4784,7 @@
           <a:p>
             <a:fld id="{084267AD-C299-471B-ABA1-D0EA94C7EDCF}" type="datetime1">
               <a:rPr lang="en-US" smtClean="0"/>
-              <a:t>4/27/2021</a:t>
+              <a:t>5/3/2021</a:t>
             </a:fld>
             <a:endParaRPr lang="en-US"/>
           </a:p>
@@ -5151,7 +5151,7 @@
           <a:p>
             <a:fld id="{6468DBC7-10F8-46A1-8CE1-DBB0A6F0EF3E}" type="datetime1">
               <a:rPr lang="en-US" smtClean="0"/>
-              <a:t>4/27/2021</a:t>
+              <a:t>5/3/2021</a:t>
             </a:fld>
             <a:endParaRPr lang="en-US"/>
           </a:p>
@@ -5269,7 +5269,7 @@
           <a:p>
             <a:fld id="{0A97ED80-8DDA-43A7-A78F-B0542D691D0E}" type="datetime1">
               <a:rPr lang="en-US" smtClean="0"/>
-              <a:t>4/27/2021</a:t>
+              <a:t>5/3/2021</a:t>
             </a:fld>
             <a:endParaRPr lang="en-US"/>
           </a:p>
@@ -5364,7 +5364,7 @@
           <a:p>
             <a:fld id="{0AF827E6-45BA-40D2-98F2-BE4FFF095577}" type="datetime1">
               <a:rPr lang="en-US" smtClean="0"/>
-              <a:t>4/27/2021</a:t>
+              <a:t>5/3/2021</a:t>
             </a:fld>
             <a:endParaRPr lang="en-US"/>
           </a:p>
@@ -5641,7 +5641,7 @@
           <a:p>
             <a:fld id="{42BD114C-22EA-4B1A-A45B-ED6465C7BB4E}" type="datetime1">
               <a:rPr lang="en-US" smtClean="0"/>
-              <a:t>4/27/2021</a:t>
+              <a:t>5/3/2021</a:t>
             </a:fld>
             <a:endParaRPr lang="en-US"/>
           </a:p>
@@ -5894,7 +5894,7 @@
           <a:p>
             <a:fld id="{F46F8903-38BE-4FD8-98FC-E4EF771B2D8C}" type="datetime1">
               <a:rPr lang="en-US" smtClean="0"/>
-              <a:t>4/27/2021</a:t>
+              <a:t>5/3/2021</a:t>
             </a:fld>
             <a:endParaRPr lang="en-US"/>
           </a:p>
@@ -6107,7 +6107,7 @@
           <a:p>
             <a:fld id="{A91AC8C7-9CA9-4E83-8CE3-AD3BE4150B39}" type="datetime1">
               <a:rPr lang="en-US" smtClean="0"/>
-              <a:t>4/27/2021</a:t>
+              <a:t>5/3/2021</a:t>
             </a:fld>
             <a:endParaRPr lang="en-US"/>
           </a:p>
@@ -12410,10 +12410,10 @@
       </p:sp>
       <p:grpSp>
         <p:nvGrpSpPr>
-          <p:cNvPr id="5" name="Group 4">
+          <p:cNvPr id="2" name="Group 1">
             <a:extLst>
               <a:ext uri="{FF2B5EF4-FFF2-40B4-BE49-F238E27FC236}">
-                <a16:creationId xmlns:a16="http://schemas.microsoft.com/office/drawing/2014/main" id="{052205DE-A934-490D-8D27-258EE051A565}"/>
+                <a16:creationId xmlns:a16="http://schemas.microsoft.com/office/drawing/2014/main" id="{73F4882D-02B4-44D4-A6BA-F96F99335952}"/>
               </a:ext>
             </a:extLst>
           </p:cNvPr>
@@ -12422,812 +12422,1372 @@
         </p:nvGrpSpPr>
         <p:grpSpPr>
           <a:xfrm>
-            <a:off x="1089868" y="2001663"/>
-            <a:ext cx="10449920" cy="724932"/>
-            <a:chOff x="1089868" y="2001663"/>
-            <a:chExt cx="10449920" cy="724932"/>
+            <a:off x="719137" y="2001663"/>
+            <a:ext cx="11240660" cy="4247428"/>
+            <a:chOff x="719137" y="2001663"/>
+            <a:chExt cx="11240660" cy="4247428"/>
           </a:xfrm>
         </p:grpSpPr>
-        <p:sp>
-          <p:nvSpPr>
-            <p:cNvPr id="19" name="Rectangle 18">
+        <p:grpSp>
+          <p:nvGrpSpPr>
+            <p:cNvPr id="5" name="Group 4">
               <a:extLst>
                 <a:ext uri="{FF2B5EF4-FFF2-40B4-BE49-F238E27FC236}">
-                  <a16:creationId xmlns:a16="http://schemas.microsoft.com/office/drawing/2014/main" id="{AAD10036-B5D0-4C9A-BD96-B3ACAEC75C73}"/>
+                  <a16:creationId xmlns:a16="http://schemas.microsoft.com/office/drawing/2014/main" id="{052205DE-A934-490D-8D27-258EE051A565}"/>
                 </a:ext>
               </a:extLst>
             </p:cNvPr>
-            <p:cNvSpPr/>
+            <p:cNvGrpSpPr/>
             <p:nvPr/>
-          </p:nvSpPr>
-          <p:spPr>
+          </p:nvGrpSpPr>
+          <p:grpSpPr>
             <a:xfrm>
-              <a:off x="6534153" y="2006587"/>
-              <a:ext cx="914400" cy="720000"/>
+              <a:off x="1089868" y="2001663"/>
+              <a:ext cx="10449920" cy="724932"/>
+              <a:chOff x="1089868" y="2001663"/>
+              <a:chExt cx="10449920" cy="724932"/>
             </a:xfrm>
-            <a:prstGeom prst="rect">
-              <a:avLst/>
-            </a:prstGeom>
-            <a:solidFill>
-              <a:schemeClr val="bg2">
-                <a:lumMod val="90000"/>
-              </a:schemeClr>
-            </a:solidFill>
-            <a:ln>
+          </p:grpSpPr>
+          <p:sp>
+            <p:nvSpPr>
+              <p:cNvPr id="19" name="Rectangle 18">
+                <a:extLst>
+                  <a:ext uri="{FF2B5EF4-FFF2-40B4-BE49-F238E27FC236}">
+                    <a16:creationId xmlns:a16="http://schemas.microsoft.com/office/drawing/2014/main" id="{AAD10036-B5D0-4C9A-BD96-B3ACAEC75C73}"/>
+                  </a:ext>
+                </a:extLst>
+              </p:cNvPr>
+              <p:cNvSpPr/>
+              <p:nvPr/>
+            </p:nvSpPr>
+            <p:spPr>
+              <a:xfrm>
+                <a:off x="6534153" y="2006587"/>
+                <a:ext cx="914400" cy="720000"/>
+              </a:xfrm>
+              <a:prstGeom prst="rect">
+                <a:avLst/>
+              </a:prstGeom>
               <a:solidFill>
                 <a:schemeClr val="bg2">
                   <a:lumMod val="90000"/>
                 </a:schemeClr>
               </a:solidFill>
-            </a:ln>
-          </p:spPr>
-          <p:style>
-            <a:lnRef idx="2">
-              <a:schemeClr val="accent1">
-                <a:shade val="50000"/>
-              </a:schemeClr>
-            </a:lnRef>
-            <a:fillRef idx="1">
-              <a:schemeClr val="accent1"/>
-            </a:fillRef>
-            <a:effectRef idx="0">
-              <a:schemeClr val="accent1"/>
-            </a:effectRef>
-            <a:fontRef idx="minor">
-              <a:schemeClr val="lt1"/>
-            </a:fontRef>
-          </p:style>
-          <p:txBody>
-            <a:bodyPr rtlCol="0" anchor="ctr"/>
-            <a:lstStyle/>
-            <a:p>
-              <a:pPr algn="ctr"/>
-              <a:endParaRPr lang="en-US"/>
-            </a:p>
-          </p:txBody>
-        </p:sp>
-        <p:sp>
-          <p:nvSpPr>
-            <p:cNvPr id="20" name="Rectangle 19">
-              <a:extLst>
-                <a:ext uri="{FF2B5EF4-FFF2-40B4-BE49-F238E27FC236}">
-                  <a16:creationId xmlns:a16="http://schemas.microsoft.com/office/drawing/2014/main" id="{6C194CD2-1A2D-4416-92F5-9A86AD09170A}"/>
-                </a:ext>
-              </a:extLst>
-            </p:cNvPr>
-            <p:cNvSpPr/>
-            <p:nvPr/>
-          </p:nvSpPr>
-          <p:spPr>
-            <a:xfrm>
-              <a:off x="4171949" y="2006595"/>
-              <a:ext cx="914400" cy="720000"/>
-            </a:xfrm>
-            <a:prstGeom prst="rect">
-              <a:avLst/>
-            </a:prstGeom>
-            <a:solidFill>
-              <a:schemeClr val="bg2"/>
-            </a:solidFill>
-            <a:ln>
+              <a:ln>
+                <a:solidFill>
+                  <a:schemeClr val="bg2">
+                    <a:lumMod val="90000"/>
+                  </a:schemeClr>
+                </a:solidFill>
+              </a:ln>
+            </p:spPr>
+            <p:style>
+              <a:lnRef idx="2">
+                <a:schemeClr val="accent1">
+                  <a:shade val="50000"/>
+                </a:schemeClr>
+              </a:lnRef>
+              <a:fillRef idx="1">
+                <a:schemeClr val="accent1"/>
+              </a:fillRef>
+              <a:effectRef idx="0">
+                <a:schemeClr val="accent1"/>
+              </a:effectRef>
+              <a:fontRef idx="minor">
+                <a:schemeClr val="lt1"/>
+              </a:fontRef>
+            </p:style>
+            <p:txBody>
+              <a:bodyPr rtlCol="0" anchor="ctr"/>
+              <a:lstStyle/>
+              <a:p>
+                <a:pPr algn="ctr"/>
+                <a:endParaRPr lang="en-US"/>
+              </a:p>
+            </p:txBody>
+          </p:sp>
+          <p:sp>
+            <p:nvSpPr>
+              <p:cNvPr id="20" name="Rectangle 19">
+                <a:extLst>
+                  <a:ext uri="{FF2B5EF4-FFF2-40B4-BE49-F238E27FC236}">
+                    <a16:creationId xmlns:a16="http://schemas.microsoft.com/office/drawing/2014/main" id="{6C194CD2-1A2D-4416-92F5-9A86AD09170A}"/>
+                  </a:ext>
+                </a:extLst>
+              </p:cNvPr>
+              <p:cNvSpPr/>
+              <p:nvPr/>
+            </p:nvSpPr>
+            <p:spPr>
+              <a:xfrm>
+                <a:off x="4171949" y="2006595"/>
+                <a:ext cx="914400" cy="720000"/>
+              </a:xfrm>
+              <a:prstGeom prst="rect">
+                <a:avLst/>
+              </a:prstGeom>
               <a:solidFill>
                 <a:schemeClr val="bg2"/>
               </a:solidFill>
-            </a:ln>
-          </p:spPr>
-          <p:style>
-            <a:lnRef idx="2">
-              <a:schemeClr val="accent1">
-                <a:shade val="50000"/>
-              </a:schemeClr>
-            </a:lnRef>
-            <a:fillRef idx="1">
-              <a:schemeClr val="accent1"/>
-            </a:fillRef>
-            <a:effectRef idx="0">
-              <a:schemeClr val="accent1"/>
-            </a:effectRef>
-            <a:fontRef idx="minor">
-              <a:schemeClr val="lt1"/>
-            </a:fontRef>
-          </p:style>
-          <p:txBody>
-            <a:bodyPr rtlCol="0" anchor="ctr"/>
-            <a:lstStyle/>
-            <a:p>
-              <a:pPr algn="ctr"/>
-              <a:endParaRPr lang="en-US"/>
-            </a:p>
-          </p:txBody>
-        </p:sp>
-        <p:sp>
-          <p:nvSpPr>
-            <p:cNvPr id="21" name="Rectangle 20">
-              <a:extLst>
-                <a:ext uri="{FF2B5EF4-FFF2-40B4-BE49-F238E27FC236}">
-                  <a16:creationId xmlns:a16="http://schemas.microsoft.com/office/drawing/2014/main" id="{E301D10B-B989-41E0-A971-03D11930FAF6}"/>
-                </a:ext>
-              </a:extLst>
-            </p:cNvPr>
-            <p:cNvSpPr/>
-            <p:nvPr/>
-          </p:nvSpPr>
-          <p:spPr>
-            <a:xfrm>
-              <a:off x="1740192" y="2006587"/>
-              <a:ext cx="1140902" cy="720000"/>
-            </a:xfrm>
-            <a:prstGeom prst="rect">
-              <a:avLst/>
-            </a:prstGeom>
-            <a:solidFill>
-              <a:schemeClr val="bg2">
-                <a:lumMod val="90000"/>
-              </a:schemeClr>
-            </a:solidFill>
-            <a:ln>
+              <a:ln>
+                <a:solidFill>
+                  <a:schemeClr val="bg2"/>
+                </a:solidFill>
+              </a:ln>
+            </p:spPr>
+            <p:style>
+              <a:lnRef idx="2">
+                <a:schemeClr val="accent1">
+                  <a:shade val="50000"/>
+                </a:schemeClr>
+              </a:lnRef>
+              <a:fillRef idx="1">
+                <a:schemeClr val="accent1"/>
+              </a:fillRef>
+              <a:effectRef idx="0">
+                <a:schemeClr val="accent1"/>
+              </a:effectRef>
+              <a:fontRef idx="minor">
+                <a:schemeClr val="lt1"/>
+              </a:fontRef>
+            </p:style>
+            <p:txBody>
+              <a:bodyPr rtlCol="0" anchor="ctr"/>
+              <a:lstStyle/>
+              <a:p>
+                <a:pPr algn="ctr"/>
+                <a:endParaRPr lang="en-US"/>
+              </a:p>
+            </p:txBody>
+          </p:sp>
+          <p:sp>
+            <p:nvSpPr>
+              <p:cNvPr id="21" name="Rectangle 20">
+                <a:extLst>
+                  <a:ext uri="{FF2B5EF4-FFF2-40B4-BE49-F238E27FC236}">
+                    <a16:creationId xmlns:a16="http://schemas.microsoft.com/office/drawing/2014/main" id="{E301D10B-B989-41E0-A971-03D11930FAF6}"/>
+                  </a:ext>
+                </a:extLst>
+              </p:cNvPr>
+              <p:cNvSpPr/>
+              <p:nvPr/>
+            </p:nvSpPr>
+            <p:spPr>
+              <a:xfrm>
+                <a:off x="1740192" y="2006587"/>
+                <a:ext cx="1140902" cy="720000"/>
+              </a:xfrm>
+              <a:prstGeom prst="rect">
+                <a:avLst/>
+              </a:prstGeom>
               <a:solidFill>
                 <a:schemeClr val="bg2">
                   <a:lumMod val="90000"/>
                 </a:schemeClr>
               </a:solidFill>
-            </a:ln>
-          </p:spPr>
-          <p:style>
-            <a:lnRef idx="2">
-              <a:schemeClr val="accent1">
-                <a:shade val="50000"/>
-              </a:schemeClr>
-            </a:lnRef>
-            <a:fillRef idx="1">
-              <a:schemeClr val="accent1"/>
-            </a:fillRef>
-            <a:effectRef idx="0">
-              <a:schemeClr val="accent1"/>
-            </a:effectRef>
-            <a:fontRef idx="minor">
-              <a:schemeClr val="lt1"/>
-            </a:fontRef>
-          </p:style>
-          <p:txBody>
-            <a:bodyPr rtlCol="0" anchor="ctr"/>
-            <a:lstStyle/>
-            <a:p>
-              <a:pPr algn="ctr"/>
-              <a:endParaRPr lang="en-US"/>
-            </a:p>
-          </p:txBody>
-        </p:sp>
-        <p:sp>
-          <p:nvSpPr>
-            <p:cNvPr id="22" name="Arrow: Pentagon 21">
-              <a:extLst>
-                <a:ext uri="{FF2B5EF4-FFF2-40B4-BE49-F238E27FC236}">
-                  <a16:creationId xmlns:a16="http://schemas.microsoft.com/office/drawing/2014/main" id="{FFC63AFD-745E-4019-B589-4A1904550271}"/>
-                </a:ext>
-              </a:extLst>
-            </p:cNvPr>
-            <p:cNvSpPr/>
-            <p:nvPr/>
-          </p:nvSpPr>
-          <p:spPr>
-            <a:xfrm>
-              <a:off x="2881094" y="2006580"/>
-              <a:ext cx="1752032" cy="720000"/>
-            </a:xfrm>
-            <a:prstGeom prst="homePlate">
-              <a:avLst/>
-            </a:prstGeom>
-            <a:solidFill>
-              <a:schemeClr val="bg2">
-                <a:lumMod val="90000"/>
-              </a:schemeClr>
-            </a:solidFill>
-            <a:ln>
+              <a:ln>
+                <a:solidFill>
+                  <a:schemeClr val="bg2">
+                    <a:lumMod val="90000"/>
+                  </a:schemeClr>
+                </a:solidFill>
+              </a:ln>
+            </p:spPr>
+            <p:style>
+              <a:lnRef idx="2">
+                <a:schemeClr val="accent1">
+                  <a:shade val="50000"/>
+                </a:schemeClr>
+              </a:lnRef>
+              <a:fillRef idx="1">
+                <a:schemeClr val="accent1"/>
+              </a:fillRef>
+              <a:effectRef idx="0">
+                <a:schemeClr val="accent1"/>
+              </a:effectRef>
+              <a:fontRef idx="minor">
+                <a:schemeClr val="lt1"/>
+              </a:fontRef>
+            </p:style>
+            <p:txBody>
+              <a:bodyPr rtlCol="0" anchor="ctr"/>
+              <a:lstStyle/>
+              <a:p>
+                <a:pPr algn="ctr"/>
+                <a:endParaRPr lang="en-US"/>
+              </a:p>
+            </p:txBody>
+          </p:sp>
+          <p:sp>
+            <p:nvSpPr>
+              <p:cNvPr id="22" name="Arrow: Pentagon 21">
+                <a:extLst>
+                  <a:ext uri="{FF2B5EF4-FFF2-40B4-BE49-F238E27FC236}">
+                    <a16:creationId xmlns:a16="http://schemas.microsoft.com/office/drawing/2014/main" id="{FFC63AFD-745E-4019-B589-4A1904550271}"/>
+                  </a:ext>
+                </a:extLst>
+              </p:cNvPr>
+              <p:cNvSpPr/>
+              <p:nvPr/>
+            </p:nvSpPr>
+            <p:spPr>
+              <a:xfrm>
+                <a:off x="2881094" y="2006580"/>
+                <a:ext cx="1752032" cy="720000"/>
+              </a:xfrm>
+              <a:prstGeom prst="homePlate">
+                <a:avLst/>
+              </a:prstGeom>
               <a:solidFill>
                 <a:schemeClr val="bg2">
                   <a:lumMod val="90000"/>
                 </a:schemeClr>
               </a:solidFill>
-            </a:ln>
-          </p:spPr>
-          <p:style>
-            <a:lnRef idx="2">
-              <a:schemeClr val="accent1">
-                <a:shade val="50000"/>
-              </a:schemeClr>
-            </a:lnRef>
-            <a:fillRef idx="1">
-              <a:schemeClr val="accent1"/>
-            </a:fillRef>
-            <a:effectRef idx="0">
-              <a:schemeClr val="accent1"/>
-            </a:effectRef>
-            <a:fontRef idx="minor">
-              <a:schemeClr val="lt1"/>
-            </a:fontRef>
-          </p:style>
-          <p:txBody>
-            <a:bodyPr rtlCol="0" anchor="ctr"/>
-            <a:lstStyle/>
-            <a:p>
-              <a:pPr algn="ctr"/>
-              <a:r>
-                <a:rPr lang="de-DE" sz="2400">
+              <a:ln>
+                <a:solidFill>
+                  <a:schemeClr val="bg2">
+                    <a:lumMod val="90000"/>
+                  </a:schemeClr>
+                </a:solidFill>
+              </a:ln>
+            </p:spPr>
+            <p:style>
+              <a:lnRef idx="2">
+                <a:schemeClr val="accent1">
+                  <a:shade val="50000"/>
+                </a:schemeClr>
+              </a:lnRef>
+              <a:fillRef idx="1">
+                <a:schemeClr val="accent1"/>
+              </a:fillRef>
+              <a:effectRef idx="0">
+                <a:schemeClr val="accent1"/>
+              </a:effectRef>
+              <a:fontRef idx="minor">
+                <a:schemeClr val="lt1"/>
+              </a:fontRef>
+            </p:style>
+            <p:txBody>
+              <a:bodyPr rtlCol="0" anchor="ctr"/>
+              <a:lstStyle/>
+              <a:p>
+                <a:pPr algn="ctr"/>
+                <a:r>
+                  <a:rPr lang="de-DE" sz="2400">
+                    <a:solidFill>
+                      <a:schemeClr val="tx1"/>
+                    </a:solidFill>
+                  </a:rPr>
+                  <a:t>Labeling</a:t>
+                </a:r>
+                <a:endParaRPr lang="en-US" sz="2400">
                   <a:solidFill>
                     <a:schemeClr val="tx1"/>
                   </a:solidFill>
-                </a:rPr>
-                <a:t>Labeling</a:t>
-              </a:r>
-              <a:endParaRPr lang="en-US" sz="2400">
-                <a:solidFill>
-                  <a:schemeClr val="tx1"/>
-                </a:solidFill>
-              </a:endParaRPr>
-            </a:p>
-          </p:txBody>
-        </p:sp>
-        <p:sp>
-          <p:nvSpPr>
-            <p:cNvPr id="23" name="Arrow: Pentagon 22">
-              <a:extLst>
-                <a:ext uri="{FF2B5EF4-FFF2-40B4-BE49-F238E27FC236}">
-                  <a16:creationId xmlns:a16="http://schemas.microsoft.com/office/drawing/2014/main" id="{DA5FF623-563D-44FC-BAFF-FC093D407ED1}"/>
-                </a:ext>
-              </a:extLst>
-            </p:cNvPr>
-            <p:cNvSpPr/>
-            <p:nvPr/>
-          </p:nvSpPr>
-          <p:spPr>
-            <a:xfrm>
-              <a:off x="1089868" y="2001663"/>
-              <a:ext cx="1752033" cy="720000"/>
-            </a:xfrm>
-            <a:prstGeom prst="homePlate">
-              <a:avLst/>
-            </a:prstGeom>
-            <a:solidFill>
-              <a:schemeClr val="bg2"/>
-            </a:solidFill>
-            <a:ln>
+                </a:endParaRPr>
+              </a:p>
+            </p:txBody>
+          </p:sp>
+          <p:sp>
+            <p:nvSpPr>
+              <p:cNvPr id="23" name="Arrow: Pentagon 22">
+                <a:extLst>
+                  <a:ext uri="{FF2B5EF4-FFF2-40B4-BE49-F238E27FC236}">
+                    <a16:creationId xmlns:a16="http://schemas.microsoft.com/office/drawing/2014/main" id="{DA5FF623-563D-44FC-BAFF-FC093D407ED1}"/>
+                  </a:ext>
+                </a:extLst>
+              </p:cNvPr>
+              <p:cNvSpPr/>
+              <p:nvPr/>
+            </p:nvSpPr>
+            <p:spPr>
+              <a:xfrm>
+                <a:off x="1089868" y="2001663"/>
+                <a:ext cx="1752033" cy="720000"/>
+              </a:xfrm>
+              <a:prstGeom prst="homePlate">
+                <a:avLst/>
+              </a:prstGeom>
               <a:solidFill>
                 <a:schemeClr val="bg2"/>
               </a:solidFill>
-            </a:ln>
-          </p:spPr>
-          <p:style>
-            <a:lnRef idx="2">
-              <a:schemeClr val="accent1">
-                <a:shade val="50000"/>
-              </a:schemeClr>
-            </a:lnRef>
-            <a:fillRef idx="1">
-              <a:schemeClr val="accent1"/>
-            </a:fillRef>
-            <a:effectRef idx="0">
-              <a:schemeClr val="accent1"/>
-            </a:effectRef>
-            <a:fontRef idx="minor">
-              <a:schemeClr val="lt1"/>
-            </a:fontRef>
-          </p:style>
-          <p:txBody>
-            <a:bodyPr rtlCol="0" anchor="ctr"/>
-            <a:lstStyle/>
-            <a:p>
-              <a:pPr algn="ctr"/>
-              <a:r>
-                <a:rPr lang="de-DE" sz="2400">
+              <a:ln>
+                <a:solidFill>
+                  <a:schemeClr val="bg2"/>
+                </a:solidFill>
+              </a:ln>
+            </p:spPr>
+            <p:style>
+              <a:lnRef idx="2">
+                <a:schemeClr val="accent1">
+                  <a:shade val="50000"/>
+                </a:schemeClr>
+              </a:lnRef>
+              <a:fillRef idx="1">
+                <a:schemeClr val="accent1"/>
+              </a:fillRef>
+              <a:effectRef idx="0">
+                <a:schemeClr val="accent1"/>
+              </a:effectRef>
+              <a:fontRef idx="minor">
+                <a:schemeClr val="lt1"/>
+              </a:fontRef>
+            </p:style>
+            <p:txBody>
+              <a:bodyPr rtlCol="0" anchor="ctr"/>
+              <a:lstStyle/>
+              <a:p>
+                <a:pPr algn="ctr"/>
+                <a:r>
+                  <a:rPr lang="de-DE" sz="2400">
+                    <a:solidFill>
+                      <a:schemeClr val="tx1"/>
+                    </a:solidFill>
+                  </a:rPr>
+                  <a:t>Scraping</a:t>
+                </a:r>
+                <a:endParaRPr lang="en-US" sz="2400">
                   <a:solidFill>
                     <a:schemeClr val="tx1"/>
                   </a:solidFill>
-                </a:rPr>
-                <a:t>Scraping</a:t>
-              </a:r>
-              <a:endParaRPr lang="en-US" sz="2400">
-                <a:solidFill>
-                  <a:schemeClr val="tx1"/>
-                </a:solidFill>
-              </a:endParaRPr>
-            </a:p>
-          </p:txBody>
-        </p:sp>
-        <p:sp>
-          <p:nvSpPr>
-            <p:cNvPr id="24" name="Arrow: Pentagon 23">
-              <a:extLst>
-                <a:ext uri="{FF2B5EF4-FFF2-40B4-BE49-F238E27FC236}">
-                  <a16:creationId xmlns:a16="http://schemas.microsoft.com/office/drawing/2014/main" id="{8AC9D1DD-A96F-4607-BEEF-AE0696F653E9}"/>
-                </a:ext>
-              </a:extLst>
-            </p:cNvPr>
-            <p:cNvSpPr/>
-            <p:nvPr/>
-          </p:nvSpPr>
-          <p:spPr>
-            <a:xfrm>
-              <a:off x="4640660" y="2006591"/>
-              <a:ext cx="2453476" cy="720000"/>
-            </a:xfrm>
-            <a:prstGeom prst="homePlate">
-              <a:avLst/>
-            </a:prstGeom>
-            <a:solidFill>
-              <a:schemeClr val="bg2"/>
-            </a:solidFill>
-            <a:ln>
+                </a:endParaRPr>
+              </a:p>
+            </p:txBody>
+          </p:sp>
+          <p:sp>
+            <p:nvSpPr>
+              <p:cNvPr id="24" name="Arrow: Pentagon 23">
+                <a:extLst>
+                  <a:ext uri="{FF2B5EF4-FFF2-40B4-BE49-F238E27FC236}">
+                    <a16:creationId xmlns:a16="http://schemas.microsoft.com/office/drawing/2014/main" id="{8AC9D1DD-A96F-4607-BEEF-AE0696F653E9}"/>
+                  </a:ext>
+                </a:extLst>
+              </p:cNvPr>
+              <p:cNvSpPr/>
+              <p:nvPr/>
+            </p:nvSpPr>
+            <p:spPr>
+              <a:xfrm>
+                <a:off x="4640660" y="2006591"/>
+                <a:ext cx="2453476" cy="720000"/>
+              </a:xfrm>
+              <a:prstGeom prst="homePlate">
+                <a:avLst/>
+              </a:prstGeom>
               <a:solidFill>
                 <a:schemeClr val="bg2"/>
               </a:solidFill>
-            </a:ln>
-          </p:spPr>
-          <p:style>
-            <a:lnRef idx="2">
-              <a:schemeClr val="accent1">
-                <a:shade val="50000"/>
-              </a:schemeClr>
-            </a:lnRef>
-            <a:fillRef idx="1">
-              <a:schemeClr val="accent1"/>
-            </a:fillRef>
-            <a:effectRef idx="0">
-              <a:schemeClr val="accent1"/>
-            </a:effectRef>
-            <a:fontRef idx="minor">
-              <a:schemeClr val="lt1"/>
-            </a:fontRef>
-          </p:style>
-          <p:txBody>
-            <a:bodyPr rtlCol="0" anchor="ctr"/>
-            <a:lstStyle/>
-            <a:p>
-              <a:pPr algn="ctr"/>
-              <a:r>
-                <a:rPr lang="de-DE" sz="2400">
+              <a:ln>
+                <a:solidFill>
+                  <a:schemeClr val="bg2"/>
+                </a:solidFill>
+              </a:ln>
+            </p:spPr>
+            <p:style>
+              <a:lnRef idx="2">
+                <a:schemeClr val="accent1">
+                  <a:shade val="50000"/>
+                </a:schemeClr>
+              </a:lnRef>
+              <a:fillRef idx="1">
+                <a:schemeClr val="accent1"/>
+              </a:fillRef>
+              <a:effectRef idx="0">
+                <a:schemeClr val="accent1"/>
+              </a:effectRef>
+              <a:fontRef idx="minor">
+                <a:schemeClr val="lt1"/>
+              </a:fontRef>
+            </p:style>
+            <p:txBody>
+              <a:bodyPr rtlCol="0" anchor="ctr"/>
+              <a:lstStyle/>
+              <a:p>
+                <a:pPr algn="ctr"/>
+                <a:r>
+                  <a:rPr lang="de-DE" sz="2400">
+                    <a:solidFill>
+                      <a:schemeClr val="tx1"/>
+                    </a:solidFill>
+                  </a:rPr>
+                  <a:t>Data cleaning</a:t>
+                </a:r>
+                <a:endParaRPr lang="en-US" sz="2400">
                   <a:solidFill>
                     <a:schemeClr val="tx1"/>
                   </a:solidFill>
-                </a:rPr>
-                <a:t>Data cleaning</a:t>
-              </a:r>
-              <a:endParaRPr lang="en-US" sz="2400">
-                <a:solidFill>
-                  <a:schemeClr val="tx1"/>
-                </a:solidFill>
-              </a:endParaRPr>
-            </a:p>
-          </p:txBody>
-        </p:sp>
-        <p:sp>
-          <p:nvSpPr>
-            <p:cNvPr id="25" name="Arrow: Pentagon 24">
-              <a:extLst>
-                <a:ext uri="{FF2B5EF4-FFF2-40B4-BE49-F238E27FC236}">
-                  <a16:creationId xmlns:a16="http://schemas.microsoft.com/office/drawing/2014/main" id="{9CD09314-F199-4434-B6D1-444963325AFF}"/>
-                </a:ext>
-              </a:extLst>
-            </p:cNvPr>
-            <p:cNvSpPr/>
-            <p:nvPr/>
-          </p:nvSpPr>
-          <p:spPr>
-            <a:xfrm>
-              <a:off x="7101669" y="2006587"/>
-              <a:ext cx="4438119" cy="720000"/>
-            </a:xfrm>
-            <a:prstGeom prst="homePlate">
-              <a:avLst>
-                <a:gd name="adj" fmla="val 50000"/>
-              </a:avLst>
-            </a:prstGeom>
-            <a:solidFill>
-              <a:schemeClr val="bg2">
-                <a:lumMod val="90000"/>
-              </a:schemeClr>
-            </a:solidFill>
-            <a:ln>
+                </a:endParaRPr>
+              </a:p>
+            </p:txBody>
+          </p:sp>
+          <p:sp>
+            <p:nvSpPr>
+              <p:cNvPr id="25" name="Arrow: Pentagon 24">
+                <a:extLst>
+                  <a:ext uri="{FF2B5EF4-FFF2-40B4-BE49-F238E27FC236}">
+                    <a16:creationId xmlns:a16="http://schemas.microsoft.com/office/drawing/2014/main" id="{9CD09314-F199-4434-B6D1-444963325AFF}"/>
+                  </a:ext>
+                </a:extLst>
+              </p:cNvPr>
+              <p:cNvSpPr/>
+              <p:nvPr/>
+            </p:nvSpPr>
+            <p:spPr>
+              <a:xfrm>
+                <a:off x="7101669" y="2006587"/>
+                <a:ext cx="4438119" cy="720000"/>
+              </a:xfrm>
+              <a:prstGeom prst="homePlate">
+                <a:avLst>
+                  <a:gd name="adj" fmla="val 50000"/>
+                </a:avLst>
+              </a:prstGeom>
               <a:solidFill>
                 <a:schemeClr val="bg2">
                   <a:lumMod val="90000"/>
                 </a:schemeClr>
               </a:solidFill>
-            </a:ln>
-          </p:spPr>
-          <p:style>
-            <a:lnRef idx="2">
-              <a:schemeClr val="accent1">
-                <a:shade val="50000"/>
-              </a:schemeClr>
-            </a:lnRef>
-            <a:fillRef idx="1">
-              <a:schemeClr val="accent1"/>
-            </a:fillRef>
-            <a:effectRef idx="0">
-              <a:schemeClr val="accent1"/>
-            </a:effectRef>
-            <a:fontRef idx="minor">
-              <a:schemeClr val="lt1"/>
-            </a:fontRef>
-          </p:style>
-          <p:txBody>
-            <a:bodyPr rtlCol="0" anchor="ctr"/>
-            <a:lstStyle/>
-            <a:p>
-              <a:pPr algn="ctr"/>
-              <a:r>
-                <a:rPr lang="de-DE" sz="2400">
+              <a:ln>
+                <a:solidFill>
+                  <a:schemeClr val="bg2">
+                    <a:lumMod val="90000"/>
+                  </a:schemeClr>
+                </a:solidFill>
+              </a:ln>
+            </p:spPr>
+            <p:style>
+              <a:lnRef idx="2">
+                <a:schemeClr val="accent1">
+                  <a:shade val="50000"/>
+                </a:schemeClr>
+              </a:lnRef>
+              <a:fillRef idx="1">
+                <a:schemeClr val="accent1"/>
+              </a:fillRef>
+              <a:effectRef idx="0">
+                <a:schemeClr val="accent1"/>
+              </a:effectRef>
+              <a:fontRef idx="minor">
+                <a:schemeClr val="lt1"/>
+              </a:fontRef>
+            </p:style>
+            <p:txBody>
+              <a:bodyPr rtlCol="0" anchor="ctr"/>
+              <a:lstStyle/>
+              <a:p>
+                <a:pPr algn="ctr"/>
+                <a:r>
+                  <a:rPr lang="de-DE" sz="2400">
+                    <a:solidFill>
+                      <a:schemeClr val="tx1"/>
+                    </a:solidFill>
+                  </a:rPr>
+                  <a:t>Extraction of Twitter tokens</a:t>
+                </a:r>
+                <a:endParaRPr lang="en-US" sz="2400">
                   <a:solidFill>
                     <a:schemeClr val="tx1"/>
                   </a:solidFill>
-                </a:rPr>
-                <a:t>Extraction of Twitter tokens</a:t>
-              </a:r>
-              <a:endParaRPr lang="en-US" sz="2400">
-                <a:solidFill>
-                  <a:schemeClr val="tx1"/>
-                </a:solidFill>
-              </a:endParaRPr>
-            </a:p>
-          </p:txBody>
-        </p:sp>
-      </p:grpSp>
-      <p:grpSp>
-        <p:nvGrpSpPr>
-          <p:cNvPr id="7" name="Group 6">
-            <a:extLst>
-              <a:ext uri="{FF2B5EF4-FFF2-40B4-BE49-F238E27FC236}">
-                <a16:creationId xmlns:a16="http://schemas.microsoft.com/office/drawing/2014/main" id="{E72ECF7D-33A9-46FC-9907-D5266B3BF8EE}"/>
-              </a:ext>
-            </a:extLst>
-          </p:cNvPr>
-          <p:cNvGrpSpPr/>
-          <p:nvPr/>
-        </p:nvGrpSpPr>
-        <p:grpSpPr>
-          <a:xfrm>
-            <a:off x="719137" y="3702019"/>
-            <a:ext cx="10820654" cy="720016"/>
-            <a:chOff x="719137" y="3702019"/>
-            <a:chExt cx="10729912" cy="720016"/>
-          </a:xfrm>
-        </p:grpSpPr>
-        <p:sp>
-          <p:nvSpPr>
-            <p:cNvPr id="16" name="Rectangle 15">
+                </a:endParaRPr>
+              </a:p>
+            </p:txBody>
+          </p:sp>
+        </p:grpSp>
+        <p:grpSp>
+          <p:nvGrpSpPr>
+            <p:cNvPr id="7" name="Group 6">
               <a:extLst>
                 <a:ext uri="{FF2B5EF4-FFF2-40B4-BE49-F238E27FC236}">
-                  <a16:creationId xmlns:a16="http://schemas.microsoft.com/office/drawing/2014/main" id="{7EE6729D-A891-4D19-906D-9BA93A1A9013}"/>
+                  <a16:creationId xmlns:a16="http://schemas.microsoft.com/office/drawing/2014/main" id="{E72ECF7D-33A9-46FC-9907-D5266B3BF8EE}"/>
                 </a:ext>
               </a:extLst>
             </p:cNvPr>
-            <p:cNvSpPr/>
+            <p:cNvGrpSpPr/>
             <p:nvPr/>
-          </p:nvSpPr>
-          <p:spPr>
+          </p:nvGrpSpPr>
+          <p:grpSpPr>
             <a:xfrm>
-              <a:off x="5172077" y="3702019"/>
-              <a:ext cx="1190621" cy="720000"/>
+              <a:off x="719137" y="3702019"/>
+              <a:ext cx="10820654" cy="720016"/>
+              <a:chOff x="719137" y="3702019"/>
+              <a:chExt cx="10729912" cy="720016"/>
             </a:xfrm>
-            <a:prstGeom prst="rect">
-              <a:avLst/>
-            </a:prstGeom>
-            <a:solidFill>
-              <a:schemeClr val="bg2">
-                <a:lumMod val="90000"/>
-              </a:schemeClr>
-            </a:solidFill>
-            <a:ln>
+          </p:grpSpPr>
+          <p:sp>
+            <p:nvSpPr>
+              <p:cNvPr id="16" name="Rectangle 15">
+                <a:extLst>
+                  <a:ext uri="{FF2B5EF4-FFF2-40B4-BE49-F238E27FC236}">
+                    <a16:creationId xmlns:a16="http://schemas.microsoft.com/office/drawing/2014/main" id="{7EE6729D-A891-4D19-906D-9BA93A1A9013}"/>
+                  </a:ext>
+                </a:extLst>
+              </p:cNvPr>
+              <p:cNvSpPr/>
+              <p:nvPr/>
+            </p:nvSpPr>
+            <p:spPr>
+              <a:xfrm>
+                <a:off x="5172077" y="3702019"/>
+                <a:ext cx="1190621" cy="720000"/>
+              </a:xfrm>
+              <a:prstGeom prst="rect">
+                <a:avLst/>
+              </a:prstGeom>
               <a:solidFill>
                 <a:schemeClr val="bg2">
                   <a:lumMod val="90000"/>
                 </a:schemeClr>
               </a:solidFill>
-            </a:ln>
-          </p:spPr>
-          <p:style>
-            <a:lnRef idx="2">
-              <a:schemeClr val="accent1">
-                <a:shade val="50000"/>
-              </a:schemeClr>
-            </a:lnRef>
-            <a:fillRef idx="1">
-              <a:schemeClr val="accent1"/>
-            </a:fillRef>
-            <a:effectRef idx="0">
-              <a:schemeClr val="accent1"/>
-            </a:effectRef>
-            <a:fontRef idx="minor">
-              <a:schemeClr val="lt1"/>
-            </a:fontRef>
-          </p:style>
-          <p:txBody>
-            <a:bodyPr rtlCol="0" anchor="ctr"/>
-            <a:lstStyle/>
-            <a:p>
-              <a:pPr algn="ctr"/>
-              <a:endParaRPr lang="en-US"/>
-            </a:p>
-          </p:txBody>
-        </p:sp>
-        <p:sp>
-          <p:nvSpPr>
-            <p:cNvPr id="28" name="Arrow: Pentagon 27">
-              <a:extLst>
-                <a:ext uri="{FF2B5EF4-FFF2-40B4-BE49-F238E27FC236}">
-                  <a16:creationId xmlns:a16="http://schemas.microsoft.com/office/drawing/2014/main" id="{4F8C5411-4C2F-4FED-A650-8C77D9DC4660}"/>
-                </a:ext>
-              </a:extLst>
-            </p:cNvPr>
-            <p:cNvSpPr/>
-            <p:nvPr/>
-          </p:nvSpPr>
-          <p:spPr>
-            <a:xfrm>
-              <a:off x="1085850" y="3702035"/>
-              <a:ext cx="5181600" cy="720000"/>
-            </a:xfrm>
-            <a:prstGeom prst="homePlate">
-              <a:avLst/>
-            </a:prstGeom>
-            <a:solidFill>
-              <a:schemeClr val="bg2"/>
-            </a:solidFill>
-            <a:ln>
+              <a:ln>
+                <a:solidFill>
+                  <a:schemeClr val="bg2">
+                    <a:lumMod val="90000"/>
+                  </a:schemeClr>
+                </a:solidFill>
+              </a:ln>
+            </p:spPr>
+            <p:style>
+              <a:lnRef idx="2">
+                <a:schemeClr val="accent1">
+                  <a:shade val="50000"/>
+                </a:schemeClr>
+              </a:lnRef>
+              <a:fillRef idx="1">
+                <a:schemeClr val="accent1"/>
+              </a:fillRef>
+              <a:effectRef idx="0">
+                <a:schemeClr val="accent1"/>
+              </a:effectRef>
+              <a:fontRef idx="minor">
+                <a:schemeClr val="lt1"/>
+              </a:fontRef>
+            </p:style>
+            <p:txBody>
+              <a:bodyPr rtlCol="0" anchor="ctr"/>
+              <a:lstStyle/>
+              <a:p>
+                <a:pPr algn="ctr"/>
+                <a:endParaRPr lang="en-US"/>
+              </a:p>
+            </p:txBody>
+          </p:sp>
+          <p:sp>
+            <p:nvSpPr>
+              <p:cNvPr id="28" name="Arrow: Pentagon 27">
+                <a:extLst>
+                  <a:ext uri="{FF2B5EF4-FFF2-40B4-BE49-F238E27FC236}">
+                    <a16:creationId xmlns:a16="http://schemas.microsoft.com/office/drawing/2014/main" id="{4F8C5411-4C2F-4FED-A650-8C77D9DC4660}"/>
+                  </a:ext>
+                </a:extLst>
+              </p:cNvPr>
+              <p:cNvSpPr/>
+              <p:nvPr/>
+            </p:nvSpPr>
+            <p:spPr>
+              <a:xfrm>
+                <a:off x="1085850" y="3702035"/>
+                <a:ext cx="5181600" cy="720000"/>
+              </a:xfrm>
+              <a:prstGeom prst="homePlate">
+                <a:avLst/>
+              </a:prstGeom>
               <a:solidFill>
                 <a:schemeClr val="bg2"/>
               </a:solidFill>
-            </a:ln>
-          </p:spPr>
-          <p:style>
-            <a:lnRef idx="2">
-              <a:schemeClr val="accent1">
-                <a:shade val="50000"/>
-              </a:schemeClr>
-            </a:lnRef>
-            <a:fillRef idx="1">
-              <a:schemeClr val="accent1"/>
-            </a:fillRef>
-            <a:effectRef idx="0">
-              <a:schemeClr val="accent1"/>
-            </a:effectRef>
-            <a:fontRef idx="minor">
-              <a:schemeClr val="lt1"/>
-            </a:fontRef>
-          </p:style>
-          <p:txBody>
-            <a:bodyPr rtlCol="0" anchor="ctr"/>
-            <a:lstStyle/>
-            <a:p>
-              <a:pPr algn="ctr"/>
-              <a:r>
-                <a:rPr lang="de-DE" sz="2400">
+              <a:ln>
+                <a:solidFill>
+                  <a:schemeClr val="bg2"/>
+                </a:solidFill>
+              </a:ln>
+            </p:spPr>
+            <p:style>
+              <a:lnRef idx="2">
+                <a:schemeClr val="accent1">
+                  <a:shade val="50000"/>
+                </a:schemeClr>
+              </a:lnRef>
+              <a:fillRef idx="1">
+                <a:schemeClr val="accent1"/>
+              </a:fillRef>
+              <a:effectRef idx="0">
+                <a:schemeClr val="accent1"/>
+              </a:effectRef>
+              <a:fontRef idx="minor">
+                <a:schemeClr val="lt1"/>
+              </a:fontRef>
+            </p:style>
+            <p:txBody>
+              <a:bodyPr rtlCol="0" anchor="ctr"/>
+              <a:lstStyle/>
+              <a:p>
+                <a:pPr algn="ctr"/>
+                <a:r>
+                  <a:rPr lang="de-DE" sz="2400">
+                    <a:solidFill>
+                      <a:schemeClr val="tx1"/>
+                    </a:solidFill>
+                  </a:rPr>
+                  <a:t>Extraction of unigrams</a:t>
+                </a:r>
+                <a:endParaRPr lang="en-US" sz="2400">
                   <a:solidFill>
                     <a:schemeClr val="tx1"/>
                   </a:solidFill>
-                </a:rPr>
-                <a:t>Extraction of unigrams</a:t>
-              </a:r>
-              <a:endParaRPr lang="en-US" sz="2400">
-                <a:solidFill>
-                  <a:schemeClr val="tx1"/>
-                </a:solidFill>
-              </a:endParaRPr>
-            </a:p>
-          </p:txBody>
-        </p:sp>
-        <p:sp>
-          <p:nvSpPr>
-            <p:cNvPr id="29" name="Arrow: Pentagon 28">
-              <a:extLst>
-                <a:ext uri="{FF2B5EF4-FFF2-40B4-BE49-F238E27FC236}">
-                  <a16:creationId xmlns:a16="http://schemas.microsoft.com/office/drawing/2014/main" id="{DB5FD5B5-4D14-4EA5-8316-0A44EBE3FCC1}"/>
-                </a:ext>
-              </a:extLst>
-            </p:cNvPr>
-            <p:cNvSpPr/>
-            <p:nvPr/>
-          </p:nvSpPr>
-          <p:spPr>
-            <a:xfrm>
-              <a:off x="6362699" y="3702035"/>
-              <a:ext cx="5086350" cy="720000"/>
-            </a:xfrm>
-            <a:prstGeom prst="homePlate">
-              <a:avLst>
-                <a:gd name="adj" fmla="val 50000"/>
-              </a:avLst>
-            </a:prstGeom>
-            <a:solidFill>
-              <a:schemeClr val="bg2">
-                <a:lumMod val="90000"/>
-              </a:schemeClr>
-            </a:solidFill>
-            <a:ln>
+                </a:endParaRPr>
+              </a:p>
+            </p:txBody>
+          </p:sp>
+          <p:sp>
+            <p:nvSpPr>
+              <p:cNvPr id="29" name="Arrow: Pentagon 28">
+                <a:extLst>
+                  <a:ext uri="{FF2B5EF4-FFF2-40B4-BE49-F238E27FC236}">
+                    <a16:creationId xmlns:a16="http://schemas.microsoft.com/office/drawing/2014/main" id="{DB5FD5B5-4D14-4EA5-8316-0A44EBE3FCC1}"/>
+                  </a:ext>
+                </a:extLst>
+              </p:cNvPr>
+              <p:cNvSpPr/>
+              <p:nvPr/>
+            </p:nvSpPr>
+            <p:spPr>
+              <a:xfrm>
+                <a:off x="6362699" y="3702035"/>
+                <a:ext cx="5086350" cy="720000"/>
+              </a:xfrm>
+              <a:prstGeom prst="homePlate">
+                <a:avLst>
+                  <a:gd name="adj" fmla="val 50000"/>
+                </a:avLst>
+              </a:prstGeom>
               <a:solidFill>
                 <a:schemeClr val="bg2">
                   <a:lumMod val="90000"/>
                 </a:schemeClr>
               </a:solidFill>
-            </a:ln>
-          </p:spPr>
-          <p:style>
-            <a:lnRef idx="2">
-              <a:schemeClr val="accent1">
-                <a:shade val="50000"/>
-              </a:schemeClr>
-            </a:lnRef>
-            <a:fillRef idx="1">
-              <a:schemeClr val="accent1"/>
-            </a:fillRef>
-            <a:effectRef idx="0">
-              <a:schemeClr val="accent1"/>
-            </a:effectRef>
-            <a:fontRef idx="minor">
-              <a:schemeClr val="lt1"/>
-            </a:fontRef>
-          </p:style>
-          <p:txBody>
-            <a:bodyPr rtlCol="0" anchor="ctr"/>
-            <a:lstStyle/>
-            <a:p>
-              <a:pPr algn="ctr"/>
-              <a:r>
-                <a:rPr lang="de-DE" sz="2400">
+              <a:ln>
+                <a:solidFill>
+                  <a:schemeClr val="bg2">
+                    <a:lumMod val="90000"/>
+                  </a:schemeClr>
+                </a:solidFill>
+              </a:ln>
+            </p:spPr>
+            <p:style>
+              <a:lnRef idx="2">
+                <a:schemeClr val="accent1">
+                  <a:shade val="50000"/>
+                </a:schemeClr>
+              </a:lnRef>
+              <a:fillRef idx="1">
+                <a:schemeClr val="accent1"/>
+              </a:fillRef>
+              <a:effectRef idx="0">
+                <a:schemeClr val="accent1"/>
+              </a:effectRef>
+              <a:fontRef idx="minor">
+                <a:schemeClr val="lt1"/>
+              </a:fontRef>
+            </p:style>
+            <p:txBody>
+              <a:bodyPr rtlCol="0" anchor="ctr"/>
+              <a:lstStyle/>
+              <a:p>
+                <a:pPr algn="ctr"/>
+                <a:r>
+                  <a:rPr lang="de-DE" sz="2400">
+                    <a:solidFill>
+                      <a:schemeClr val="tx1"/>
+                    </a:solidFill>
+                  </a:rPr>
+                  <a:t>Extraction of POS tags</a:t>
+                </a:r>
+                <a:endParaRPr lang="en-US" sz="2400">
                   <a:solidFill>
                     <a:schemeClr val="tx1"/>
                   </a:solidFill>
-                </a:rPr>
-                <a:t>Extraction of POS tags</a:t>
-              </a:r>
-              <a:endParaRPr lang="en-US" sz="2400">
+                </a:endParaRPr>
+              </a:p>
+            </p:txBody>
+          </p:sp>
+          <p:sp>
+            <p:nvSpPr>
+              <p:cNvPr id="32" name="Arrow: Pentagon 31">
+                <a:extLst>
+                  <a:ext uri="{FF2B5EF4-FFF2-40B4-BE49-F238E27FC236}">
+                    <a16:creationId xmlns:a16="http://schemas.microsoft.com/office/drawing/2014/main" id="{8C66AA1F-F8C9-47D5-9512-234793A201D3}"/>
+                  </a:ext>
+                </a:extLst>
+              </p:cNvPr>
+              <p:cNvSpPr/>
+              <p:nvPr/>
+            </p:nvSpPr>
+            <p:spPr>
+              <a:xfrm>
+                <a:off x="719137" y="3702019"/>
+                <a:ext cx="733425" cy="720000"/>
+              </a:xfrm>
+              <a:prstGeom prst="homePlate">
+                <a:avLst/>
+              </a:prstGeom>
+              <a:solidFill>
+                <a:schemeClr val="bg1"/>
+              </a:solidFill>
+              <a:ln>
                 <a:solidFill>
-                  <a:schemeClr val="tx1"/>
+                  <a:schemeClr val="bg1"/>
                 </a:solidFill>
-              </a:endParaRPr>
-            </a:p>
-          </p:txBody>
-        </p:sp>
-        <p:sp>
-          <p:nvSpPr>
-            <p:cNvPr id="32" name="Arrow: Pentagon 31">
+              </a:ln>
+            </p:spPr>
+            <p:style>
+              <a:lnRef idx="2">
+                <a:schemeClr val="accent1">
+                  <a:shade val="50000"/>
+                </a:schemeClr>
+              </a:lnRef>
+              <a:fillRef idx="1">
+                <a:schemeClr val="accent1"/>
+              </a:fillRef>
+              <a:effectRef idx="0">
+                <a:schemeClr val="accent1"/>
+              </a:effectRef>
+              <a:fontRef idx="minor">
+                <a:schemeClr val="lt1"/>
+              </a:fontRef>
+            </p:style>
+            <p:txBody>
+              <a:bodyPr rtlCol="0" anchor="ctr"/>
+              <a:lstStyle/>
+              <a:p>
+                <a:pPr algn="ctr"/>
+                <a:endParaRPr lang="en-US"/>
+              </a:p>
+            </p:txBody>
+          </p:sp>
+        </p:grpSp>
+        <p:grpSp>
+          <p:nvGrpSpPr>
+            <p:cNvPr id="6" name="Group 5">
               <a:extLst>
                 <a:ext uri="{FF2B5EF4-FFF2-40B4-BE49-F238E27FC236}">
-                  <a16:creationId xmlns:a16="http://schemas.microsoft.com/office/drawing/2014/main" id="{8C66AA1F-F8C9-47D5-9512-234793A201D3}"/>
+                  <a16:creationId xmlns:a16="http://schemas.microsoft.com/office/drawing/2014/main" id="{EAE80EF5-51D7-4C81-A316-FDAD53A8EC3F}"/>
                 </a:ext>
               </a:extLst>
             </p:cNvPr>
-            <p:cNvSpPr/>
+            <p:cNvGrpSpPr/>
             <p:nvPr/>
-          </p:nvSpPr>
-          <p:spPr>
+          </p:nvGrpSpPr>
+          <p:grpSpPr>
             <a:xfrm>
-              <a:off x="719137" y="3702019"/>
-              <a:ext cx="733425" cy="720000"/>
+              <a:off x="1099635" y="2854250"/>
+              <a:ext cx="10841854" cy="720074"/>
+              <a:chOff x="1085850" y="2854250"/>
+              <a:chExt cx="10841854" cy="720074"/>
             </a:xfrm>
-            <a:prstGeom prst="homePlate">
-              <a:avLst/>
-            </a:prstGeom>
-            <a:solidFill>
-              <a:schemeClr val="bg1"/>
-            </a:solidFill>
-            <a:ln>
-              <a:solidFill>
-                <a:schemeClr val="bg1"/>
-              </a:solidFill>
-            </a:ln>
-          </p:spPr>
-          <p:style>
-            <a:lnRef idx="2">
-              <a:schemeClr val="accent1">
-                <a:shade val="50000"/>
-              </a:schemeClr>
-            </a:lnRef>
-            <a:fillRef idx="1">
-              <a:schemeClr val="accent1"/>
-            </a:fillRef>
-            <a:effectRef idx="0">
-              <a:schemeClr val="accent1"/>
-            </a:effectRef>
-            <a:fontRef idx="minor">
-              <a:schemeClr val="lt1"/>
-            </a:fontRef>
-          </p:style>
-          <p:txBody>
-            <a:bodyPr rtlCol="0" anchor="ctr"/>
-            <a:lstStyle/>
-            <a:p>
-              <a:pPr algn="ctr"/>
-              <a:endParaRPr lang="en-US"/>
-            </a:p>
-          </p:txBody>
-        </p:sp>
-      </p:grpSp>
-      <p:grpSp>
-        <p:nvGrpSpPr>
-          <p:cNvPr id="6" name="Group 5">
-            <a:extLst>
-              <a:ext uri="{FF2B5EF4-FFF2-40B4-BE49-F238E27FC236}">
-                <a16:creationId xmlns:a16="http://schemas.microsoft.com/office/drawing/2014/main" id="{EAE80EF5-51D7-4C81-A316-FDAD53A8EC3F}"/>
-              </a:ext>
-            </a:extLst>
-          </p:cNvPr>
-          <p:cNvGrpSpPr/>
-          <p:nvPr/>
-        </p:nvGrpSpPr>
-        <p:grpSpPr>
-          <a:xfrm>
-            <a:off x="1099635" y="2854250"/>
-            <a:ext cx="10841854" cy="720074"/>
-            <a:chOff x="1085850" y="2854250"/>
-            <a:chExt cx="10841854" cy="720074"/>
-          </a:xfrm>
-        </p:grpSpPr>
-        <p:sp>
-          <p:nvSpPr>
-            <p:cNvPr id="17" name="Rectangle 16">
-              <a:extLst>
-                <a:ext uri="{FF2B5EF4-FFF2-40B4-BE49-F238E27FC236}">
-                  <a16:creationId xmlns:a16="http://schemas.microsoft.com/office/drawing/2014/main" id="{39B88F07-BFD4-4A93-A0FB-463D40676F84}"/>
-                </a:ext>
-              </a:extLst>
-            </p:cNvPr>
-            <p:cNvSpPr/>
-            <p:nvPr/>
-          </p:nvSpPr>
-          <p:spPr>
-            <a:xfrm>
-              <a:off x="5629279" y="2854313"/>
-              <a:ext cx="914400" cy="720000"/>
-            </a:xfrm>
-            <a:prstGeom prst="rect">
-              <a:avLst/>
-            </a:prstGeom>
-            <a:solidFill>
-              <a:schemeClr val="bg2">
-                <a:lumMod val="90000"/>
-              </a:schemeClr>
-            </a:solidFill>
-            <a:ln>
+          </p:grpSpPr>
+          <p:sp>
+            <p:nvSpPr>
+              <p:cNvPr id="17" name="Rectangle 16">
+                <a:extLst>
+                  <a:ext uri="{FF2B5EF4-FFF2-40B4-BE49-F238E27FC236}">
+                    <a16:creationId xmlns:a16="http://schemas.microsoft.com/office/drawing/2014/main" id="{39B88F07-BFD4-4A93-A0FB-463D40676F84}"/>
+                  </a:ext>
+                </a:extLst>
+              </p:cNvPr>
+              <p:cNvSpPr/>
+              <p:nvPr/>
+            </p:nvSpPr>
+            <p:spPr>
+              <a:xfrm>
+                <a:off x="5629279" y="2854313"/>
+                <a:ext cx="914400" cy="720000"/>
+              </a:xfrm>
+              <a:prstGeom prst="rect">
+                <a:avLst/>
+              </a:prstGeom>
               <a:solidFill>
                 <a:schemeClr val="bg2">
                   <a:lumMod val="90000"/>
                 </a:schemeClr>
               </a:solidFill>
-            </a:ln>
-          </p:spPr>
-          <p:style>
-            <a:lnRef idx="2">
-              <a:schemeClr val="accent1">
-                <a:shade val="50000"/>
-              </a:schemeClr>
-            </a:lnRef>
-            <a:fillRef idx="1">
-              <a:schemeClr val="accent1"/>
-            </a:fillRef>
-            <a:effectRef idx="0">
-              <a:schemeClr val="accent1"/>
-            </a:effectRef>
-            <a:fontRef idx="minor">
-              <a:schemeClr val="lt1"/>
-            </a:fontRef>
-          </p:style>
-          <p:txBody>
-            <a:bodyPr rtlCol="0" anchor="ctr"/>
-            <a:lstStyle/>
-            <a:p>
-              <a:pPr algn="ctr"/>
-              <a:endParaRPr lang="en-US"/>
-            </a:p>
-          </p:txBody>
-        </p:sp>
+              <a:ln>
+                <a:solidFill>
+                  <a:schemeClr val="bg2">
+                    <a:lumMod val="90000"/>
+                  </a:schemeClr>
+                </a:solidFill>
+              </a:ln>
+            </p:spPr>
+            <p:style>
+              <a:lnRef idx="2">
+                <a:schemeClr val="accent1">
+                  <a:shade val="50000"/>
+                </a:schemeClr>
+              </a:lnRef>
+              <a:fillRef idx="1">
+                <a:schemeClr val="accent1"/>
+              </a:fillRef>
+              <a:effectRef idx="0">
+                <a:schemeClr val="accent1"/>
+              </a:effectRef>
+              <a:fontRef idx="minor">
+                <a:schemeClr val="lt1"/>
+              </a:fontRef>
+            </p:style>
+            <p:txBody>
+              <a:bodyPr rtlCol="0" anchor="ctr"/>
+              <a:lstStyle/>
+              <a:p>
+                <a:pPr algn="ctr"/>
+                <a:endParaRPr lang="en-US"/>
+              </a:p>
+            </p:txBody>
+          </p:sp>
+          <p:sp>
+            <p:nvSpPr>
+              <p:cNvPr id="26" name="Arrow: Pentagon 25">
+                <a:extLst>
+                  <a:ext uri="{FF2B5EF4-FFF2-40B4-BE49-F238E27FC236}">
+                    <a16:creationId xmlns:a16="http://schemas.microsoft.com/office/drawing/2014/main" id="{45BA6309-1E55-4B09-8611-71DE3936D983}"/>
+                  </a:ext>
+                </a:extLst>
+              </p:cNvPr>
+              <p:cNvSpPr/>
+              <p:nvPr/>
+            </p:nvSpPr>
+            <p:spPr>
+              <a:xfrm flipH="1">
+                <a:off x="5991221" y="2854324"/>
+                <a:ext cx="5516495" cy="720000"/>
+              </a:xfrm>
+              <a:prstGeom prst="homePlate">
+                <a:avLst/>
+              </a:prstGeom>
+              <a:solidFill>
+                <a:schemeClr val="bg2"/>
+              </a:solidFill>
+              <a:ln>
+                <a:solidFill>
+                  <a:schemeClr val="bg2"/>
+                </a:solidFill>
+              </a:ln>
+            </p:spPr>
+            <p:style>
+              <a:lnRef idx="2">
+                <a:schemeClr val="accent1">
+                  <a:shade val="50000"/>
+                </a:schemeClr>
+              </a:lnRef>
+              <a:fillRef idx="1">
+                <a:schemeClr val="accent1"/>
+              </a:fillRef>
+              <a:effectRef idx="0">
+                <a:schemeClr val="accent1"/>
+              </a:effectRef>
+              <a:fontRef idx="minor">
+                <a:schemeClr val="lt1"/>
+              </a:fontRef>
+            </p:style>
+            <p:txBody>
+              <a:bodyPr rtlCol="0" anchor="ctr"/>
+              <a:lstStyle/>
+              <a:p>
+                <a:pPr algn="ctr"/>
+                <a:r>
+                  <a:rPr lang="de-DE" sz="2400">
+                    <a:solidFill>
+                      <a:schemeClr val="tx1"/>
+                    </a:solidFill>
+                  </a:rPr>
+                  <a:t>Extraction of dictionary features</a:t>
+                </a:r>
+                <a:endParaRPr lang="en-US" sz="2400">
+                  <a:solidFill>
+                    <a:schemeClr val="tx1"/>
+                  </a:solidFill>
+                </a:endParaRPr>
+              </a:p>
+            </p:txBody>
+          </p:sp>
+          <p:sp>
+            <p:nvSpPr>
+              <p:cNvPr id="27" name="Arrow: Pentagon 26">
+                <a:extLst>
+                  <a:ext uri="{FF2B5EF4-FFF2-40B4-BE49-F238E27FC236}">
+                    <a16:creationId xmlns:a16="http://schemas.microsoft.com/office/drawing/2014/main" id="{168F4DF7-8626-43B7-ADF2-22B205E57185}"/>
+                  </a:ext>
+                </a:extLst>
+              </p:cNvPr>
+              <p:cNvSpPr/>
+              <p:nvPr/>
+            </p:nvSpPr>
+            <p:spPr>
+              <a:xfrm flipH="1">
+                <a:off x="1085850" y="2854324"/>
+                <a:ext cx="4905373" cy="720000"/>
+              </a:xfrm>
+              <a:prstGeom prst="homePlate">
+                <a:avLst>
+                  <a:gd name="adj" fmla="val 50000"/>
+                </a:avLst>
+              </a:prstGeom>
+              <a:solidFill>
+                <a:schemeClr val="bg2">
+                  <a:lumMod val="90000"/>
+                </a:schemeClr>
+              </a:solidFill>
+              <a:ln>
+                <a:solidFill>
+                  <a:schemeClr val="bg2">
+                    <a:lumMod val="90000"/>
+                  </a:schemeClr>
+                </a:solidFill>
+              </a:ln>
+            </p:spPr>
+            <p:style>
+              <a:lnRef idx="2">
+                <a:schemeClr val="accent1">
+                  <a:shade val="50000"/>
+                </a:schemeClr>
+              </a:lnRef>
+              <a:fillRef idx="1">
+                <a:schemeClr val="accent1"/>
+              </a:fillRef>
+              <a:effectRef idx="0">
+                <a:schemeClr val="accent1"/>
+              </a:effectRef>
+              <a:fontRef idx="minor">
+                <a:schemeClr val="lt1"/>
+              </a:fontRef>
+            </p:style>
+            <p:txBody>
+              <a:bodyPr rtlCol="0" anchor="ctr"/>
+              <a:lstStyle/>
+              <a:p>
+                <a:pPr algn="ctr"/>
+                <a:r>
+                  <a:rPr lang="de-DE" sz="2400">
+                    <a:solidFill>
+                      <a:schemeClr val="tx1"/>
+                    </a:solidFill>
+                  </a:rPr>
+                  <a:t>Extraction of lexical features</a:t>
+                </a:r>
+                <a:endParaRPr lang="en-US" sz="2400">
+                  <a:solidFill>
+                    <a:schemeClr val="tx1"/>
+                  </a:solidFill>
+                </a:endParaRPr>
+              </a:p>
+            </p:txBody>
+          </p:sp>
+          <p:sp>
+            <p:nvSpPr>
+              <p:cNvPr id="33" name="Arrow: Pentagon 32">
+                <a:extLst>
+                  <a:ext uri="{FF2B5EF4-FFF2-40B4-BE49-F238E27FC236}">
+                    <a16:creationId xmlns:a16="http://schemas.microsoft.com/office/drawing/2014/main" id="{CD69CD10-3922-491E-9E01-B1D934DD2EEF}"/>
+                  </a:ext>
+                </a:extLst>
+              </p:cNvPr>
+              <p:cNvSpPr/>
+              <p:nvPr/>
+            </p:nvSpPr>
+            <p:spPr>
+              <a:xfrm flipH="1">
+                <a:off x="11151410" y="2854250"/>
+                <a:ext cx="776294" cy="720000"/>
+              </a:xfrm>
+              <a:prstGeom prst="homePlate">
+                <a:avLst/>
+              </a:prstGeom>
+              <a:solidFill>
+                <a:schemeClr val="bg1"/>
+              </a:solidFill>
+              <a:ln>
+                <a:solidFill>
+                  <a:schemeClr val="bg1"/>
+                </a:solidFill>
+              </a:ln>
+            </p:spPr>
+            <p:style>
+              <a:lnRef idx="2">
+                <a:schemeClr val="accent1">
+                  <a:shade val="50000"/>
+                </a:schemeClr>
+              </a:lnRef>
+              <a:fillRef idx="1">
+                <a:schemeClr val="accent1"/>
+              </a:fillRef>
+              <a:effectRef idx="0">
+                <a:schemeClr val="accent1"/>
+              </a:effectRef>
+              <a:fontRef idx="minor">
+                <a:schemeClr val="lt1"/>
+              </a:fontRef>
+            </p:style>
+            <p:txBody>
+              <a:bodyPr rtlCol="0" anchor="ctr"/>
+              <a:lstStyle/>
+              <a:p>
+                <a:pPr algn="ctr"/>
+                <a:endParaRPr lang="en-US"/>
+              </a:p>
+            </p:txBody>
+          </p:sp>
+        </p:grpSp>
+        <p:grpSp>
+          <p:nvGrpSpPr>
+            <p:cNvPr id="8" name="Group 7">
+              <a:extLst>
+                <a:ext uri="{FF2B5EF4-FFF2-40B4-BE49-F238E27FC236}">
+                  <a16:creationId xmlns:a16="http://schemas.microsoft.com/office/drawing/2014/main" id="{B96386DA-F604-4995-BB1F-94FD94A5C166}"/>
+                </a:ext>
+              </a:extLst>
+            </p:cNvPr>
+            <p:cNvGrpSpPr/>
+            <p:nvPr/>
+          </p:nvGrpSpPr>
+          <p:grpSpPr>
+            <a:xfrm>
+              <a:off x="1099635" y="4549683"/>
+              <a:ext cx="10458444" cy="720017"/>
+              <a:chOff x="1085854" y="4549698"/>
+              <a:chExt cx="10458444" cy="720017"/>
+            </a:xfrm>
+          </p:grpSpPr>
+          <p:sp>
+            <p:nvSpPr>
+              <p:cNvPr id="11" name="Rectangle 10">
+                <a:extLst>
+                  <a:ext uri="{FF2B5EF4-FFF2-40B4-BE49-F238E27FC236}">
+                    <a16:creationId xmlns:a16="http://schemas.microsoft.com/office/drawing/2014/main" id="{493A0A23-3FEC-4F31-AE41-8D2D71EF4A51}"/>
+                  </a:ext>
+                </a:extLst>
+              </p:cNvPr>
+              <p:cNvSpPr/>
+              <p:nvPr/>
+            </p:nvSpPr>
+            <p:spPr>
+              <a:xfrm>
+                <a:off x="4105278" y="4549698"/>
+                <a:ext cx="914400" cy="720000"/>
+              </a:xfrm>
+              <a:prstGeom prst="rect">
+                <a:avLst/>
+              </a:prstGeom>
+              <a:solidFill>
+                <a:srgbClr val="66CCFF"/>
+              </a:solidFill>
+              <a:ln>
+                <a:solidFill>
+                  <a:srgbClr val="66CCFF"/>
+                </a:solidFill>
+              </a:ln>
+            </p:spPr>
+            <p:style>
+              <a:lnRef idx="2">
+                <a:schemeClr val="accent1">
+                  <a:shade val="50000"/>
+                </a:schemeClr>
+              </a:lnRef>
+              <a:fillRef idx="1">
+                <a:schemeClr val="accent1"/>
+              </a:fillRef>
+              <a:effectRef idx="0">
+                <a:schemeClr val="accent1"/>
+              </a:effectRef>
+              <a:fontRef idx="minor">
+                <a:schemeClr val="lt1"/>
+              </a:fontRef>
+            </p:style>
+            <p:txBody>
+              <a:bodyPr rtlCol="0" anchor="ctr"/>
+              <a:lstStyle/>
+              <a:p>
+                <a:pPr algn="ctr"/>
+                <a:endParaRPr lang="en-US"/>
+              </a:p>
+            </p:txBody>
+          </p:sp>
+          <p:sp>
+            <p:nvSpPr>
+              <p:cNvPr id="12" name="Rectangle 11">
+                <a:extLst>
+                  <a:ext uri="{FF2B5EF4-FFF2-40B4-BE49-F238E27FC236}">
+                    <a16:creationId xmlns:a16="http://schemas.microsoft.com/office/drawing/2014/main" id="{C0AB1223-5C23-4B03-BDE7-C4DC57007D12}"/>
+                  </a:ext>
+                </a:extLst>
+              </p:cNvPr>
+              <p:cNvSpPr/>
+              <p:nvPr/>
+            </p:nvSpPr>
+            <p:spPr>
+              <a:xfrm>
+                <a:off x="7753359" y="4549714"/>
+                <a:ext cx="914400" cy="720000"/>
+              </a:xfrm>
+              <a:prstGeom prst="rect">
+                <a:avLst/>
+              </a:prstGeom>
+              <a:solidFill>
+                <a:schemeClr val="tx1">
+                  <a:lumMod val="75000"/>
+                  <a:lumOff val="25000"/>
+                </a:schemeClr>
+              </a:solidFill>
+              <a:ln>
+                <a:solidFill>
+                  <a:schemeClr val="tx1">
+                    <a:lumMod val="75000"/>
+                    <a:lumOff val="25000"/>
+                  </a:schemeClr>
+                </a:solidFill>
+              </a:ln>
+            </p:spPr>
+            <p:style>
+              <a:lnRef idx="2">
+                <a:schemeClr val="accent1">
+                  <a:shade val="50000"/>
+                </a:schemeClr>
+              </a:lnRef>
+              <a:fillRef idx="1">
+                <a:schemeClr val="accent1"/>
+              </a:fillRef>
+              <a:effectRef idx="0">
+                <a:schemeClr val="accent1"/>
+              </a:effectRef>
+              <a:fontRef idx="minor">
+                <a:schemeClr val="lt1"/>
+              </a:fontRef>
+            </p:style>
+            <p:txBody>
+              <a:bodyPr rtlCol="0" anchor="ctr"/>
+              <a:lstStyle/>
+              <a:p>
+                <a:pPr algn="ctr"/>
+                <a:endParaRPr lang="en-US"/>
+              </a:p>
+            </p:txBody>
+          </p:sp>
+          <p:sp>
+            <p:nvSpPr>
+              <p:cNvPr id="30" name="Arrow: Pentagon 29">
+                <a:extLst>
+                  <a:ext uri="{FF2B5EF4-FFF2-40B4-BE49-F238E27FC236}">
+                    <a16:creationId xmlns:a16="http://schemas.microsoft.com/office/drawing/2014/main" id="{AA0DA784-9F70-47D3-9F78-9CC35F170FD6}"/>
+                  </a:ext>
+                </a:extLst>
+              </p:cNvPr>
+              <p:cNvSpPr/>
+              <p:nvPr/>
+            </p:nvSpPr>
+            <p:spPr>
+              <a:xfrm flipH="1">
+                <a:off x="4448180" y="4549714"/>
+                <a:ext cx="3590922" cy="720000"/>
+              </a:xfrm>
+              <a:prstGeom prst="homePlate">
+                <a:avLst>
+                  <a:gd name="adj" fmla="val 50000"/>
+                </a:avLst>
+              </a:prstGeom>
+              <a:solidFill>
+                <a:schemeClr val="tx1">
+                  <a:lumMod val="75000"/>
+                  <a:lumOff val="25000"/>
+                </a:schemeClr>
+              </a:solidFill>
+              <a:ln>
+                <a:solidFill>
+                  <a:schemeClr val="tx1">
+                    <a:lumMod val="75000"/>
+                    <a:lumOff val="25000"/>
+                  </a:schemeClr>
+                </a:solidFill>
+              </a:ln>
+            </p:spPr>
+            <p:style>
+              <a:lnRef idx="2">
+                <a:schemeClr val="accent1">
+                  <a:shade val="50000"/>
+                </a:schemeClr>
+              </a:lnRef>
+              <a:fillRef idx="1">
+                <a:schemeClr val="accent1"/>
+              </a:fillRef>
+              <a:effectRef idx="0">
+                <a:schemeClr val="accent1"/>
+              </a:effectRef>
+              <a:fontRef idx="minor">
+                <a:schemeClr val="lt1"/>
+              </a:fontRef>
+            </p:style>
+            <p:txBody>
+              <a:bodyPr rtlCol="0" anchor="ctr"/>
+              <a:lstStyle/>
+              <a:p>
+                <a:pPr algn="ctr"/>
+                <a:r>
+                  <a:rPr lang="de-DE" sz="2400">
+                    <a:solidFill>
+                      <a:schemeClr val="bg1"/>
+                    </a:solidFill>
+                  </a:rPr>
+                  <a:t>Word embeddings</a:t>
+                </a:r>
+                <a:endParaRPr lang="en-US" sz="2400">
+                  <a:solidFill>
+                    <a:schemeClr val="bg1"/>
+                  </a:solidFill>
+                </a:endParaRPr>
+              </a:p>
+            </p:txBody>
+          </p:sp>
+          <p:sp>
+            <p:nvSpPr>
+              <p:cNvPr id="31" name="Arrow: Pentagon 30">
+                <a:extLst>
+                  <a:ext uri="{FF2B5EF4-FFF2-40B4-BE49-F238E27FC236}">
+                    <a16:creationId xmlns:a16="http://schemas.microsoft.com/office/drawing/2014/main" id="{472E70B5-EFE1-4931-B39E-6D9E6C84CA8B}"/>
+                  </a:ext>
+                </a:extLst>
+              </p:cNvPr>
+              <p:cNvSpPr/>
+              <p:nvPr/>
+            </p:nvSpPr>
+            <p:spPr>
+              <a:xfrm flipH="1">
+                <a:off x="1085854" y="4549714"/>
+                <a:ext cx="3276603" cy="720000"/>
+              </a:xfrm>
+              <a:prstGeom prst="homePlate">
+                <a:avLst/>
+              </a:prstGeom>
+              <a:solidFill>
+                <a:srgbClr val="66CCFF"/>
+              </a:solidFill>
+              <a:ln>
+                <a:solidFill>
+                  <a:srgbClr val="66CCFF"/>
+                </a:solidFill>
+              </a:ln>
+            </p:spPr>
+            <p:style>
+              <a:lnRef idx="2">
+                <a:schemeClr val="accent1">
+                  <a:shade val="50000"/>
+                </a:schemeClr>
+              </a:lnRef>
+              <a:fillRef idx="1">
+                <a:schemeClr val="accent1"/>
+              </a:fillRef>
+              <a:effectRef idx="0">
+                <a:schemeClr val="accent1"/>
+              </a:effectRef>
+              <a:fontRef idx="minor">
+                <a:schemeClr val="lt1"/>
+              </a:fontRef>
+            </p:style>
+            <p:txBody>
+              <a:bodyPr rtlCol="0" anchor="ctr"/>
+              <a:lstStyle/>
+              <a:p>
+                <a:pPr algn="ctr"/>
+                <a:r>
+                  <a:rPr lang="de-DE" sz="2400" b="1">
+                    <a:solidFill>
+                      <a:schemeClr val="bg1"/>
+                    </a:solidFill>
+                  </a:rPr>
+                  <a:t>Sentiment analysis</a:t>
+                </a:r>
+                <a:endParaRPr lang="en-US" sz="2400" b="1">
+                  <a:solidFill>
+                    <a:schemeClr val="bg1"/>
+                  </a:solidFill>
+                </a:endParaRPr>
+              </a:p>
+            </p:txBody>
+          </p:sp>
+          <p:sp>
+            <p:nvSpPr>
+              <p:cNvPr id="34" name="Arrow: Pentagon 33">
+                <a:extLst>
+                  <a:ext uri="{FF2B5EF4-FFF2-40B4-BE49-F238E27FC236}">
+                    <a16:creationId xmlns:a16="http://schemas.microsoft.com/office/drawing/2014/main" id="{A49C2862-BDE1-4735-9C57-5F47FBA0D2EB}"/>
+                  </a:ext>
+                </a:extLst>
+              </p:cNvPr>
+              <p:cNvSpPr/>
+              <p:nvPr/>
+            </p:nvSpPr>
+            <p:spPr>
+              <a:xfrm flipH="1">
+                <a:off x="7953378" y="4549715"/>
+                <a:ext cx="3590920" cy="720000"/>
+              </a:xfrm>
+              <a:prstGeom prst="homePlate">
+                <a:avLst/>
+              </a:prstGeom>
+              <a:solidFill>
+                <a:schemeClr val="tx1">
+                  <a:lumMod val="50000"/>
+                  <a:lumOff val="50000"/>
+                </a:schemeClr>
+              </a:solidFill>
+              <a:ln>
+                <a:solidFill>
+                  <a:schemeClr val="tx1">
+                    <a:lumMod val="50000"/>
+                    <a:lumOff val="50000"/>
+                  </a:schemeClr>
+                </a:solidFill>
+              </a:ln>
+            </p:spPr>
+            <p:style>
+              <a:lnRef idx="2">
+                <a:schemeClr val="accent1">
+                  <a:shade val="50000"/>
+                </a:schemeClr>
+              </a:lnRef>
+              <a:fillRef idx="1">
+                <a:schemeClr val="accent1"/>
+              </a:fillRef>
+              <a:effectRef idx="0">
+                <a:schemeClr val="accent1"/>
+              </a:effectRef>
+              <a:fontRef idx="minor">
+                <a:schemeClr val="lt1"/>
+              </a:fontRef>
+            </p:style>
+            <p:txBody>
+              <a:bodyPr rtlCol="0" anchor="ctr"/>
+              <a:lstStyle/>
+              <a:p>
+                <a:pPr algn="ctr"/>
+                <a:r>
+                  <a:rPr lang="de-DE" sz="2400">
+                    <a:solidFill>
+                      <a:schemeClr val="bg1"/>
+                    </a:solidFill>
+                  </a:rPr>
+                  <a:t>Topic modeling</a:t>
+                </a:r>
+                <a:endParaRPr lang="en-US" sz="2400">
+                  <a:solidFill>
+                    <a:schemeClr val="bg1"/>
+                  </a:solidFill>
+                </a:endParaRPr>
+              </a:p>
+            </p:txBody>
+          </p:sp>
+        </p:grpSp>
         <p:sp>
           <p:nvSpPr>
-            <p:cNvPr id="26" name="Arrow: Pentagon 25">
+            <p:cNvPr id="35" name="Arrow: Pentagon 34">
               <a:extLst>
                 <a:ext uri="{FF2B5EF4-FFF2-40B4-BE49-F238E27FC236}">
-                  <a16:creationId xmlns:a16="http://schemas.microsoft.com/office/drawing/2014/main" id="{45BA6309-1E55-4B09-8611-71DE3936D983}"/>
+                  <a16:creationId xmlns:a16="http://schemas.microsoft.com/office/drawing/2014/main" id="{07C12E8E-0BDB-4F13-A6D0-FBB531D6E2E7}"/>
                 </a:ext>
               </a:extLst>
             </p:cNvPr>
@@ -13236,145 +13796,7 @@
           </p:nvSpPr>
           <p:spPr>
             <a:xfrm flipH="1">
-              <a:off x="5991221" y="2854324"/>
-              <a:ext cx="5516495" cy="720000"/>
-            </a:xfrm>
-            <a:prstGeom prst="homePlate">
-              <a:avLst/>
-            </a:prstGeom>
-            <a:solidFill>
-              <a:schemeClr val="bg2"/>
-            </a:solidFill>
-            <a:ln>
-              <a:solidFill>
-                <a:schemeClr val="bg2"/>
-              </a:solidFill>
-            </a:ln>
-          </p:spPr>
-          <p:style>
-            <a:lnRef idx="2">
-              <a:schemeClr val="accent1">
-                <a:shade val="50000"/>
-              </a:schemeClr>
-            </a:lnRef>
-            <a:fillRef idx="1">
-              <a:schemeClr val="accent1"/>
-            </a:fillRef>
-            <a:effectRef idx="0">
-              <a:schemeClr val="accent1"/>
-            </a:effectRef>
-            <a:fontRef idx="minor">
-              <a:schemeClr val="lt1"/>
-            </a:fontRef>
-          </p:style>
-          <p:txBody>
-            <a:bodyPr rtlCol="0" anchor="ctr"/>
-            <a:lstStyle/>
-            <a:p>
-              <a:pPr algn="ctr"/>
-              <a:r>
-                <a:rPr lang="de-DE" sz="2400">
-                  <a:solidFill>
-                    <a:schemeClr val="tx1"/>
-                  </a:solidFill>
-                </a:rPr>
-                <a:t>Extraction of dictionary features</a:t>
-              </a:r>
-              <a:endParaRPr lang="en-US" sz="2400">
-                <a:solidFill>
-                  <a:schemeClr val="tx1"/>
-                </a:solidFill>
-              </a:endParaRPr>
-            </a:p>
-          </p:txBody>
-        </p:sp>
-        <p:sp>
-          <p:nvSpPr>
-            <p:cNvPr id="27" name="Arrow: Pentagon 26">
-              <a:extLst>
-                <a:ext uri="{FF2B5EF4-FFF2-40B4-BE49-F238E27FC236}">
-                  <a16:creationId xmlns:a16="http://schemas.microsoft.com/office/drawing/2014/main" id="{168F4DF7-8626-43B7-ADF2-22B205E57185}"/>
-                </a:ext>
-              </a:extLst>
-            </p:cNvPr>
-            <p:cNvSpPr/>
-            <p:nvPr/>
-          </p:nvSpPr>
-          <p:spPr>
-            <a:xfrm flipH="1">
-              <a:off x="1085850" y="2854324"/>
-              <a:ext cx="4905373" cy="720000"/>
-            </a:xfrm>
-            <a:prstGeom prst="homePlate">
-              <a:avLst>
-                <a:gd name="adj" fmla="val 50000"/>
-              </a:avLst>
-            </a:prstGeom>
-            <a:solidFill>
-              <a:schemeClr val="bg2">
-                <a:lumMod val="90000"/>
-              </a:schemeClr>
-            </a:solidFill>
-            <a:ln>
-              <a:solidFill>
-                <a:schemeClr val="bg2">
-                  <a:lumMod val="90000"/>
-                </a:schemeClr>
-              </a:solidFill>
-            </a:ln>
-          </p:spPr>
-          <p:style>
-            <a:lnRef idx="2">
-              <a:schemeClr val="accent1">
-                <a:shade val="50000"/>
-              </a:schemeClr>
-            </a:lnRef>
-            <a:fillRef idx="1">
-              <a:schemeClr val="accent1"/>
-            </a:fillRef>
-            <a:effectRef idx="0">
-              <a:schemeClr val="accent1"/>
-            </a:effectRef>
-            <a:fontRef idx="minor">
-              <a:schemeClr val="lt1"/>
-            </a:fontRef>
-          </p:style>
-          <p:txBody>
-            <a:bodyPr rtlCol="0" anchor="ctr"/>
-            <a:lstStyle/>
-            <a:p>
-              <a:pPr algn="ctr"/>
-              <a:r>
-                <a:rPr lang="de-DE" sz="2400">
-                  <a:solidFill>
-                    <a:schemeClr val="tx1"/>
-                  </a:solidFill>
-                </a:rPr>
-                <a:t>Extraction of lexical features</a:t>
-              </a:r>
-              <a:endParaRPr lang="en-US" sz="2400">
-                <a:solidFill>
-                  <a:schemeClr val="tx1"/>
-                </a:solidFill>
-              </a:endParaRPr>
-            </a:p>
-          </p:txBody>
-        </p:sp>
-        <p:sp>
-          <p:nvSpPr>
-            <p:cNvPr id="33" name="Arrow: Pentagon 32">
-              <a:extLst>
-                <a:ext uri="{FF2B5EF4-FFF2-40B4-BE49-F238E27FC236}">
-                  <a16:creationId xmlns:a16="http://schemas.microsoft.com/office/drawing/2014/main" id="{CD69CD10-3922-491E-9E01-B1D934DD2EEF}"/>
-                </a:ext>
-              </a:extLst>
-            </p:cNvPr>
-            <p:cNvSpPr/>
-            <p:nvPr/>
-          </p:nvSpPr>
-          <p:spPr>
-            <a:xfrm flipH="1">
-              <a:off x="11151410" y="2854250"/>
+              <a:off x="11183503" y="4549683"/>
               <a:ext cx="776294" cy="720000"/>
             </a:xfrm>
             <a:prstGeom prst="homePlate">
@@ -13414,33 +13836,12 @@
             </a:p>
           </p:txBody>
         </p:sp>
-      </p:grpSp>
-      <p:grpSp>
-        <p:nvGrpSpPr>
-          <p:cNvPr id="8" name="Group 7">
-            <a:extLst>
-              <a:ext uri="{FF2B5EF4-FFF2-40B4-BE49-F238E27FC236}">
-                <a16:creationId xmlns:a16="http://schemas.microsoft.com/office/drawing/2014/main" id="{B96386DA-F604-4995-BB1F-94FD94A5C166}"/>
-              </a:ext>
-            </a:extLst>
-          </p:cNvPr>
-          <p:cNvGrpSpPr/>
-          <p:nvPr/>
-        </p:nvGrpSpPr>
-        <p:grpSpPr>
-          <a:xfrm>
-            <a:off x="1099635" y="4549683"/>
-            <a:ext cx="10458444" cy="720017"/>
-            <a:chOff x="1085854" y="4549698"/>
-            <a:chExt cx="10458444" cy="720017"/>
-          </a:xfrm>
-        </p:grpSpPr>
         <p:sp>
           <p:nvSpPr>
-            <p:cNvPr id="11" name="Rectangle 10">
+            <p:cNvPr id="36" name="Speech Bubble: Rectangle 35">
               <a:extLst>
                 <a:ext uri="{FF2B5EF4-FFF2-40B4-BE49-F238E27FC236}">
-                  <a16:creationId xmlns:a16="http://schemas.microsoft.com/office/drawing/2014/main" id="{493A0A23-3FEC-4F31-AE41-8D2D71EF4A51}"/>
+                  <a16:creationId xmlns:a16="http://schemas.microsoft.com/office/drawing/2014/main" id="{D2D93D2B-8828-4304-AE76-5617A1264F42}"/>
                 </a:ext>
               </a:extLst>
             </p:cNvPr>
@@ -13449,141 +13850,18 @@
           </p:nvSpPr>
           <p:spPr>
             <a:xfrm>
-              <a:off x="4105278" y="4549698"/>
-              <a:ext cx="914400" cy="720000"/>
+              <a:off x="6960767" y="5804590"/>
+              <a:ext cx="2381247" cy="444501"/>
             </a:xfrm>
-            <a:prstGeom prst="rect">
-              <a:avLst/>
-            </a:prstGeom>
-            <a:solidFill>
-              <a:srgbClr val="66CCFF"/>
-            </a:solidFill>
-            <a:ln>
-              <a:solidFill>
-                <a:srgbClr val="66CCFF"/>
-              </a:solidFill>
-            </a:ln>
-          </p:spPr>
-          <p:style>
-            <a:lnRef idx="2">
-              <a:schemeClr val="accent1">
-                <a:shade val="50000"/>
-              </a:schemeClr>
-            </a:lnRef>
-            <a:fillRef idx="1">
-              <a:schemeClr val="accent1"/>
-            </a:fillRef>
-            <a:effectRef idx="0">
-              <a:schemeClr val="accent1"/>
-            </a:effectRef>
-            <a:fontRef idx="minor">
-              <a:schemeClr val="lt1"/>
-            </a:fontRef>
-          </p:style>
-          <p:txBody>
-            <a:bodyPr rtlCol="0" anchor="ctr"/>
-            <a:lstStyle/>
-            <a:p>
-              <a:pPr algn="ctr"/>
-              <a:endParaRPr lang="en-US"/>
-            </a:p>
-          </p:txBody>
-        </p:sp>
-        <p:sp>
-          <p:nvSpPr>
-            <p:cNvPr id="12" name="Rectangle 11">
-              <a:extLst>
-                <a:ext uri="{FF2B5EF4-FFF2-40B4-BE49-F238E27FC236}">
-                  <a16:creationId xmlns:a16="http://schemas.microsoft.com/office/drawing/2014/main" id="{C0AB1223-5C23-4B03-BDE7-C4DC57007D12}"/>
-                </a:ext>
-              </a:extLst>
-            </p:cNvPr>
-            <p:cNvSpPr/>
-            <p:nvPr/>
-          </p:nvSpPr>
-          <p:spPr>
-            <a:xfrm>
-              <a:off x="7753359" y="4549714"/>
-              <a:ext cx="914400" cy="720000"/>
-            </a:xfrm>
-            <a:prstGeom prst="rect">
-              <a:avLst/>
-            </a:prstGeom>
-            <a:solidFill>
-              <a:schemeClr val="tx1">
-                <a:lumMod val="75000"/>
-                <a:lumOff val="25000"/>
-              </a:schemeClr>
-            </a:solidFill>
-            <a:ln>
-              <a:solidFill>
-                <a:schemeClr val="tx1">
-                  <a:lumMod val="75000"/>
-                  <a:lumOff val="25000"/>
-                </a:schemeClr>
-              </a:solidFill>
-            </a:ln>
-          </p:spPr>
-          <p:style>
-            <a:lnRef idx="2">
-              <a:schemeClr val="accent1">
-                <a:shade val="50000"/>
-              </a:schemeClr>
-            </a:lnRef>
-            <a:fillRef idx="1">
-              <a:schemeClr val="accent1"/>
-            </a:fillRef>
-            <a:effectRef idx="0">
-              <a:schemeClr val="accent1"/>
-            </a:effectRef>
-            <a:fontRef idx="minor">
-              <a:schemeClr val="lt1"/>
-            </a:fontRef>
-          </p:style>
-          <p:txBody>
-            <a:bodyPr rtlCol="0" anchor="ctr"/>
-            <a:lstStyle/>
-            <a:p>
-              <a:pPr algn="ctr"/>
-              <a:endParaRPr lang="en-US"/>
-            </a:p>
-          </p:txBody>
-        </p:sp>
-        <p:sp>
-          <p:nvSpPr>
-            <p:cNvPr id="30" name="Arrow: Pentagon 29">
-              <a:extLst>
-                <a:ext uri="{FF2B5EF4-FFF2-40B4-BE49-F238E27FC236}">
-                  <a16:creationId xmlns:a16="http://schemas.microsoft.com/office/drawing/2014/main" id="{AA0DA784-9F70-47D3-9F78-9CC35F170FD6}"/>
-                </a:ext>
-              </a:extLst>
-            </p:cNvPr>
-            <p:cNvSpPr/>
-            <p:nvPr/>
-          </p:nvSpPr>
-          <p:spPr>
-            <a:xfrm flipH="1">
-              <a:off x="4448180" y="4549714"/>
-              <a:ext cx="3590922" cy="720000"/>
-            </a:xfrm>
-            <a:prstGeom prst="homePlate">
+            <a:prstGeom prst="wedgeRectCallout">
               <a:avLst>
-                <a:gd name="adj" fmla="val 50000"/>
+                <a:gd name="adj1" fmla="val -60500"/>
+                <a:gd name="adj2" fmla="val -7955"/>
               </a:avLst>
             </a:prstGeom>
-            <a:solidFill>
-              <a:schemeClr val="tx1">
-                <a:lumMod val="75000"/>
-                <a:lumOff val="25000"/>
-              </a:schemeClr>
-            </a:solidFill>
+            <a:noFill/>
             <a:ln>
-              <a:solidFill>
-                <a:schemeClr val="tx1">
-                  <a:lumMod val="75000"/>
-                  <a:lumOff val="25000"/>
-                </a:schemeClr>
-              </a:solidFill>
+              <a:noFill/>
             </a:ln>
           </p:spPr>
           <p:style>
@@ -13608,16 +13886,16 @@
             <a:p>
               <a:pPr algn="ctr"/>
               <a:r>
-                <a:rPr lang="de-DE" sz="2400">
+                <a:rPr lang="de-DE" sz="2400" i="1">
                   <a:solidFill>
-                    <a:schemeClr val="bg1"/>
+                    <a:schemeClr val="tx1"/>
                   </a:solidFill>
                 </a:rPr>
-                <a:t>Word embeddings</a:t>
+                <a:t>Dynamic features</a:t>
               </a:r>
-              <a:endParaRPr lang="en-US" sz="2400">
+              <a:endParaRPr lang="en-US" sz="2400" i="1">
                 <a:solidFill>
-                  <a:schemeClr val="bg1"/>
+                  <a:schemeClr val="tx1"/>
                 </a:solidFill>
               </a:endParaRPr>
             </a:p>
@@ -13625,10 +13903,10 @@
         </p:sp>
         <p:sp>
           <p:nvSpPr>
-            <p:cNvPr id="31" name="Arrow: Pentagon 30">
+            <p:cNvPr id="37" name="Right Brace 36">
               <a:extLst>
                 <a:ext uri="{FF2B5EF4-FFF2-40B4-BE49-F238E27FC236}">
-                  <a16:creationId xmlns:a16="http://schemas.microsoft.com/office/drawing/2014/main" id="{472E70B5-EFE1-4931-B39E-6D9E6C84CA8B}"/>
+                  <a16:creationId xmlns:a16="http://schemas.microsoft.com/office/drawing/2014/main" id="{8615D22F-21EB-429A-B7E7-BDBDBF12B720}"/>
                 </a:ext>
               </a:extLst>
             </p:cNvPr>
@@ -13636,86 +13914,15 @@
             <p:nvPr/>
           </p:nvSpPr>
           <p:spPr>
-            <a:xfrm flipH="1">
-              <a:off x="1085854" y="4549714"/>
-              <a:ext cx="3276603" cy="720000"/>
+            <a:xfrm rot="5400000">
+              <a:off x="8035713" y="2288012"/>
+              <a:ext cx="231356" cy="6587281"/>
             </a:xfrm>
-            <a:prstGeom prst="homePlate">
+            <a:prstGeom prst="rightBrace">
               <a:avLst/>
             </a:prstGeom>
-            <a:solidFill>
-              <a:srgbClr val="66CCFF"/>
-            </a:solidFill>
-            <a:ln>
-              <a:solidFill>
-                <a:srgbClr val="66CCFF"/>
-              </a:solidFill>
-            </a:ln>
-          </p:spPr>
-          <p:style>
-            <a:lnRef idx="2">
-              <a:schemeClr val="accent1">
-                <a:shade val="50000"/>
-              </a:schemeClr>
-            </a:lnRef>
-            <a:fillRef idx="1">
-              <a:schemeClr val="accent1"/>
-            </a:fillRef>
-            <a:effectRef idx="0">
-              <a:schemeClr val="accent1"/>
-            </a:effectRef>
-            <a:fontRef idx="minor">
-              <a:schemeClr val="lt1"/>
-            </a:fontRef>
-          </p:style>
-          <p:txBody>
-            <a:bodyPr rtlCol="0" anchor="ctr"/>
-            <a:lstStyle/>
-            <a:p>
-              <a:pPr algn="ctr"/>
-              <a:r>
-                <a:rPr lang="de-DE" sz="2400" b="1">
-                  <a:solidFill>
-                    <a:schemeClr val="bg1"/>
-                  </a:solidFill>
-                </a:rPr>
-                <a:t>Sentiment analysis</a:t>
-              </a:r>
-              <a:endParaRPr lang="en-US" sz="2400" b="1">
-                <a:solidFill>
-                  <a:schemeClr val="bg1"/>
-                </a:solidFill>
-              </a:endParaRPr>
-            </a:p>
-          </p:txBody>
-        </p:sp>
-        <p:sp>
-          <p:nvSpPr>
-            <p:cNvPr id="34" name="Arrow: Pentagon 33">
-              <a:extLst>
-                <a:ext uri="{FF2B5EF4-FFF2-40B4-BE49-F238E27FC236}">
-                  <a16:creationId xmlns:a16="http://schemas.microsoft.com/office/drawing/2014/main" id="{A49C2862-BDE1-4735-9C57-5F47FBA0D2EB}"/>
-                </a:ext>
-              </a:extLst>
-            </p:cNvPr>
-            <p:cNvSpPr/>
-            <p:nvPr/>
-          </p:nvSpPr>
-          <p:spPr>
-            <a:xfrm flipH="1">
-              <a:off x="7953378" y="4549715"/>
-              <a:ext cx="3590920" cy="720000"/>
-            </a:xfrm>
-            <a:prstGeom prst="homePlate">
-              <a:avLst/>
-            </a:prstGeom>
-            <a:solidFill>
-              <a:schemeClr val="tx1">
-                <a:lumMod val="50000"/>
-                <a:lumOff val="50000"/>
-              </a:schemeClr>
-            </a:solidFill>
-            <a:ln>
+            <a:noFill/>
+            <a:ln w="28575">
               <a:solidFill>
                 <a:schemeClr val="tx1">
                   <a:lumMod val="50000"/>
@@ -13725,19 +13932,17 @@
             </a:ln>
           </p:spPr>
           <p:style>
-            <a:lnRef idx="2">
-              <a:schemeClr val="accent1">
-                <a:shade val="50000"/>
-              </a:schemeClr>
+            <a:lnRef idx="1">
+              <a:schemeClr val="accent1"/>
             </a:lnRef>
-            <a:fillRef idx="1">
+            <a:fillRef idx="0">
               <a:schemeClr val="accent1"/>
             </a:fillRef>
             <a:effectRef idx="0">
               <a:schemeClr val="accent1"/>
             </a:effectRef>
             <a:fontRef idx="minor">
-              <a:schemeClr val="lt1"/>
+              <a:schemeClr val="tx1"/>
             </a:fontRef>
           </p:style>
           <p:txBody>
@@ -13745,195 +13950,11 @@
             <a:lstStyle/>
             <a:p>
               <a:pPr algn="ctr"/>
-              <a:r>
-                <a:rPr lang="de-DE" sz="2400">
-                  <a:solidFill>
-                    <a:schemeClr val="bg1"/>
-                  </a:solidFill>
-                </a:rPr>
-                <a:t>Topic modeling</a:t>
-              </a:r>
-              <a:endParaRPr lang="en-US" sz="2400">
-                <a:solidFill>
-                  <a:schemeClr val="bg1"/>
-                </a:solidFill>
-              </a:endParaRPr>
+              <a:endParaRPr lang="en-US"/>
             </a:p>
           </p:txBody>
         </p:sp>
       </p:grpSp>
-      <p:sp>
-        <p:nvSpPr>
-          <p:cNvPr id="35" name="Arrow: Pentagon 34">
-            <a:extLst>
-              <a:ext uri="{FF2B5EF4-FFF2-40B4-BE49-F238E27FC236}">
-                <a16:creationId xmlns:a16="http://schemas.microsoft.com/office/drawing/2014/main" id="{07C12E8E-0BDB-4F13-A6D0-FBB531D6E2E7}"/>
-              </a:ext>
-            </a:extLst>
-          </p:cNvPr>
-          <p:cNvSpPr/>
-          <p:nvPr/>
-        </p:nvSpPr>
-        <p:spPr>
-          <a:xfrm flipH="1">
-            <a:off x="11183503" y="4549683"/>
-            <a:ext cx="776294" cy="720000"/>
-          </a:xfrm>
-          <a:prstGeom prst="homePlate">
-            <a:avLst/>
-          </a:prstGeom>
-          <a:solidFill>
-            <a:schemeClr val="bg1"/>
-          </a:solidFill>
-          <a:ln>
-            <a:solidFill>
-              <a:schemeClr val="bg1"/>
-            </a:solidFill>
-          </a:ln>
-        </p:spPr>
-        <p:style>
-          <a:lnRef idx="2">
-            <a:schemeClr val="accent1">
-              <a:shade val="50000"/>
-            </a:schemeClr>
-          </a:lnRef>
-          <a:fillRef idx="1">
-            <a:schemeClr val="accent1"/>
-          </a:fillRef>
-          <a:effectRef idx="0">
-            <a:schemeClr val="accent1"/>
-          </a:effectRef>
-          <a:fontRef idx="minor">
-            <a:schemeClr val="lt1"/>
-          </a:fontRef>
-        </p:style>
-        <p:txBody>
-          <a:bodyPr rtlCol="0" anchor="ctr"/>
-          <a:lstStyle/>
-          <a:p>
-            <a:pPr algn="ctr"/>
-            <a:endParaRPr lang="en-US"/>
-          </a:p>
-        </p:txBody>
-      </p:sp>
-      <p:sp>
-        <p:nvSpPr>
-          <p:cNvPr id="36" name="Speech Bubble: Rectangle 35">
-            <a:extLst>
-              <a:ext uri="{FF2B5EF4-FFF2-40B4-BE49-F238E27FC236}">
-                <a16:creationId xmlns:a16="http://schemas.microsoft.com/office/drawing/2014/main" id="{D2D93D2B-8828-4304-AE76-5617A1264F42}"/>
-              </a:ext>
-            </a:extLst>
-          </p:cNvPr>
-          <p:cNvSpPr/>
-          <p:nvPr/>
-        </p:nvSpPr>
-        <p:spPr>
-          <a:xfrm>
-            <a:off x="6960767" y="5804590"/>
-            <a:ext cx="2381247" cy="444501"/>
-          </a:xfrm>
-          <a:prstGeom prst="wedgeRectCallout">
-            <a:avLst>
-              <a:gd name="adj1" fmla="val -60500"/>
-              <a:gd name="adj2" fmla="val -7955"/>
-            </a:avLst>
-          </a:prstGeom>
-          <a:noFill/>
-          <a:ln>
-            <a:noFill/>
-          </a:ln>
-        </p:spPr>
-        <p:style>
-          <a:lnRef idx="2">
-            <a:schemeClr val="accent1">
-              <a:shade val="50000"/>
-            </a:schemeClr>
-          </a:lnRef>
-          <a:fillRef idx="1">
-            <a:schemeClr val="accent1"/>
-          </a:fillRef>
-          <a:effectRef idx="0">
-            <a:schemeClr val="accent1"/>
-          </a:effectRef>
-          <a:fontRef idx="minor">
-            <a:schemeClr val="lt1"/>
-          </a:fontRef>
-        </p:style>
-        <p:txBody>
-          <a:bodyPr rtlCol="0" anchor="ctr"/>
-          <a:lstStyle/>
-          <a:p>
-            <a:pPr algn="ctr"/>
-            <a:r>
-              <a:rPr lang="de-DE" sz="2400" i="1">
-                <a:solidFill>
-                  <a:schemeClr val="tx1"/>
-                </a:solidFill>
-              </a:rPr>
-              <a:t>Dynamic features</a:t>
-            </a:r>
-            <a:endParaRPr lang="en-US" sz="2400" i="1">
-              <a:solidFill>
-                <a:schemeClr val="tx1"/>
-              </a:solidFill>
-            </a:endParaRPr>
-          </a:p>
-        </p:txBody>
-      </p:sp>
-      <p:sp>
-        <p:nvSpPr>
-          <p:cNvPr id="37" name="Right Brace 36">
-            <a:extLst>
-              <a:ext uri="{FF2B5EF4-FFF2-40B4-BE49-F238E27FC236}">
-                <a16:creationId xmlns:a16="http://schemas.microsoft.com/office/drawing/2014/main" id="{8615D22F-21EB-429A-B7E7-BDBDBF12B720}"/>
-              </a:ext>
-            </a:extLst>
-          </p:cNvPr>
-          <p:cNvSpPr/>
-          <p:nvPr/>
-        </p:nvSpPr>
-        <p:spPr>
-          <a:xfrm rot="5400000">
-            <a:off x="8035713" y="2288012"/>
-            <a:ext cx="231356" cy="6587281"/>
-          </a:xfrm>
-          <a:prstGeom prst="rightBrace">
-            <a:avLst/>
-          </a:prstGeom>
-          <a:noFill/>
-          <a:ln w="28575">
-            <a:solidFill>
-              <a:schemeClr val="tx1">
-                <a:lumMod val="50000"/>
-                <a:lumOff val="50000"/>
-              </a:schemeClr>
-            </a:solidFill>
-          </a:ln>
-        </p:spPr>
-        <p:style>
-          <a:lnRef idx="1">
-            <a:schemeClr val="accent1"/>
-          </a:lnRef>
-          <a:fillRef idx="0">
-            <a:schemeClr val="accent1"/>
-          </a:fillRef>
-          <a:effectRef idx="0">
-            <a:schemeClr val="accent1"/>
-          </a:effectRef>
-          <a:fontRef idx="minor">
-            <a:schemeClr val="tx1"/>
-          </a:fontRef>
-        </p:style>
-        <p:txBody>
-          <a:bodyPr rtlCol="0" anchor="ctr"/>
-          <a:lstStyle/>
-          <a:p>
-            <a:pPr algn="ctr"/>
-            <a:endParaRPr lang="en-US"/>
-          </a:p>
-        </p:txBody>
-      </p:sp>
     </p:spTree>
     <p:extLst>
       <p:ext uri="{BB962C8B-B14F-4D97-AF65-F5344CB8AC3E}">

</xml_diff>